<commit_message>
add data models and update slides
</commit_message>
<xml_diff>
--- a/PPT slides/02 EDABDC - Data Models - part 1.pptx
+++ b/PPT slides/02 EDABDC - Data Models - part 1.pptx
@@ -18,52 +18,56 @@
     <p:sldId id="383" r:id="rId11"/>
     <p:sldId id="302" r:id="rId12"/>
     <p:sldId id="307" r:id="rId13"/>
-    <p:sldId id="304" r:id="rId14"/>
-    <p:sldId id="351" r:id="rId15"/>
-    <p:sldId id="352" r:id="rId16"/>
-    <p:sldId id="384" r:id="rId17"/>
-    <p:sldId id="305" r:id="rId18"/>
-    <p:sldId id="306" r:id="rId19"/>
-    <p:sldId id="308" r:id="rId20"/>
-    <p:sldId id="309" r:id="rId21"/>
-    <p:sldId id="310" r:id="rId22"/>
-    <p:sldId id="311" r:id="rId23"/>
-    <p:sldId id="328" r:id="rId24"/>
-    <p:sldId id="312" r:id="rId25"/>
-    <p:sldId id="427" r:id="rId26"/>
-    <p:sldId id="317" r:id="rId27"/>
-    <p:sldId id="319" r:id="rId28"/>
-    <p:sldId id="326" r:id="rId29"/>
-    <p:sldId id="320" r:id="rId30"/>
-    <p:sldId id="321" r:id="rId31"/>
-    <p:sldId id="322" r:id="rId32"/>
-    <p:sldId id="382" r:id="rId33"/>
-    <p:sldId id="323" r:id="rId34"/>
-    <p:sldId id="324" r:id="rId35"/>
-    <p:sldId id="387" r:id="rId36"/>
-    <p:sldId id="422" r:id="rId37"/>
-    <p:sldId id="385" r:id="rId38"/>
-    <p:sldId id="339" r:id="rId39"/>
-    <p:sldId id="340" r:id="rId40"/>
-    <p:sldId id="341" r:id="rId41"/>
-    <p:sldId id="342" r:id="rId42"/>
-    <p:sldId id="343" r:id="rId43"/>
-    <p:sldId id="344" r:id="rId44"/>
-    <p:sldId id="345" r:id="rId45"/>
-    <p:sldId id="346" r:id="rId46"/>
-    <p:sldId id="347" r:id="rId47"/>
-    <p:sldId id="349" r:id="rId48"/>
-    <p:sldId id="348" r:id="rId49"/>
-    <p:sldId id="350" r:id="rId50"/>
-    <p:sldId id="423" r:id="rId51"/>
-    <p:sldId id="424" r:id="rId52"/>
-    <p:sldId id="425" r:id="rId53"/>
-    <p:sldId id="426" r:id="rId54"/>
-    <p:sldId id="457" r:id="rId55"/>
-    <p:sldId id="458" r:id="rId56"/>
-    <p:sldId id="461" r:id="rId57"/>
-    <p:sldId id="459" r:id="rId58"/>
-    <p:sldId id="264" r:id="rId59"/>
+    <p:sldId id="519" r:id="rId14"/>
+    <p:sldId id="522" r:id="rId15"/>
+    <p:sldId id="521" r:id="rId16"/>
+    <p:sldId id="520" r:id="rId17"/>
+    <p:sldId id="304" r:id="rId18"/>
+    <p:sldId id="351" r:id="rId19"/>
+    <p:sldId id="352" r:id="rId20"/>
+    <p:sldId id="384" r:id="rId21"/>
+    <p:sldId id="305" r:id="rId22"/>
+    <p:sldId id="306" r:id="rId23"/>
+    <p:sldId id="308" r:id="rId24"/>
+    <p:sldId id="309" r:id="rId25"/>
+    <p:sldId id="310" r:id="rId26"/>
+    <p:sldId id="311" r:id="rId27"/>
+    <p:sldId id="328" r:id="rId28"/>
+    <p:sldId id="312" r:id="rId29"/>
+    <p:sldId id="427" r:id="rId30"/>
+    <p:sldId id="317" r:id="rId31"/>
+    <p:sldId id="319" r:id="rId32"/>
+    <p:sldId id="326" r:id="rId33"/>
+    <p:sldId id="320" r:id="rId34"/>
+    <p:sldId id="321" r:id="rId35"/>
+    <p:sldId id="322" r:id="rId36"/>
+    <p:sldId id="382" r:id="rId37"/>
+    <p:sldId id="323" r:id="rId38"/>
+    <p:sldId id="324" r:id="rId39"/>
+    <p:sldId id="387" r:id="rId40"/>
+    <p:sldId id="422" r:id="rId41"/>
+    <p:sldId id="385" r:id="rId42"/>
+    <p:sldId id="339" r:id="rId43"/>
+    <p:sldId id="340" r:id="rId44"/>
+    <p:sldId id="341" r:id="rId45"/>
+    <p:sldId id="342" r:id="rId46"/>
+    <p:sldId id="343" r:id="rId47"/>
+    <p:sldId id="344" r:id="rId48"/>
+    <p:sldId id="345" r:id="rId49"/>
+    <p:sldId id="346" r:id="rId50"/>
+    <p:sldId id="347" r:id="rId51"/>
+    <p:sldId id="349" r:id="rId52"/>
+    <p:sldId id="348" r:id="rId53"/>
+    <p:sldId id="350" r:id="rId54"/>
+    <p:sldId id="423" r:id="rId55"/>
+    <p:sldId id="424" r:id="rId56"/>
+    <p:sldId id="425" r:id="rId57"/>
+    <p:sldId id="426" r:id="rId58"/>
+    <p:sldId id="457" r:id="rId59"/>
+    <p:sldId id="458" r:id="rId60"/>
+    <p:sldId id="461" r:id="rId61"/>
+    <p:sldId id="459" r:id="rId62"/>
+    <p:sldId id="264" r:id="rId63"/>
   </p:sldIdLst>
   <p:sldSz cx="12192000" cy="6858000"/>
   <p:notesSz cx="6858000" cy="9144000"/>
@@ -3563,6 +3567,336 @@
           <a:bodyPr/>
           <a:p>
             <a:r>
+              <a:rPr lang="en-US" altLang="en-GB"/>
+              <a:t>XML applications </a:t>
+            </a:r>
+            <a:endParaRPr lang="en-US" altLang="en-GB"/>
+          </a:p>
+        </p:txBody>
+      </p:sp>
+      <p:sp>
+        <p:nvSpPr>
+          <p:cNvPr id="3" name="Content Placeholder 2"/>
+          <p:cNvSpPr>
+            <a:spLocks noGrp="1"/>
+          </p:cNvSpPr>
+          <p:nvPr>
+            <p:ph idx="1"/>
+          </p:nvPr>
+        </p:nvSpPr>
+        <p:spPr/>
+        <p:txBody>
+          <a:bodyPr>
+            <a:normAutofit/>
+          </a:bodyPr>
+          <a:p>
+            <a:r>
+              <a:rPr lang="en-US" altLang="en-GB"/>
+              <a:t>Data Interchange: Facilitates data exchange between different systems.</a:t>
+            </a:r>
+            <a:endParaRPr lang="en-US" altLang="en-GB"/>
+          </a:p>
+          <a:p>
+            <a:r>
+              <a:rPr lang="en-US" altLang="en-GB"/>
+              <a:t>Configuration Files: Stores application settings in a structured format.</a:t>
+            </a:r>
+            <a:endParaRPr lang="en-US" altLang="en-GB"/>
+          </a:p>
+          <a:p>
+            <a:r>
+              <a:rPr lang="en-US" altLang="en-GB"/>
+              <a:t>Data Representation: Represents complex data in a human-readable format.</a:t>
+            </a:r>
+            <a:endParaRPr lang="en-US" altLang="en-GB"/>
+          </a:p>
+          <a:p>
+            <a:r>
+              <a:rPr lang="en-US" altLang="en-GB"/>
+              <a:t>RSS and Atom Feeds: Powers syndication formats for web content distribution.</a:t>
+            </a:r>
+            <a:endParaRPr lang="en-US" altLang="en-GB"/>
+          </a:p>
+          <a:p>
+            <a:r>
+              <a:rPr lang="en-US" altLang="en-GB"/>
+              <a:t>Office Document Formats: Forms the basis of modern office file formats (e.g., DOCX).</a:t>
+            </a:r>
+            <a:endParaRPr lang="en-US" altLang="en-GB"/>
+          </a:p>
+        </p:txBody>
+      </p:sp>
+    </p:spTree>
+  </p:cSld>
+  <p:clrMapOvr>
+    <a:masterClrMapping/>
+  </p:clrMapOvr>
+</p:sld>
+</file>
+
+<file path=ppt/slides/slide12.xml><?xml version="1.0" encoding="utf-8"?>
+<p:sld xmlns:a="http://schemas.openxmlformats.org/drawingml/2006/main" xmlns:r="http://schemas.openxmlformats.org/officeDocument/2006/relationships" xmlns:p="http://schemas.openxmlformats.org/presentationml/2006/main">
+  <p:cSld>
+    <p:spTree>
+      <p:nvGrpSpPr>
+        <p:cNvPr id="1" name=""/>
+        <p:cNvGrpSpPr/>
+        <p:nvPr/>
+      </p:nvGrpSpPr>
+      <p:grpSpPr/>
+      <p:sp>
+        <p:nvSpPr>
+          <p:cNvPr id="2" name="Title 1"/>
+          <p:cNvSpPr>
+            <a:spLocks noGrp="1"/>
+          </p:cNvSpPr>
+          <p:nvPr>
+            <p:ph type="title"/>
+          </p:nvPr>
+        </p:nvSpPr>
+        <p:spPr/>
+        <p:txBody>
+          <a:bodyPr>
+            <a:normAutofit/>
+          </a:bodyPr>
+          <a:p>
+            <a:r>
+              <a:rPr lang="en-US" altLang="en-GB"/>
+              <a:t>Example XML Configuration File</a:t>
+            </a:r>
+            <a:endParaRPr lang="en-US" altLang="en-GB"/>
+          </a:p>
+        </p:txBody>
+      </p:sp>
+      <p:pic>
+        <p:nvPicPr>
+          <p:cNvPr id="4" name="Picture 3"/>
+          <p:cNvPicPr>
+            <a:picLocks noChangeAspect="1"/>
+          </p:cNvPicPr>
+          <p:nvPr/>
+        </p:nvPicPr>
+        <p:blipFill>
+          <a:blip r:embed="rId1"/>
+          <a:stretch>
+            <a:fillRect/>
+          </a:stretch>
+        </p:blipFill>
+        <p:spPr>
+          <a:xfrm>
+            <a:off x="2291715" y="1896110"/>
+            <a:ext cx="7372350" cy="4657725"/>
+          </a:xfrm>
+          <a:prstGeom prst="rect">
+            <a:avLst/>
+          </a:prstGeom>
+        </p:spPr>
+      </p:pic>
+    </p:spTree>
+  </p:cSld>
+  <p:clrMapOvr>
+    <a:masterClrMapping/>
+  </p:clrMapOvr>
+</p:sld>
+</file>
+
+<file path=ppt/slides/slide13.xml><?xml version="1.0" encoding="utf-8"?>
+<p:sld xmlns:a="http://schemas.openxmlformats.org/drawingml/2006/main" xmlns:r="http://schemas.openxmlformats.org/officeDocument/2006/relationships" xmlns:p="http://schemas.openxmlformats.org/presentationml/2006/main">
+  <p:cSld>
+    <p:spTree>
+      <p:nvGrpSpPr>
+        <p:cNvPr id="1" name=""/>
+        <p:cNvGrpSpPr/>
+        <p:nvPr/>
+      </p:nvGrpSpPr>
+      <p:grpSpPr/>
+      <p:sp>
+        <p:nvSpPr>
+          <p:cNvPr id="2" name="Title 1"/>
+          <p:cNvSpPr>
+            <a:spLocks noGrp="1"/>
+          </p:cNvSpPr>
+          <p:nvPr>
+            <p:ph type="title"/>
+          </p:nvPr>
+        </p:nvSpPr>
+        <p:spPr/>
+        <p:txBody>
+          <a:bodyPr/>
+          <a:p>
+            <a:r>
+              <a:rPr lang="en-US" altLang="en-GB">
+                <a:sym typeface="+mn-ea"/>
+              </a:rPr>
+              <a:t>Digital signature </a:t>
+            </a:r>
+            <a:endParaRPr lang="en-GB" altLang="en-US"/>
+          </a:p>
+        </p:txBody>
+      </p:sp>
+      <p:pic>
+        <p:nvPicPr>
+          <p:cNvPr id="4" name="Content Placeholder 3"/>
+          <p:cNvPicPr>
+            <a:picLocks noChangeAspect="1"/>
+          </p:cNvPicPr>
+          <p:nvPr>
+            <p:ph idx="1"/>
+          </p:nvPr>
+        </p:nvPicPr>
+        <p:blipFill>
+          <a:blip r:embed="rId1"/>
+          <a:stretch>
+            <a:fillRect/>
+          </a:stretch>
+        </p:blipFill>
+        <p:spPr>
+          <a:xfrm>
+            <a:off x="1477010" y="1810385"/>
+            <a:ext cx="8243570" cy="4584065"/>
+          </a:xfrm>
+          <a:prstGeom prst="rect">
+            <a:avLst/>
+          </a:prstGeom>
+        </p:spPr>
+      </p:pic>
+    </p:spTree>
+  </p:cSld>
+  <p:clrMapOvr>
+    <a:masterClrMapping/>
+  </p:clrMapOvr>
+</p:sld>
+</file>
+
+<file path=ppt/slides/slide14.xml><?xml version="1.0" encoding="utf-8"?>
+<p:sld xmlns:a="http://schemas.openxmlformats.org/drawingml/2006/main" xmlns:r="http://schemas.openxmlformats.org/officeDocument/2006/relationships" xmlns:p="http://schemas.openxmlformats.org/presentationml/2006/main">
+  <p:cSld>
+    <p:spTree>
+      <p:nvGrpSpPr>
+        <p:cNvPr id="1" name=""/>
+        <p:cNvGrpSpPr/>
+        <p:nvPr/>
+      </p:nvGrpSpPr>
+      <p:grpSpPr/>
+      <p:sp>
+        <p:nvSpPr>
+          <p:cNvPr id="2" name="Title 1"/>
+          <p:cNvSpPr>
+            <a:spLocks noGrp="1"/>
+          </p:cNvSpPr>
+          <p:nvPr>
+            <p:ph type="title"/>
+          </p:nvPr>
+        </p:nvSpPr>
+        <p:spPr/>
+        <p:txBody>
+          <a:bodyPr/>
+          <a:p>
+            <a:r>
+              <a:rPr lang="en-US" altLang="en-GB"/>
+              <a:t>Digital signature </a:t>
+            </a:r>
+            <a:endParaRPr lang="en-US" altLang="en-GB"/>
+          </a:p>
+        </p:txBody>
+      </p:sp>
+      <p:sp>
+        <p:nvSpPr>
+          <p:cNvPr id="3" name="Content Placeholder 2"/>
+          <p:cNvSpPr>
+            <a:spLocks noGrp="1"/>
+          </p:cNvSpPr>
+          <p:nvPr>
+            <p:ph idx="1"/>
+          </p:nvPr>
+        </p:nvSpPr>
+        <p:spPr/>
+        <p:txBody>
+          <a:bodyPr>
+            <a:normAutofit fontScale="80000"/>
+          </a:bodyPr>
+          <a:p>
+            <a:r>
+              <a:rPr lang="en-US" altLang="en-GB"/>
+              <a:t>XML is used in digital signatures, particularly through a standard known as XML Signature (or XMLDSig). This standard allows for the signing of XML data to ensure its integrity, authenticity, and non-repudiation. Here are some key aspects of XML digital signatures:</a:t>
+            </a:r>
+            <a:endParaRPr lang="en-US" altLang="en-GB"/>
+          </a:p>
+          <a:p>
+            <a:pPr lvl="1"/>
+            <a:r>
+              <a:rPr lang="en-US" altLang="en-GB"/>
+              <a:t>Integrity: XML signatures ensure that the signed data has not been altered after signing.</a:t>
+            </a:r>
+            <a:endParaRPr lang="en-US" altLang="en-GB"/>
+          </a:p>
+          <a:p>
+            <a:pPr lvl="1"/>
+            <a:r>
+              <a:rPr lang="en-US" altLang="en-GB"/>
+              <a:t>Authentication: They verify the identity of the signer, confirming that the signature was created by a legitimate source.</a:t>
+            </a:r>
+            <a:endParaRPr lang="en-US" altLang="en-GB"/>
+          </a:p>
+          <a:p>
+            <a:pPr lvl="1"/>
+            <a:r>
+              <a:rPr lang="en-US" altLang="en-GB"/>
+              <a:t>Non-repudiation: The signer cannot deny having signed the document, as the signature is uniquely tied to the signer.</a:t>
+            </a:r>
+            <a:endParaRPr lang="en-US" altLang="en-GB"/>
+          </a:p>
+          <a:p>
+            <a:pPr lvl="1"/>
+            <a:r>
+              <a:rPr lang="en-US" altLang="en-GB"/>
+              <a:t>Interoperability: XML signatures can be used across different platforms and applications, making them suitable for various digital transactions.</a:t>
+            </a:r>
+            <a:endParaRPr lang="en-US" altLang="en-GB"/>
+          </a:p>
+          <a:p>
+            <a:pPr lvl="1"/>
+            <a:r>
+              <a:rPr lang="en-US" altLang="en-GB"/>
+              <a:t>Support for Multiple Formats: XML Signature can be applied to any XML data, allowing for flexible use in different contexts.</a:t>
+            </a:r>
+            <a:endParaRPr lang="en-US" altLang="en-GB"/>
+          </a:p>
+        </p:txBody>
+      </p:sp>
+    </p:spTree>
+  </p:cSld>
+  <p:clrMapOvr>
+    <a:masterClrMapping/>
+  </p:clrMapOvr>
+</p:sld>
+</file>
+
+<file path=ppt/slides/slide15.xml><?xml version="1.0" encoding="utf-8"?>
+<p:sld xmlns:a="http://schemas.openxmlformats.org/drawingml/2006/main" xmlns:r="http://schemas.openxmlformats.org/officeDocument/2006/relationships" xmlns:p="http://schemas.openxmlformats.org/presentationml/2006/main">
+  <p:cSld>
+    <p:spTree>
+      <p:nvGrpSpPr>
+        <p:cNvPr id="1" name=""/>
+        <p:cNvGrpSpPr/>
+        <p:nvPr/>
+      </p:nvGrpSpPr>
+      <p:grpSpPr/>
+      <p:sp>
+        <p:nvSpPr>
+          <p:cNvPr id="2" name="Title 1"/>
+          <p:cNvSpPr>
+            <a:spLocks noGrp="1"/>
+          </p:cNvSpPr>
+          <p:nvPr>
+            <p:ph type="title"/>
+          </p:nvPr>
+        </p:nvSpPr>
+        <p:spPr/>
+        <p:txBody>
+          <a:bodyPr/>
+          <a:p>
+            <a:r>
               <a:rPr lang="en-US"/>
               <a:t>XML Tools </a:t>
             </a:r>
@@ -3655,7 +3989,7 @@
 </p:sld>
 </file>
 
-<file path=ppt/slides/slide12.xml><?xml version="1.0" encoding="utf-8"?>
+<file path=ppt/slides/slide16.xml><?xml version="1.0" encoding="utf-8"?>
 <p:sld xmlns:a="http://schemas.openxmlformats.org/drawingml/2006/main" xmlns:r="http://schemas.openxmlformats.org/officeDocument/2006/relationships" xmlns:p="http://schemas.openxmlformats.org/presentationml/2006/main">
   <p:cSld>
     <p:spTree>
@@ -3876,7 +4210,7 @@
 </p:sld>
 </file>
 
-<file path=ppt/slides/slide13.xml><?xml version="1.0" encoding="utf-8"?>
+<file path=ppt/slides/slide17.xml><?xml version="1.0" encoding="utf-8"?>
 <p:sld xmlns:a="http://schemas.openxmlformats.org/drawingml/2006/main" xmlns:r="http://schemas.openxmlformats.org/officeDocument/2006/relationships" xmlns:p="http://schemas.openxmlformats.org/presentationml/2006/main">
   <p:cSld>
     <p:spTree>
@@ -3971,7 +4305,7 @@
 </p:sld>
 </file>
 
-<file path=ppt/slides/slide14.xml><?xml version="1.0" encoding="utf-8"?>
+<file path=ppt/slides/slide18.xml><?xml version="1.0" encoding="utf-8"?>
 <p:sld xmlns:a="http://schemas.openxmlformats.org/drawingml/2006/main" xmlns:r="http://schemas.openxmlformats.org/officeDocument/2006/relationships" xmlns:p="http://schemas.openxmlformats.org/presentationml/2006/main">
   <p:cSld>
     <p:spTree>
@@ -4047,7 +4381,7 @@
           <a:p>
             <a:r>
               <a:rPr lang="en-US"/>
-              <a:t>Key-Value Data Mode</a:t>
+              <a:t>Key-Value Data Model</a:t>
             </a:r>
             <a:endParaRPr lang="en-US"/>
           </a:p>
@@ -4075,7 +4409,7 @@
 </p:sld>
 </file>
 
-<file path=ppt/slides/slide15.xml><?xml version="1.0" encoding="utf-8"?>
+<file path=ppt/slides/slide19.xml><?xml version="1.0" encoding="utf-8"?>
 <p:sld xmlns:a="http://schemas.openxmlformats.org/drawingml/2006/main" xmlns:r="http://schemas.openxmlformats.org/officeDocument/2006/relationships" xmlns:p="http://schemas.openxmlformats.org/presentationml/2006/main">
   <p:cSld>
     <p:spTree>
@@ -4146,7 +4480,7 @@
 </p:sld>
 </file>
 
-<file path=ppt/slides/slide16.xml><?xml version="1.0" encoding="utf-8"?>
+<file path=ppt/slides/slide2.xml><?xml version="1.0" encoding="utf-8"?>
 <p:sld xmlns:a="http://schemas.openxmlformats.org/drawingml/2006/main" xmlns:r="http://schemas.openxmlformats.org/officeDocument/2006/relationships" xmlns:p="http://schemas.openxmlformats.org/presentationml/2006/main">
   <p:cSld>
     <p:spTree>
@@ -4172,7 +4506,7 @@
           <a:p>
             <a:r>
               <a:rPr lang="en-US"/>
-              <a:t>Relational Data Model Key Characteristics</a:t>
+              <a:t>Data Models </a:t>
             </a:r>
             <a:endParaRPr lang="en-US"/>
           </a:p>
@@ -4188,55 +4522,68 @@
             <p:ph idx="1"/>
           </p:nvPr>
         </p:nvSpPr>
-        <p:spPr>
-          <a:xfrm>
-            <a:off x="567690" y="1891030"/>
-            <a:ext cx="11261090" cy="4675505"/>
-          </a:xfrm>
-        </p:spPr>
+        <p:spPr/>
         <p:txBody>
           <a:bodyPr>
-            <a:normAutofit fontScale="80000"/>
+            <a:normAutofit lnSpcReduction="20000"/>
           </a:bodyPr>
           <a:p>
-            <a:r>
-              <a:rPr lang="en-US"/>
-              <a:t>Tables (Relations): Data is organized into tables, which consist of rows and columns. Each table represents a relation, and each row in the table represents a record.</a:t>
-            </a:r>
-            <a:endParaRPr lang="en-US"/>
-          </a:p>
-          <a:p>
-            <a:r>
-              <a:rPr lang="en-US"/>
-              <a:t>Rows (Tuples): Each row in a table is called a tuple, representing a single record with a unique set of values.</a:t>
-            </a:r>
-            <a:endParaRPr lang="en-US"/>
-          </a:p>
-          <a:p>
-            <a:r>
-              <a:rPr lang="en-US"/>
-              <a:t>Columns (Attributes): Each column in a table represents an attribute or field. Columns define the properties of the data.</a:t>
-            </a:r>
-            <a:endParaRPr lang="en-US"/>
-          </a:p>
-          <a:p>
-            <a:r>
-              <a:rPr lang="en-US"/>
-              <a:t>Primary Keys: Each table has a primary key, a unique identifier for each row. The primary key ensures that each record can be uniquely identified.</a:t>
-            </a:r>
-            <a:endParaRPr lang="en-US"/>
-          </a:p>
-          <a:p>
-            <a:r>
-              <a:rPr lang="en-US"/>
-              <a:t>Foreign Keys: Foreign keys are used to establish relationships between tables. A foreign key in one table refers to the primary key of another table, enabling the creation of relational links.</a:t>
-            </a:r>
-            <a:endParaRPr lang="en-US"/>
-          </a:p>
-          <a:p>
-            <a:r>
-              <a:rPr lang="en-US"/>
-              <a:t>Normalization: The process of organizing data to minimize redundancy and improve data integrity. Normalization involves decomposing tables into smaller, related tables.</a:t>
+            <a:pPr>
+              <a:lnSpc>
+                <a:spcPct val="200000"/>
+              </a:lnSpc>
+            </a:pPr>
+            <a:r>
+              <a:rPr lang="en-US"/>
+              <a:t>We have data, but need to be organized and managed! </a:t>
+            </a:r>
+            <a:endParaRPr lang="en-US"/>
+          </a:p>
+          <a:p>
+            <a:pPr>
+              <a:lnSpc>
+                <a:spcPct val="200000"/>
+              </a:lnSpc>
+            </a:pPr>
+            <a:r>
+              <a:rPr lang="en-US"/>
+              <a:t>Data models are frameworks for </a:t>
+            </a:r>
+            <a:r>
+              <a:rPr lang="en-US" b="1"/>
+              <a:t>organizing </a:t>
+            </a:r>
+            <a:r>
+              <a:rPr lang="en-US"/>
+              <a:t>and </a:t>
+            </a:r>
+            <a:r>
+              <a:rPr lang="en-US" b="1"/>
+              <a:t>defining </a:t>
+            </a:r>
+            <a:r>
+              <a:rPr lang="en-US"/>
+              <a:t>data elements and their </a:t>
+            </a:r>
+            <a:r>
+              <a:rPr lang="en-US" b="1"/>
+              <a:t>relationships</a:t>
+            </a:r>
+            <a:r>
+              <a:rPr lang="en-US"/>
+              <a:t>. </a:t>
+            </a:r>
+            <a:endParaRPr lang="en-US"/>
+          </a:p>
+          <a:p>
+            <a:pPr>
+              <a:lnSpc>
+                <a:spcPct val="200000"/>
+              </a:lnSpc>
+            </a:pPr>
+            <a:r>
+              <a:rPr lang="en-US"/>
+              <a:t>They provide a systematic way to manage data, which is essential for developing databases and information systems. </a:t>
             </a:r>
             <a:endParaRPr lang="en-US"/>
           </a:p>
@@ -4250,7 +4597,111 @@
 </p:sld>
 </file>
 
-<file path=ppt/slides/slide17.xml><?xml version="1.0" encoding="utf-8"?>
+<file path=ppt/slides/slide20.xml><?xml version="1.0" encoding="utf-8"?>
+<p:sld xmlns:a="http://schemas.openxmlformats.org/drawingml/2006/main" xmlns:r="http://schemas.openxmlformats.org/officeDocument/2006/relationships" xmlns:p="http://schemas.openxmlformats.org/presentationml/2006/main">
+  <p:cSld>
+    <p:spTree>
+      <p:nvGrpSpPr>
+        <p:cNvPr id="1" name=""/>
+        <p:cNvGrpSpPr/>
+        <p:nvPr/>
+      </p:nvGrpSpPr>
+      <p:grpSpPr/>
+      <p:sp>
+        <p:nvSpPr>
+          <p:cNvPr id="2" name="Title 1"/>
+          <p:cNvSpPr>
+            <a:spLocks noGrp="1"/>
+          </p:cNvSpPr>
+          <p:nvPr>
+            <p:ph type="title"/>
+          </p:nvPr>
+        </p:nvSpPr>
+        <p:spPr/>
+        <p:txBody>
+          <a:bodyPr/>
+          <a:p>
+            <a:r>
+              <a:rPr lang="en-US"/>
+              <a:t>Relational Data Model Key Characteristics</a:t>
+            </a:r>
+            <a:endParaRPr lang="en-US"/>
+          </a:p>
+        </p:txBody>
+      </p:sp>
+      <p:sp>
+        <p:nvSpPr>
+          <p:cNvPr id="3" name="Content Placeholder 2"/>
+          <p:cNvSpPr>
+            <a:spLocks noGrp="1"/>
+          </p:cNvSpPr>
+          <p:nvPr>
+            <p:ph idx="1"/>
+          </p:nvPr>
+        </p:nvSpPr>
+        <p:spPr>
+          <a:xfrm>
+            <a:off x="567690" y="1891030"/>
+            <a:ext cx="11261090" cy="4675505"/>
+          </a:xfrm>
+        </p:spPr>
+        <p:txBody>
+          <a:bodyPr>
+            <a:normAutofit fontScale="80000"/>
+          </a:bodyPr>
+          <a:p>
+            <a:r>
+              <a:rPr lang="en-US"/>
+              <a:t>Tables (Relations): Data is organized into tables, which consist of rows and columns. Each table represents a relation, and each row in the table represents a record.</a:t>
+            </a:r>
+            <a:endParaRPr lang="en-US"/>
+          </a:p>
+          <a:p>
+            <a:r>
+              <a:rPr lang="en-US"/>
+              <a:t>Rows (Tuples): Each row in a table is called a tuple, representing a single record with a unique set of values.</a:t>
+            </a:r>
+            <a:endParaRPr lang="en-US"/>
+          </a:p>
+          <a:p>
+            <a:r>
+              <a:rPr lang="en-US"/>
+              <a:t>Columns (Attributes): Each column in a table represents an attribute or field. Columns define the properties of the data.</a:t>
+            </a:r>
+            <a:endParaRPr lang="en-US"/>
+          </a:p>
+          <a:p>
+            <a:r>
+              <a:rPr lang="en-US"/>
+              <a:t>Primary Keys: Each table has a primary key, a unique identifier for each row. The primary key ensures that each record can be uniquely identified.</a:t>
+            </a:r>
+            <a:endParaRPr lang="en-US"/>
+          </a:p>
+          <a:p>
+            <a:r>
+              <a:rPr lang="en-US"/>
+              <a:t>Foreign Keys: Foreign keys are used to establish relationships between tables. A foreign key in one table refers to the primary key of another table, enabling the creation of relational links.</a:t>
+            </a:r>
+            <a:endParaRPr lang="en-US"/>
+          </a:p>
+          <a:p>
+            <a:r>
+              <a:rPr lang="en-US"/>
+              <a:t>Normalization: The process of organizing data to minimize redundancy and improve data integrity. Normalization involves decomposing tables into smaller, related tables.</a:t>
+            </a:r>
+            <a:endParaRPr lang="en-US"/>
+          </a:p>
+        </p:txBody>
+      </p:sp>
+    </p:spTree>
+  </p:cSld>
+  <p:clrMapOvr>
+    <a:masterClrMapping/>
+  </p:clrMapOvr>
+</p:sld>
+</file>
+
+<file path=ppt/slides/slide21.xml><?xml version="1.0" encoding="utf-8"?>
 <p:sld xmlns:a="http://schemas.openxmlformats.org/drawingml/2006/main" xmlns:r="http://schemas.openxmlformats.org/officeDocument/2006/relationships" xmlns:p="http://schemas.openxmlformats.org/presentationml/2006/main">
   <p:cSld>
     <p:spTree>
@@ -4295,7 +4746,7 @@
 </p:sld>
 </file>
 
-<file path=ppt/slides/slide18.xml><?xml version="1.0" encoding="utf-8"?>
+<file path=ppt/slides/slide22.xml><?xml version="1.0" encoding="utf-8"?>
 <p:sld xmlns:a="http://schemas.openxmlformats.org/drawingml/2006/main" xmlns:r="http://schemas.openxmlformats.org/officeDocument/2006/relationships" xmlns:p="http://schemas.openxmlformats.org/presentationml/2006/main">
   <p:cSld>
     <p:spTree>
@@ -4463,7 +4914,7 @@
 </p:sld>
 </file>
 
-<file path=ppt/slides/slide19.xml><?xml version="1.0" encoding="utf-8"?>
+<file path=ppt/slides/slide23.xml><?xml version="1.0" encoding="utf-8"?>
 <p:sld xmlns:a="http://schemas.openxmlformats.org/drawingml/2006/main" xmlns:r="http://schemas.openxmlformats.org/officeDocument/2006/relationships" xmlns:p="http://schemas.openxmlformats.org/presentationml/2006/main">
   <p:cSld>
     <p:spTree>
@@ -4553,124 +5004,7 @@
 </p:sld>
 </file>
 
-<file path=ppt/slides/slide2.xml><?xml version="1.0" encoding="utf-8"?>
-<p:sld xmlns:a="http://schemas.openxmlformats.org/drawingml/2006/main" xmlns:r="http://schemas.openxmlformats.org/officeDocument/2006/relationships" xmlns:p="http://schemas.openxmlformats.org/presentationml/2006/main">
-  <p:cSld>
-    <p:spTree>
-      <p:nvGrpSpPr>
-        <p:cNvPr id="1" name=""/>
-        <p:cNvGrpSpPr/>
-        <p:nvPr/>
-      </p:nvGrpSpPr>
-      <p:grpSpPr/>
-      <p:sp>
-        <p:nvSpPr>
-          <p:cNvPr id="2" name="Title 1"/>
-          <p:cNvSpPr>
-            <a:spLocks noGrp="1"/>
-          </p:cNvSpPr>
-          <p:nvPr>
-            <p:ph type="title"/>
-          </p:nvPr>
-        </p:nvSpPr>
-        <p:spPr/>
-        <p:txBody>
-          <a:bodyPr/>
-          <a:p>
-            <a:r>
-              <a:rPr lang="en-US"/>
-              <a:t>Data Models </a:t>
-            </a:r>
-            <a:endParaRPr lang="en-US"/>
-          </a:p>
-        </p:txBody>
-      </p:sp>
-      <p:sp>
-        <p:nvSpPr>
-          <p:cNvPr id="3" name="Content Placeholder 2"/>
-          <p:cNvSpPr>
-            <a:spLocks noGrp="1"/>
-          </p:cNvSpPr>
-          <p:nvPr>
-            <p:ph idx="1"/>
-          </p:nvPr>
-        </p:nvSpPr>
-        <p:spPr/>
-        <p:txBody>
-          <a:bodyPr>
-            <a:normAutofit lnSpcReduction="20000"/>
-          </a:bodyPr>
-          <a:p>
-            <a:pPr>
-              <a:lnSpc>
-                <a:spcPct val="200000"/>
-              </a:lnSpc>
-            </a:pPr>
-            <a:r>
-              <a:rPr lang="en-US"/>
-              <a:t>We have data, but need to be organized and managed! </a:t>
-            </a:r>
-            <a:endParaRPr lang="en-US"/>
-          </a:p>
-          <a:p>
-            <a:pPr>
-              <a:lnSpc>
-                <a:spcPct val="200000"/>
-              </a:lnSpc>
-            </a:pPr>
-            <a:r>
-              <a:rPr lang="en-US"/>
-              <a:t>Data models are frameworks for </a:t>
-            </a:r>
-            <a:r>
-              <a:rPr lang="en-US" b="1"/>
-              <a:t>organizing </a:t>
-            </a:r>
-            <a:r>
-              <a:rPr lang="en-US"/>
-              <a:t>and </a:t>
-            </a:r>
-            <a:r>
-              <a:rPr lang="en-US" b="1"/>
-              <a:t>defining </a:t>
-            </a:r>
-            <a:r>
-              <a:rPr lang="en-US"/>
-              <a:t>data elements and their </a:t>
-            </a:r>
-            <a:r>
-              <a:rPr lang="en-US" b="1"/>
-              <a:t>relationships</a:t>
-            </a:r>
-            <a:r>
-              <a:rPr lang="en-US"/>
-              <a:t>. </a:t>
-            </a:r>
-            <a:endParaRPr lang="en-US"/>
-          </a:p>
-          <a:p>
-            <a:pPr>
-              <a:lnSpc>
-                <a:spcPct val="200000"/>
-              </a:lnSpc>
-            </a:pPr>
-            <a:r>
-              <a:rPr lang="en-US"/>
-              <a:t>They provide a systematic way to manage data, which is essential for developing databases and information systems. </a:t>
-            </a:r>
-            <a:endParaRPr lang="en-US"/>
-          </a:p>
-        </p:txBody>
-      </p:sp>
-    </p:spTree>
-  </p:cSld>
-  <p:clrMapOvr>
-    <a:masterClrMapping/>
-  </p:clrMapOvr>
-</p:sld>
-</file>
-
-<file path=ppt/slides/slide20.xml><?xml version="1.0" encoding="utf-8"?>
+<file path=ppt/slides/slide24.xml><?xml version="1.0" encoding="utf-8"?>
 <p:sld xmlns:a="http://schemas.openxmlformats.org/drawingml/2006/main" xmlns:r="http://schemas.openxmlformats.org/officeDocument/2006/relationships" xmlns:p="http://schemas.openxmlformats.org/presentationml/2006/main">
   <p:cSld>
     <p:spTree>
@@ -4734,7 +5068,7 @@
 </p:sld>
 </file>
 
-<file path=ppt/slides/slide21.xml><?xml version="1.0" encoding="utf-8"?>
+<file path=ppt/slides/slide25.xml><?xml version="1.0" encoding="utf-8"?>
 <p:sld xmlns:a="http://schemas.openxmlformats.org/drawingml/2006/main" xmlns:r="http://schemas.openxmlformats.org/officeDocument/2006/relationships" xmlns:p="http://schemas.openxmlformats.org/presentationml/2006/main">
   <p:cSld>
     <p:spTree>
@@ -7566,7 +7900,7 @@
 </p:sld>
 </file>
 
-<file path=ppt/slides/slide22.xml><?xml version="1.0" encoding="utf-8"?>
+<file path=ppt/slides/slide26.xml><?xml version="1.0" encoding="utf-8"?>
 <p:sld xmlns:a="http://schemas.openxmlformats.org/drawingml/2006/main" xmlns:r="http://schemas.openxmlformats.org/officeDocument/2006/relationships" xmlns:p="http://schemas.openxmlformats.org/presentationml/2006/main">
   <p:cSld>
     <p:spTree>
@@ -7715,7 +8049,7 @@
 </p:sld>
 </file>
 
-<file path=ppt/slides/slide23.xml><?xml version="1.0" encoding="utf-8"?>
+<file path=ppt/slides/slide27.xml><?xml version="1.0" encoding="utf-8"?>
 <p:sld xmlns:a="http://schemas.openxmlformats.org/drawingml/2006/main" xmlns:r="http://schemas.openxmlformats.org/officeDocument/2006/relationships" xmlns:p="http://schemas.openxmlformats.org/presentationml/2006/main">
   <p:cSld>
     <p:spTree>
@@ -7777,7 +8111,7 @@
 </p:sld>
 </file>
 
-<file path=ppt/slides/slide24.xml><?xml version="1.0" encoding="utf-8"?>
+<file path=ppt/slides/slide28.xml><?xml version="1.0" encoding="utf-8"?>
 <p:sld xmlns:a="http://schemas.openxmlformats.org/drawingml/2006/main" xmlns:r="http://schemas.openxmlformats.org/officeDocument/2006/relationships" xmlns:p="http://schemas.openxmlformats.org/presentationml/2006/main">
   <p:cSld>
     <p:spTree>
@@ -7887,7 +8221,7 @@
 </p:sld>
 </file>
 
-<file path=ppt/slides/slide25.xml><?xml version="1.0" encoding="utf-8"?>
+<file path=ppt/slides/slide29.xml><?xml version="1.0" encoding="utf-8"?>
 <p:sld xmlns:a="http://schemas.openxmlformats.org/drawingml/2006/main" xmlns:r="http://schemas.openxmlformats.org/officeDocument/2006/relationships" xmlns:p="http://schemas.openxmlformats.org/presentationml/2006/main">
   <p:cSld>
     <p:spTree>
@@ -7956,7 +8290,7 @@
 </p:sld>
 </file>
 
-<file path=ppt/slides/slide26.xml><?xml version="1.0" encoding="utf-8"?>
+<file path=ppt/slides/slide3.xml><?xml version="1.0" encoding="utf-8"?>
 <p:sld xmlns:a="http://schemas.openxmlformats.org/drawingml/2006/main" xmlns:r="http://schemas.openxmlformats.org/officeDocument/2006/relationships" xmlns:p="http://schemas.openxmlformats.org/presentationml/2006/main">
   <p:cSld>
     <p:spTree>
@@ -7984,7 +8318,7 @@
               <a:rPr lang="en-US">
                 <a:sym typeface="+mn-ea"/>
               </a:rPr>
-              <a:t>Keys in Relationships</a:t>
+              <a:t>Importance of Data Models</a:t>
             </a:r>
             <a:endParaRPr lang="en-US"/>
           </a:p>
@@ -8000,20 +8334,68 @@
             <p:ph idx="1"/>
           </p:nvPr>
         </p:nvSpPr>
-        <p:spPr/>
-        <p:txBody>
-          <a:bodyPr/>
-          <a:p>
-            <a:r>
-              <a:rPr lang="en-US"/>
-              <a:t>Primary Key (PK): A unique identifier for a record in a table.</a:t>
-            </a:r>
-            <a:endParaRPr lang="en-US"/>
-          </a:p>
-          <a:p>
-            <a:r>
-              <a:rPr lang="en-US"/>
-              <a:t>Foreign Key (FK): A field in one table that uniquely identifies a row of another table. It is used to establish and enforce a link between the data in the two tables.</a:t>
+        <p:spPr>
+          <a:xfrm>
+            <a:off x="838200" y="1825625"/>
+            <a:ext cx="10921365" cy="4351655"/>
+          </a:xfrm>
+        </p:spPr>
+        <p:txBody>
+          <a:bodyPr>
+            <a:normAutofit lnSpcReduction="10000"/>
+          </a:bodyPr>
+          <a:p>
+            <a:r>
+              <a:rPr lang="en-US" b="1"/>
+              <a:t>Data Organization</a:t>
+            </a:r>
+            <a:r>
+              <a:rPr lang="en-US"/>
+              <a:t>: Helps in organizing and structuring data efficiently.</a:t>
+            </a:r>
+            <a:endParaRPr lang="en-US"/>
+          </a:p>
+          <a:p>
+            <a:r>
+              <a:rPr lang="en-US" b="1"/>
+              <a:t>Data Integrity</a:t>
+            </a:r>
+            <a:r>
+              <a:rPr lang="en-US"/>
+              <a:t>: Ensures the accuracy and consistency of data through constraints and rules.</a:t>
+            </a:r>
+            <a:endParaRPr lang="en-US"/>
+          </a:p>
+          <a:p>
+            <a:r>
+              <a:rPr lang="en-US" b="1"/>
+              <a:t>Data Access</a:t>
+            </a:r>
+            <a:r>
+              <a:rPr lang="en-US"/>
+              <a:t>: Facilitates easy and efficient access to data for queries and transactions.</a:t>
+            </a:r>
+            <a:endParaRPr lang="en-US"/>
+          </a:p>
+          <a:p>
+            <a:r>
+              <a:rPr lang="en-US" b="1"/>
+              <a:t>Scalability</a:t>
+            </a:r>
+            <a:r>
+              <a:rPr lang="en-US"/>
+              <a:t>: Allows databases to scale and handle large volumes of data.</a:t>
+            </a:r>
+            <a:endParaRPr lang="en-US"/>
+          </a:p>
+          <a:p>
+            <a:r>
+              <a:rPr lang="en-US" b="1"/>
+              <a:t>Maintenance</a:t>
+            </a:r>
+            <a:r>
+              <a:rPr lang="en-US"/>
+              <a:t>: Simplifies data management and maintenance over time.</a:t>
             </a:r>
             <a:endParaRPr lang="en-US"/>
           </a:p>
@@ -8027,7 +8409,7 @@
 </p:sld>
 </file>
 
-<file path=ppt/slides/slide27.xml><?xml version="1.0" encoding="utf-8"?>
+<file path=ppt/slides/slide30.xml><?xml version="1.0" encoding="utf-8"?>
 <p:sld xmlns:a="http://schemas.openxmlformats.org/drawingml/2006/main" xmlns:r="http://schemas.openxmlformats.org/officeDocument/2006/relationships" xmlns:p="http://schemas.openxmlformats.org/presentationml/2006/main">
   <p:cSld>
     <p:spTree>
@@ -8049,13 +8431,13 @@
         </p:nvSpPr>
         <p:spPr/>
         <p:txBody>
-          <a:bodyPr>
-            <a:normAutofit/>
-          </a:bodyPr>
-          <a:p>
-            <a:r>
-              <a:rPr lang="en-US"/>
-              <a:t>One-to-Many (1:N) Relationship</a:t>
+          <a:bodyPr/>
+          <a:p>
+            <a:r>
+              <a:rPr lang="en-US">
+                <a:sym typeface="+mn-ea"/>
+              </a:rPr>
+              <a:t>Keys in Relationships</a:t>
             </a:r>
             <a:endParaRPr lang="en-US"/>
           </a:p>
@@ -8077,7 +8459,14 @@
           <a:p>
             <a:r>
               <a:rPr lang="en-US"/>
-              <a:t>In a one-to-many relationship, a record in one table (the "one" side) can be related to multiple records in another table (the "many" side), but each record in the "many" side is related to only one record in the "one" side. This is the most common type of relationship.</a:t>
+              <a:t>Primary Key (PK): A unique identifier for a record in a table.</a:t>
+            </a:r>
+            <a:endParaRPr lang="en-US"/>
+          </a:p>
+          <a:p>
+            <a:r>
+              <a:rPr lang="en-US"/>
+              <a:t>Foreign Key (FK): A field in one table that uniquely identifies a row of another table. It is used to establish and enforce a link between the data in the two tables.</a:t>
             </a:r>
             <a:endParaRPr lang="en-US"/>
           </a:p>
@@ -8091,7 +8480,7 @@
 </p:sld>
 </file>
 
-<file path=ppt/slides/slide28.xml><?xml version="1.0" encoding="utf-8"?>
+<file path=ppt/slides/slide31.xml><?xml version="1.0" encoding="utf-8"?>
 <p:sld xmlns:a="http://schemas.openxmlformats.org/drawingml/2006/main" xmlns:r="http://schemas.openxmlformats.org/officeDocument/2006/relationships" xmlns:p="http://schemas.openxmlformats.org/presentationml/2006/main">
   <p:cSld>
     <p:spTree>
@@ -8114,135 +8503,34 @@
         <p:spPr/>
         <p:txBody>
           <a:bodyPr>
-            <a:normAutofit fontScale="90000"/>
-          </a:bodyPr>
-          <a:p>
-            <a:r>
-              <a:rPr lang="ar-EG" altLang="en-US"/>
-              <a:t>1</a:t>
-            </a:r>
-            <a:r>
-              <a:rPr lang="en-US" altLang="ar-EG"/>
-              <a:t>:N relationship example: </a:t>
-            </a:r>
-            <a:r>
-              <a:rPr lang="en-US">
-                <a:sym typeface="+mn-ea"/>
-              </a:rPr>
-              <a:t>two tables, Department and Employee.</a:t>
-            </a:r>
-            <a:r>
-              <a:rPr lang="en-US" altLang="ar-EG"/>
-              <a:t> </a:t>
-            </a:r>
-            <a:endParaRPr lang="en-US" altLang="ar-EG"/>
-          </a:p>
-        </p:txBody>
-      </p:sp>
-      <p:sp>
-        <p:nvSpPr>
-          <p:cNvPr id="3" name="Content Placeholder 2"/>
-          <p:cNvSpPr>
-            <a:spLocks noGrp="1"/>
-          </p:cNvSpPr>
-          <p:nvPr>
-            <p:ph idx="1"/>
-          </p:nvPr>
-        </p:nvSpPr>
-        <p:spPr>
-          <a:xfrm>
-            <a:off x="838200" y="1825625"/>
-            <a:ext cx="10958830" cy="4826635"/>
-          </a:xfrm>
-        </p:spPr>
-        <p:txBody>
-          <a:bodyPr>
             <a:normAutofit/>
           </a:bodyPr>
           <a:p>
             <a:r>
               <a:rPr lang="en-US"/>
-              <a:t>Department table: Contains information about departments.</a:t>
-            </a:r>
-            <a:endParaRPr lang="en-US"/>
-          </a:p>
-          <a:p>
-            <a:r>
-              <a:rPr lang="en-US"/>
-              <a:t>Employee table: Contains information about employees.</a:t>
-            </a:r>
-            <a:endParaRPr lang="en-US"/>
-          </a:p>
-          <a:p>
-            <a:r>
-              <a:rPr lang="en-US"/>
-              <a:t>Each department can have multiple employees, but each employee belongs to only one department.</a:t>
-            </a:r>
-            <a:endParaRPr lang="en-US"/>
-          </a:p>
-          <a:p>
-            <a:pPr marL="0" indent="0">
-              <a:buNone/>
-            </a:pPr>
-            <a:endParaRPr lang="en-US"/>
-          </a:p>
-          <a:p>
-            <a:pPr marL="457200" lvl="1" indent="0">
-              <a:buNone/>
-            </a:pPr>
-            <a:r>
-              <a:rPr lang="en-US"/>
-              <a:t>Department                 			Employee</a:t>
-            </a:r>
-            <a:endParaRPr lang="en-US"/>
-          </a:p>
-          <a:p>
-            <a:pPr marL="457200" lvl="1" indent="0">
-              <a:buNone/>
-            </a:pPr>
-            <a:r>
-              <a:rPr lang="en-US"/>
-              <a:t>-----------                				-----------</a:t>
-            </a:r>
-            <a:endParaRPr lang="en-US"/>
-          </a:p>
-          <a:p>
-            <a:pPr marL="457200" lvl="1" indent="0">
-              <a:buNone/>
-            </a:pPr>
-            <a:r>
-              <a:rPr lang="en-US"/>
-              <a:t>DepartmentID (PK)          			EmployeeID (PK)</a:t>
-            </a:r>
-            <a:endParaRPr lang="en-US"/>
-          </a:p>
-          <a:p>
-            <a:pPr marL="457200" lvl="1" indent="0">
-              <a:buNone/>
-            </a:pPr>
-            <a:r>
-              <a:rPr lang="en-US"/>
-              <a:t>DepartmentName             			Name</a:t>
-            </a:r>
-            <a:endParaRPr lang="en-US"/>
-          </a:p>
-          <a:p>
-            <a:pPr marL="457200" lvl="1" indent="0">
-              <a:buNone/>
-            </a:pPr>
-            <a:r>
-              <a:rPr lang="en-US"/>
-              <a:t>                           				DateOfBirth</a:t>
-            </a:r>
-            <a:endParaRPr lang="en-US"/>
-          </a:p>
-          <a:p>
-            <a:pPr marL="457200" lvl="1" indent="0">
-              <a:buNone/>
-            </a:pPr>
-            <a:r>
-              <a:rPr lang="en-US"/>
-              <a:t>                           				DepartmentID (FK)</a:t>
+              <a:t>One-to-Many (1:N) Relationship</a:t>
+            </a:r>
+            <a:endParaRPr lang="en-US"/>
+          </a:p>
+        </p:txBody>
+      </p:sp>
+      <p:sp>
+        <p:nvSpPr>
+          <p:cNvPr id="3" name="Content Placeholder 2"/>
+          <p:cNvSpPr>
+            <a:spLocks noGrp="1"/>
+          </p:cNvSpPr>
+          <p:nvPr>
+            <p:ph idx="1"/>
+          </p:nvPr>
+        </p:nvSpPr>
+        <p:spPr/>
+        <p:txBody>
+          <a:bodyPr/>
+          <a:p>
+            <a:r>
+              <a:rPr lang="en-US"/>
+              <a:t>In a one-to-many relationship, a record in one table (the "one" side) can be related to multiple records in another table (the "many" side), but each record in the "many" side is related to only one record in the "one" side. This is the most common type of relationship.</a:t>
             </a:r>
             <a:endParaRPr lang="en-US"/>
           </a:p>
@@ -8256,7 +8544,172 @@
 </p:sld>
 </file>
 
-<file path=ppt/slides/slide29.xml><?xml version="1.0" encoding="utf-8"?>
+<file path=ppt/slides/slide32.xml><?xml version="1.0" encoding="utf-8"?>
+<p:sld xmlns:a="http://schemas.openxmlformats.org/drawingml/2006/main" xmlns:r="http://schemas.openxmlformats.org/officeDocument/2006/relationships" xmlns:p="http://schemas.openxmlformats.org/presentationml/2006/main">
+  <p:cSld>
+    <p:spTree>
+      <p:nvGrpSpPr>
+        <p:cNvPr id="1" name=""/>
+        <p:cNvGrpSpPr/>
+        <p:nvPr/>
+      </p:nvGrpSpPr>
+      <p:grpSpPr/>
+      <p:sp>
+        <p:nvSpPr>
+          <p:cNvPr id="2" name="Title 1"/>
+          <p:cNvSpPr>
+            <a:spLocks noGrp="1"/>
+          </p:cNvSpPr>
+          <p:nvPr>
+            <p:ph type="title"/>
+          </p:nvPr>
+        </p:nvSpPr>
+        <p:spPr/>
+        <p:txBody>
+          <a:bodyPr>
+            <a:normAutofit fontScale="90000"/>
+          </a:bodyPr>
+          <a:p>
+            <a:r>
+              <a:rPr lang="ar-EG" altLang="en-US"/>
+              <a:t>1</a:t>
+            </a:r>
+            <a:r>
+              <a:rPr lang="en-US" altLang="ar-EG"/>
+              <a:t>:N relationship example: </a:t>
+            </a:r>
+            <a:r>
+              <a:rPr lang="en-US">
+                <a:sym typeface="+mn-ea"/>
+              </a:rPr>
+              <a:t>two tables, Department and Employee.</a:t>
+            </a:r>
+            <a:r>
+              <a:rPr lang="en-US" altLang="ar-EG"/>
+              <a:t> </a:t>
+            </a:r>
+            <a:endParaRPr lang="en-US" altLang="ar-EG"/>
+          </a:p>
+        </p:txBody>
+      </p:sp>
+      <p:sp>
+        <p:nvSpPr>
+          <p:cNvPr id="3" name="Content Placeholder 2"/>
+          <p:cNvSpPr>
+            <a:spLocks noGrp="1"/>
+          </p:cNvSpPr>
+          <p:nvPr>
+            <p:ph idx="1"/>
+          </p:nvPr>
+        </p:nvSpPr>
+        <p:spPr>
+          <a:xfrm>
+            <a:off x="838200" y="1825625"/>
+            <a:ext cx="10958830" cy="4826635"/>
+          </a:xfrm>
+        </p:spPr>
+        <p:txBody>
+          <a:bodyPr>
+            <a:normAutofit/>
+          </a:bodyPr>
+          <a:p>
+            <a:r>
+              <a:rPr lang="en-US"/>
+              <a:t>Department table: Contains information about departments.</a:t>
+            </a:r>
+            <a:endParaRPr lang="en-US"/>
+          </a:p>
+          <a:p>
+            <a:r>
+              <a:rPr lang="en-US"/>
+              <a:t>Employee table: Contains information about employees.</a:t>
+            </a:r>
+            <a:endParaRPr lang="en-US"/>
+          </a:p>
+          <a:p>
+            <a:r>
+              <a:rPr lang="en-US"/>
+              <a:t>Each department can have multiple employees, but each employee belongs to only one department.</a:t>
+            </a:r>
+            <a:endParaRPr lang="en-US"/>
+          </a:p>
+          <a:p>
+            <a:pPr marL="0" indent="0">
+              <a:buNone/>
+            </a:pPr>
+            <a:endParaRPr lang="en-US"/>
+          </a:p>
+          <a:p>
+            <a:pPr marL="457200" lvl="1" indent="0">
+              <a:buNone/>
+            </a:pPr>
+            <a:r>
+              <a:rPr lang="en-US"/>
+              <a:t>Department                 			Employee</a:t>
+            </a:r>
+            <a:endParaRPr lang="en-US"/>
+          </a:p>
+          <a:p>
+            <a:pPr marL="457200" lvl="1" indent="0">
+              <a:buNone/>
+            </a:pPr>
+            <a:r>
+              <a:rPr lang="en-US"/>
+              <a:t>-----------                				-----------</a:t>
+            </a:r>
+            <a:endParaRPr lang="en-US"/>
+          </a:p>
+          <a:p>
+            <a:pPr marL="457200" lvl="1" indent="0">
+              <a:buNone/>
+            </a:pPr>
+            <a:r>
+              <a:rPr lang="en-US"/>
+              <a:t>DepartmentID (PK)          			EmployeeID (PK)</a:t>
+            </a:r>
+            <a:endParaRPr lang="en-US"/>
+          </a:p>
+          <a:p>
+            <a:pPr marL="457200" lvl="1" indent="0">
+              <a:buNone/>
+            </a:pPr>
+            <a:r>
+              <a:rPr lang="en-US"/>
+              <a:t>DepartmentName             			Name</a:t>
+            </a:r>
+            <a:endParaRPr lang="en-US"/>
+          </a:p>
+          <a:p>
+            <a:pPr marL="457200" lvl="1" indent="0">
+              <a:buNone/>
+            </a:pPr>
+            <a:r>
+              <a:rPr lang="en-US"/>
+              <a:t>                           				DateOfBirth</a:t>
+            </a:r>
+            <a:endParaRPr lang="en-US"/>
+          </a:p>
+          <a:p>
+            <a:pPr marL="457200" lvl="1" indent="0">
+              <a:buNone/>
+            </a:pPr>
+            <a:r>
+              <a:rPr lang="en-US"/>
+              <a:t>                           				DepartmentID (FK)</a:t>
+            </a:r>
+            <a:endParaRPr lang="en-US"/>
+          </a:p>
+        </p:txBody>
+      </p:sp>
+    </p:spTree>
+  </p:cSld>
+  <p:clrMapOvr>
+    <a:masterClrMapping/>
+  </p:clrMapOvr>
+</p:sld>
+</file>
+
+<file path=ppt/slides/slide33.xml><?xml version="1.0" encoding="utf-8"?>
 <p:sld xmlns:a="http://schemas.openxmlformats.org/drawingml/2006/main" xmlns:r="http://schemas.openxmlformats.org/officeDocument/2006/relationships" xmlns:p="http://schemas.openxmlformats.org/presentationml/2006/main">
   <p:cSld>
     <p:spTree>
@@ -8323,126 +8776,7 @@
 </p:sld>
 </file>
 
-<file path=ppt/slides/slide3.xml><?xml version="1.0" encoding="utf-8"?>
-<p:sld xmlns:a="http://schemas.openxmlformats.org/drawingml/2006/main" xmlns:r="http://schemas.openxmlformats.org/officeDocument/2006/relationships" xmlns:p="http://schemas.openxmlformats.org/presentationml/2006/main">
-  <p:cSld>
-    <p:spTree>
-      <p:nvGrpSpPr>
-        <p:cNvPr id="1" name=""/>
-        <p:cNvGrpSpPr/>
-        <p:nvPr/>
-      </p:nvGrpSpPr>
-      <p:grpSpPr/>
-      <p:sp>
-        <p:nvSpPr>
-          <p:cNvPr id="2" name="Title 1"/>
-          <p:cNvSpPr>
-            <a:spLocks noGrp="1"/>
-          </p:cNvSpPr>
-          <p:nvPr>
-            <p:ph type="title"/>
-          </p:nvPr>
-        </p:nvSpPr>
-        <p:spPr/>
-        <p:txBody>
-          <a:bodyPr/>
-          <a:p>
-            <a:r>
-              <a:rPr lang="en-US">
-                <a:sym typeface="+mn-ea"/>
-              </a:rPr>
-              <a:t>Importance of Data Models</a:t>
-            </a:r>
-            <a:endParaRPr lang="en-US"/>
-          </a:p>
-        </p:txBody>
-      </p:sp>
-      <p:sp>
-        <p:nvSpPr>
-          <p:cNvPr id="3" name="Content Placeholder 2"/>
-          <p:cNvSpPr>
-            <a:spLocks noGrp="1"/>
-          </p:cNvSpPr>
-          <p:nvPr>
-            <p:ph idx="1"/>
-          </p:nvPr>
-        </p:nvSpPr>
-        <p:spPr>
-          <a:xfrm>
-            <a:off x="838200" y="1825625"/>
-            <a:ext cx="10921365" cy="4351655"/>
-          </a:xfrm>
-        </p:spPr>
-        <p:txBody>
-          <a:bodyPr>
-            <a:normAutofit lnSpcReduction="10000"/>
-          </a:bodyPr>
-          <a:p>
-            <a:r>
-              <a:rPr lang="en-US" b="1"/>
-              <a:t>Data Organization</a:t>
-            </a:r>
-            <a:r>
-              <a:rPr lang="en-US"/>
-              <a:t>: Helps in organizing and structuring data efficiently.</a:t>
-            </a:r>
-            <a:endParaRPr lang="en-US"/>
-          </a:p>
-          <a:p>
-            <a:r>
-              <a:rPr lang="en-US" b="1"/>
-              <a:t>Data Integrity</a:t>
-            </a:r>
-            <a:r>
-              <a:rPr lang="en-US"/>
-              <a:t>: Ensures the accuracy and consistency of data through constraints and rules.</a:t>
-            </a:r>
-            <a:endParaRPr lang="en-US"/>
-          </a:p>
-          <a:p>
-            <a:r>
-              <a:rPr lang="en-US" b="1"/>
-              <a:t>Data Access</a:t>
-            </a:r>
-            <a:r>
-              <a:rPr lang="en-US"/>
-              <a:t>: Facilitates easy and efficient access to data for queries and transactions.</a:t>
-            </a:r>
-            <a:endParaRPr lang="en-US"/>
-          </a:p>
-          <a:p>
-            <a:r>
-              <a:rPr lang="en-US" b="1"/>
-              <a:t>Scalability</a:t>
-            </a:r>
-            <a:r>
-              <a:rPr lang="en-US"/>
-              <a:t>: Allows databases to scale and handle large volumes of data.</a:t>
-            </a:r>
-            <a:endParaRPr lang="en-US"/>
-          </a:p>
-          <a:p>
-            <a:r>
-              <a:rPr lang="en-US" b="1"/>
-              <a:t>Maintenance</a:t>
-            </a:r>
-            <a:r>
-              <a:rPr lang="en-US"/>
-              <a:t>: Simplifies data management and maintenance over time.</a:t>
-            </a:r>
-            <a:endParaRPr lang="en-US"/>
-          </a:p>
-        </p:txBody>
-      </p:sp>
-    </p:spTree>
-  </p:cSld>
-  <p:clrMapOvr>
-    <a:masterClrMapping/>
-  </p:clrMapOvr>
-</p:sld>
-</file>
-
-<file path=ppt/slides/slide30.xml><?xml version="1.0" encoding="utf-8"?>
+<file path=ppt/slides/slide34.xml><?xml version="1.0" encoding="utf-8"?>
 <p:sld xmlns:a="http://schemas.openxmlformats.org/drawingml/2006/main" xmlns:r="http://schemas.openxmlformats.org/officeDocument/2006/relationships" xmlns:p="http://schemas.openxmlformats.org/presentationml/2006/main">
   <p:cSld>
     <p:spTree>
@@ -8484,7 +8818,7 @@
 </p:sld>
 </file>
 
-<file path=ppt/slides/slide31.xml><?xml version="1.0" encoding="utf-8"?>
+<file path=ppt/slides/slide35.xml><?xml version="1.0" encoding="utf-8"?>
 <p:sld xmlns:a="http://schemas.openxmlformats.org/drawingml/2006/main" xmlns:r="http://schemas.openxmlformats.org/officeDocument/2006/relationships" xmlns:p="http://schemas.openxmlformats.org/presentationml/2006/main">
   <p:cSld>
     <p:spTree>
@@ -8558,7 +8892,7 @@
 </p:sld>
 </file>
 
-<file path=ppt/slides/slide32.xml><?xml version="1.0" encoding="utf-8"?>
+<file path=ppt/slides/slide36.xml><?xml version="1.0" encoding="utf-8"?>
 <p:sld xmlns:a="http://schemas.openxmlformats.org/drawingml/2006/main" xmlns:r="http://schemas.openxmlformats.org/officeDocument/2006/relationships" xmlns:p="http://schemas.openxmlformats.org/presentationml/2006/main">
   <p:cSld>
     <p:spTree>
@@ -8622,7 +8956,7 @@
 </p:sld>
 </file>
 
-<file path=ppt/slides/slide33.xml><?xml version="1.0" encoding="utf-8"?>
+<file path=ppt/slides/slide37.xml><?xml version="1.0" encoding="utf-8"?>
 <p:sld xmlns:a="http://schemas.openxmlformats.org/drawingml/2006/main" xmlns:r="http://schemas.openxmlformats.org/officeDocument/2006/relationships" xmlns:p="http://schemas.openxmlformats.org/presentationml/2006/main">
   <p:cSld>
     <p:spTree>
@@ -8684,7 +9018,7 @@
 </p:sld>
 </file>
 
-<file path=ppt/slides/slide34.xml><?xml version="1.0" encoding="utf-8"?>
+<file path=ppt/slides/slide38.xml><?xml version="1.0" encoding="utf-8"?>
 <p:sld xmlns:a="http://schemas.openxmlformats.org/drawingml/2006/main" xmlns:r="http://schemas.openxmlformats.org/officeDocument/2006/relationships" xmlns:p="http://schemas.openxmlformats.org/presentationml/2006/main">
   <p:cSld>
     <p:spTree>
@@ -8726,350 +9060,6 @@
 </p:sld>
 </file>
 
-<file path=ppt/slides/slide35.xml><?xml version="1.0" encoding="utf-8"?>
-<p:sld xmlns:a="http://schemas.openxmlformats.org/drawingml/2006/main" xmlns:r="http://schemas.openxmlformats.org/officeDocument/2006/relationships" xmlns:p="http://schemas.openxmlformats.org/presentationml/2006/main">
-  <p:cSld>
-    <p:spTree>
-      <p:nvGrpSpPr>
-        <p:cNvPr id="1" name=""/>
-        <p:cNvGrpSpPr/>
-        <p:nvPr/>
-      </p:nvGrpSpPr>
-      <p:grpSpPr/>
-      <p:sp>
-        <p:nvSpPr>
-          <p:cNvPr id="2" name="Title 1"/>
-          <p:cNvSpPr>
-            <a:spLocks noGrp="1"/>
-          </p:cNvSpPr>
-          <p:nvPr>
-            <p:ph type="title"/>
-          </p:nvPr>
-        </p:nvSpPr>
-        <p:spPr/>
-        <p:txBody>
-          <a:bodyPr/>
-          <a:p>
-            <a:r>
-              <a:rPr lang="en-US"/>
-              <a:t>Common data models</a:t>
-            </a:r>
-            <a:endParaRPr lang="en-US"/>
-          </a:p>
-        </p:txBody>
-      </p:sp>
-      <p:sp>
-        <p:nvSpPr>
-          <p:cNvPr id="3" name="Content Placeholder 2"/>
-          <p:cNvSpPr>
-            <a:spLocks noGrp="1"/>
-          </p:cNvSpPr>
-          <p:nvPr>
-            <p:ph idx="1"/>
-          </p:nvPr>
-        </p:nvSpPr>
-        <p:spPr/>
-        <p:txBody>
-          <a:bodyPr/>
-          <a:p>
-            <a:r>
-              <a:rPr lang="en-US"/>
-              <a:t>Hierarchical Data Model </a:t>
-            </a:r>
-            <a:endParaRPr lang="en-US"/>
-          </a:p>
-          <a:p>
-            <a:r>
-              <a:rPr lang="en-US"/>
-              <a:t>Relational Data Model</a:t>
-            </a:r>
-            <a:endParaRPr lang="en-US"/>
-          </a:p>
-          <a:p>
-            <a:r>
-              <a:rPr lang="en-US"/>
-              <a:t>Entity-Relationship Model (ER Model)</a:t>
-            </a:r>
-            <a:endParaRPr lang="en-US"/>
-          </a:p>
-          <a:p>
-            <a:r>
-              <a:rPr lang="en-US" b="1"/>
-              <a:t>Document Data Model</a:t>
-            </a:r>
-            <a:endParaRPr lang="en-US" b="1"/>
-          </a:p>
-          <a:p>
-            <a:r>
-              <a:rPr lang="en-US"/>
-              <a:t>Key-Value Data Mode</a:t>
-            </a:r>
-            <a:endParaRPr lang="en-US"/>
-          </a:p>
-          <a:p>
-            <a:r>
-              <a:rPr lang="en-US"/>
-              <a:t>Graph Data Model</a:t>
-            </a:r>
-            <a:endParaRPr lang="en-US"/>
-          </a:p>
-          <a:p>
-            <a:r>
-              <a:rPr lang="en-US"/>
-              <a:t>Multi-Model Databases</a:t>
-            </a:r>
-            <a:endParaRPr lang="en-US"/>
-          </a:p>
-        </p:txBody>
-      </p:sp>
-    </p:spTree>
-  </p:cSld>
-  <p:clrMapOvr>
-    <a:masterClrMapping/>
-  </p:clrMapOvr>
-</p:sld>
-</file>
-
-<file path=ppt/slides/slide36.xml><?xml version="1.0" encoding="utf-8"?>
-<p:sld xmlns:a="http://schemas.openxmlformats.org/drawingml/2006/main" xmlns:r="http://schemas.openxmlformats.org/officeDocument/2006/relationships" xmlns:p="http://schemas.openxmlformats.org/presentationml/2006/main">
-  <p:cSld>
-    <p:spTree>
-      <p:nvGrpSpPr>
-        <p:cNvPr id="1" name=""/>
-        <p:cNvGrpSpPr/>
-        <p:nvPr/>
-      </p:nvGrpSpPr>
-      <p:grpSpPr/>
-      <p:sp>
-        <p:nvSpPr>
-          <p:cNvPr id="2" name="Title 1"/>
-          <p:cNvSpPr>
-            <a:spLocks noGrp="1"/>
-          </p:cNvSpPr>
-          <p:nvPr>
-            <p:ph type="title"/>
-          </p:nvPr>
-        </p:nvSpPr>
-        <p:spPr/>
-        <p:txBody>
-          <a:bodyPr/>
-          <a:p>
-            <a:r>
-              <a:rPr lang="en-US"/>
-              <a:t>The Document Data Model </a:t>
-            </a:r>
-            <a:endParaRPr lang="en-US"/>
-          </a:p>
-        </p:txBody>
-      </p:sp>
-      <p:sp>
-        <p:nvSpPr>
-          <p:cNvPr id="3" name="Content Placeholder 2"/>
-          <p:cNvSpPr>
-            <a:spLocks noGrp="1"/>
-          </p:cNvSpPr>
-          <p:nvPr>
-            <p:ph idx="1"/>
-          </p:nvPr>
-        </p:nvSpPr>
-        <p:spPr/>
-        <p:txBody>
-          <a:bodyPr/>
-          <a:p>
-            <a:r>
-              <a:rPr lang="en-US"/>
-              <a:t>The Document Data Model is a type of NoSQL database model that is designed for storing, retrieving, and managing semi-structured or structured data as documents.</a:t>
-            </a:r>
-            <a:endParaRPr lang="en-US"/>
-          </a:p>
-        </p:txBody>
-      </p:sp>
-    </p:spTree>
-  </p:cSld>
-  <p:clrMapOvr>
-    <a:masterClrMapping/>
-  </p:clrMapOvr>
-</p:sld>
-</file>
-
-<file path=ppt/slides/slide37.xml><?xml version="1.0" encoding="utf-8"?>
-<p:sld xmlns:a="http://schemas.openxmlformats.org/drawingml/2006/main" xmlns:r="http://schemas.openxmlformats.org/officeDocument/2006/relationships" xmlns:p="http://schemas.openxmlformats.org/presentationml/2006/main">
-  <p:cSld>
-    <p:spTree>
-      <p:nvGrpSpPr>
-        <p:cNvPr id="1" name=""/>
-        <p:cNvGrpSpPr/>
-        <p:nvPr/>
-      </p:nvGrpSpPr>
-      <p:grpSpPr/>
-      <p:sp>
-        <p:nvSpPr>
-          <p:cNvPr id="2" name="Title 1"/>
-          <p:cNvSpPr>
-            <a:spLocks noGrp="1"/>
-          </p:cNvSpPr>
-          <p:nvPr>
-            <p:ph type="title"/>
-          </p:nvPr>
-        </p:nvSpPr>
-        <p:spPr/>
-        <p:txBody>
-          <a:bodyPr/>
-          <a:p>
-            <a:r>
-              <a:rPr lang="en-US"/>
-              <a:t>Key aspects of the Document Data Model</a:t>
-            </a:r>
-            <a:endParaRPr lang="en-US"/>
-          </a:p>
-        </p:txBody>
-      </p:sp>
-      <p:sp>
-        <p:nvSpPr>
-          <p:cNvPr id="3" name="Content Placeholder 2"/>
-          <p:cNvSpPr>
-            <a:spLocks noGrp="1"/>
-          </p:cNvSpPr>
-          <p:nvPr>
-            <p:ph idx="1"/>
-          </p:nvPr>
-        </p:nvSpPr>
-        <p:spPr/>
-        <p:txBody>
-          <a:bodyPr>
-            <a:normAutofit/>
-          </a:bodyPr>
-          <a:p>
-            <a:r>
-              <a:rPr lang="en-US"/>
-              <a:t>Structure:</a:t>
-            </a:r>
-            <a:endParaRPr lang="en-US"/>
-          </a:p>
-          <a:p>
-            <a:pPr lvl="1"/>
-            <a:r>
-              <a:rPr lang="en-US"/>
-              <a:t>Documents are self-contained pieces of data that store information in a standard format, typically JSON (JavaScript Object Notation), BSON (Binary JSON), XML, or similar formats.</a:t>
-            </a:r>
-            <a:endParaRPr lang="en-US"/>
-          </a:p>
-          <a:p>
-            <a:pPr lvl="1"/>
-            <a:r>
-              <a:rPr lang="en-US"/>
-              <a:t>Each document is stored in the database as a unique record and does not require a fixed schema like traditional relational databases.</a:t>
-            </a:r>
-            <a:endParaRPr lang="en-US"/>
-          </a:p>
-          <a:p>
-            <a:pPr lvl="0"/>
-            <a:r>
-              <a:rPr lang="en-US"/>
-              <a:t>Tool: </a:t>
-            </a:r>
-            <a:endParaRPr lang="en-US"/>
-          </a:p>
-          <a:p>
-            <a:pPr lvl="1"/>
-            <a:r>
-              <a:rPr lang="en-US"/>
-              <a:t>MongoDB: A popular document database that uses BSON (Binary JSON) for storage. It is widely used for its scalability, flexibility, and ease of use.</a:t>
-            </a:r>
-            <a:endParaRPr lang="en-US"/>
-          </a:p>
-        </p:txBody>
-      </p:sp>
-    </p:spTree>
-  </p:cSld>
-  <p:clrMapOvr>
-    <a:masterClrMapping/>
-  </p:clrMapOvr>
-</p:sld>
-</file>
-
-<file path=ppt/slides/slide38.xml><?xml version="1.0" encoding="utf-8"?>
-<p:sld xmlns:a="http://schemas.openxmlformats.org/drawingml/2006/main" xmlns:r="http://schemas.openxmlformats.org/officeDocument/2006/relationships" xmlns:p="http://schemas.openxmlformats.org/presentationml/2006/main">
-  <p:cSld>
-    <p:spTree>
-      <p:nvGrpSpPr>
-        <p:cNvPr id="1" name=""/>
-        <p:cNvGrpSpPr/>
-        <p:nvPr/>
-      </p:nvGrpSpPr>
-      <p:grpSpPr/>
-      <p:sp>
-        <p:nvSpPr>
-          <p:cNvPr id="2" name="Title 1"/>
-          <p:cNvSpPr>
-            <a:spLocks noGrp="1"/>
-          </p:cNvSpPr>
-          <p:nvPr>
-            <p:ph type="title"/>
-          </p:nvPr>
-        </p:nvSpPr>
-        <p:spPr/>
-        <p:txBody>
-          <a:bodyPr>
-            <a:normAutofit fontScale="90000"/>
-          </a:bodyPr>
-          <a:p>
-            <a:r>
-              <a:rPr lang="en-US">
-                <a:sym typeface="+mn-ea"/>
-              </a:rPr>
-              <a:t>Key aspects of the Document Data Model (Cont.)</a:t>
-            </a:r>
-            <a:endParaRPr lang="en-US"/>
-          </a:p>
-        </p:txBody>
-      </p:sp>
-      <p:sp>
-        <p:nvSpPr>
-          <p:cNvPr id="3" name="Content Placeholder 2"/>
-          <p:cNvSpPr>
-            <a:spLocks noGrp="1"/>
-          </p:cNvSpPr>
-          <p:nvPr>
-            <p:ph idx="1"/>
-          </p:nvPr>
-        </p:nvSpPr>
-        <p:spPr/>
-        <p:txBody>
-          <a:bodyPr/>
-          <a:p>
-            <a:r>
-              <a:rPr lang="en-US"/>
-              <a:t>Use Cases:</a:t>
-            </a:r>
-            <a:endParaRPr lang="en-US"/>
-          </a:p>
-          <a:p>
-            <a:pPr lvl="1"/>
-            <a:r>
-              <a:rPr lang="en-US"/>
-              <a:t>Document databases are suitable for a wide range of applications, including content management systems, e-commerce platforms, real-time analytics, mobile apps, and more.</a:t>
-            </a:r>
-            <a:endParaRPr lang="en-US"/>
-          </a:p>
-          <a:p>
-            <a:pPr lvl="1"/>
-            <a:r>
-              <a:rPr lang="en-US"/>
-              <a:t>They are particularly useful in scenarios where data is semi-structured or where flexibility in data model is required.</a:t>
-            </a:r>
-            <a:endParaRPr lang="en-US"/>
-          </a:p>
-        </p:txBody>
-      </p:sp>
-    </p:spTree>
-  </p:cSld>
-  <p:clrMapOvr>
-    <a:masterClrMapping/>
-  </p:clrMapOvr>
-</p:sld>
-</file>
-
 <file path=ppt/slides/slide39.xml><?xml version="1.0" encoding="utf-8"?>
 <p:sld xmlns:a="http://schemas.openxmlformats.org/drawingml/2006/main" xmlns:r="http://schemas.openxmlformats.org/officeDocument/2006/relationships" xmlns:p="http://schemas.openxmlformats.org/presentationml/2006/main">
   <p:cSld>
@@ -9096,7 +9086,7 @@
           <a:p>
             <a:r>
               <a:rPr lang="en-US"/>
-              <a:t>JSON documents </a:t>
+              <a:t>Common data models</a:t>
             </a:r>
             <a:endParaRPr lang="en-US"/>
           </a:p>
@@ -9118,35 +9108,49 @@
           <a:p>
             <a:r>
               <a:rPr lang="en-US"/>
-              <a:t>JSON is a format for storing and transporting data.</a:t>
-            </a:r>
-            <a:endParaRPr lang="en-US"/>
-          </a:p>
-          <a:p>
-            <a:r>
-              <a:rPr lang="en-US"/>
-              <a:t>JSON stands for JavaScript Object Notation</a:t>
-            </a:r>
-            <a:endParaRPr lang="en-US"/>
-          </a:p>
-          <a:p>
-            <a:r>
-              <a:rPr lang="en-US"/>
-              <a:t>JSON is a lightweight data interchange format</a:t>
-            </a:r>
-            <a:endParaRPr lang="en-US"/>
-          </a:p>
-          <a:p>
-            <a:r>
-              <a:rPr lang="en-US"/>
-              <a:t>JSON is language independent</a:t>
-            </a:r>
-            <a:endParaRPr lang="en-US"/>
-          </a:p>
-          <a:p>
-            <a:r>
-              <a:rPr lang="en-US"/>
-              <a:t>JSON is "self-describing" and easy to understand</a:t>
+              <a:t>Hierarchical Data Model </a:t>
+            </a:r>
+            <a:endParaRPr lang="en-US"/>
+          </a:p>
+          <a:p>
+            <a:r>
+              <a:rPr lang="en-US"/>
+              <a:t>Relational Data Model</a:t>
+            </a:r>
+            <a:endParaRPr lang="en-US"/>
+          </a:p>
+          <a:p>
+            <a:r>
+              <a:rPr lang="en-US"/>
+              <a:t>Entity-Relationship Model (ER Model)</a:t>
+            </a:r>
+            <a:endParaRPr lang="en-US"/>
+          </a:p>
+          <a:p>
+            <a:r>
+              <a:rPr lang="en-US" b="1"/>
+              <a:t>Document Data Model</a:t>
+            </a:r>
+            <a:endParaRPr lang="en-US" b="1"/>
+          </a:p>
+          <a:p>
+            <a:r>
+              <a:rPr lang="en-US"/>
+              <a:t>Key-Value Data Mode</a:t>
+            </a:r>
+            <a:endParaRPr lang="en-US"/>
+          </a:p>
+          <a:p>
+            <a:r>
+              <a:rPr lang="en-US"/>
+              <a:t>Graph Data Model</a:t>
+            </a:r>
+            <a:endParaRPr lang="en-US"/>
+          </a:p>
+          <a:p>
+            <a:r>
+              <a:rPr lang="en-US"/>
+              <a:t>Multi-Model Databases</a:t>
             </a:r>
             <a:endParaRPr lang="en-US"/>
           </a:p>
@@ -9292,7 +9296,7 @@
           <a:p>
             <a:r>
               <a:rPr lang="en-US"/>
-              <a:t>JSON Example</a:t>
+              <a:t>The Document Data Model </a:t>
             </a:r>
             <a:endParaRPr lang="en-US"/>
           </a:p>
@@ -9312,72 +9316,9 @@
         <p:txBody>
           <a:bodyPr/>
           <a:p>
-            <a:pPr marL="0" indent="0">
-              <a:buNone/>
-            </a:pPr>
-            <a:r>
-              <a:rPr lang="en-US"/>
-              <a:t>{</a:t>
-            </a:r>
-            <a:endParaRPr lang="en-US"/>
-          </a:p>
-          <a:p>
-            <a:pPr marL="0" indent="0">
-              <a:buNone/>
-            </a:pPr>
-            <a:r>
-              <a:rPr lang="en-US"/>
-              <a:t>"employees":[</a:t>
-            </a:r>
-            <a:endParaRPr lang="en-US"/>
-          </a:p>
-          <a:p>
-            <a:pPr marL="0" indent="0">
-              <a:buNone/>
-            </a:pPr>
-            <a:r>
-              <a:rPr lang="en-US"/>
-              <a:t>  {"firstName":"John", "lastName":"Doe"},</a:t>
-            </a:r>
-            <a:endParaRPr lang="en-US"/>
-          </a:p>
-          <a:p>
-            <a:pPr marL="0" indent="0">
-              <a:buNone/>
-            </a:pPr>
-            <a:r>
-              <a:rPr lang="en-US"/>
-              <a:t>  {"firstName":"Anna", "lastName":"Smith"},</a:t>
-            </a:r>
-            <a:endParaRPr lang="en-US"/>
-          </a:p>
-          <a:p>
-            <a:pPr marL="0" indent="0">
-              <a:buNone/>
-            </a:pPr>
-            <a:r>
-              <a:rPr lang="en-US"/>
-              <a:t>  {"firstName":"Peter", "lastName":"Jones"}</a:t>
-            </a:r>
-            <a:endParaRPr lang="en-US"/>
-          </a:p>
-          <a:p>
-            <a:pPr marL="0" indent="0">
-              <a:buNone/>
-            </a:pPr>
-            <a:r>
-              <a:rPr lang="en-US"/>
-              <a:t>]</a:t>
-            </a:r>
-            <a:endParaRPr lang="en-US"/>
-          </a:p>
-          <a:p>
-            <a:pPr marL="0" indent="0">
-              <a:buNone/>
-            </a:pPr>
-            <a:r>
-              <a:rPr lang="en-US"/>
-              <a:t>}</a:t>
+            <a:r>
+              <a:rPr lang="en-US"/>
+              <a:t>The Document Data Model is a type of NoSQL database model that is designed for storing, retrieving, and managing semi-structured or structured data as documents.</a:t>
             </a:r>
             <a:endParaRPr lang="en-US"/>
           </a:p>
@@ -9417,7 +9358,7 @@
           <a:p>
             <a:r>
               <a:rPr lang="en-US"/>
-              <a:t>JSON Syntax Rules</a:t>
+              <a:t>Key aspects of the Document Data Model</a:t>
             </a:r>
             <a:endParaRPr lang="en-US"/>
           </a:p>
@@ -9435,32 +9376,45 @@
         </p:nvSpPr>
         <p:spPr/>
         <p:txBody>
-          <a:bodyPr/>
-          <a:p>
-            <a:r>
-              <a:rPr lang="en-US"/>
-              <a:t>Data is in name/value pairs</a:t>
-            </a:r>
-            <a:endParaRPr lang="en-US"/>
-          </a:p>
-          <a:p>
-            <a:r>
-              <a:rPr lang="en-US"/>
-              <a:t>Data is separated by commas</a:t>
-            </a:r>
-            <a:endParaRPr lang="en-US"/>
-          </a:p>
-          <a:p>
-            <a:r>
-              <a:rPr lang="en-US"/>
-              <a:t>Curly braces hold objects</a:t>
-            </a:r>
-            <a:endParaRPr lang="en-US"/>
-          </a:p>
-          <a:p>
-            <a:r>
-              <a:rPr lang="en-US"/>
-              <a:t>Square brackets hold arrays</a:t>
+          <a:bodyPr>
+            <a:normAutofit/>
+          </a:bodyPr>
+          <a:p>
+            <a:r>
+              <a:rPr lang="en-US"/>
+              <a:t>Structure:</a:t>
+            </a:r>
+            <a:endParaRPr lang="en-US"/>
+          </a:p>
+          <a:p>
+            <a:pPr lvl="1"/>
+            <a:r>
+              <a:rPr lang="en-US"/>
+              <a:t>Documents are self-contained pieces of data that store information in a standard format, typically JSON (JavaScript Object Notation), BSON (Binary JSON), XML, or similar formats.</a:t>
+            </a:r>
+            <a:endParaRPr lang="en-US"/>
+          </a:p>
+          <a:p>
+            <a:pPr lvl="1"/>
+            <a:r>
+              <a:rPr lang="en-US"/>
+              <a:t>Each document is stored in the database as a unique record and does not require a fixed schema like traditional relational databases.</a:t>
+            </a:r>
+            <a:endParaRPr lang="en-US"/>
+          </a:p>
+          <a:p>
+            <a:pPr lvl="0"/>
+            <a:r>
+              <a:rPr lang="en-US"/>
+              <a:t>Tool: </a:t>
+            </a:r>
+            <a:endParaRPr lang="en-US"/>
+          </a:p>
+          <a:p>
+            <a:pPr lvl="1"/>
+            <a:r>
+              <a:rPr lang="en-US"/>
+              <a:t>MongoDB: A popular document database that uses BSON (Binary JSON) for storage. It is widely used for its scalability, flexibility, and ease of use.</a:t>
             </a:r>
             <a:endParaRPr lang="en-US"/>
           </a:p>
@@ -9496,49 +9450,53 @@
         </p:nvSpPr>
         <p:spPr/>
         <p:txBody>
+          <a:bodyPr>
+            <a:normAutofit fontScale="90000"/>
+          </a:bodyPr>
+          <a:p>
+            <a:r>
+              <a:rPr lang="en-US">
+                <a:sym typeface="+mn-ea"/>
+              </a:rPr>
+              <a:t>Key aspects of the Document Data Model (Cont.)</a:t>
+            </a:r>
+            <a:endParaRPr lang="en-US"/>
+          </a:p>
+        </p:txBody>
+      </p:sp>
+      <p:sp>
+        <p:nvSpPr>
+          <p:cNvPr id="3" name="Content Placeholder 2"/>
+          <p:cNvSpPr>
+            <a:spLocks noGrp="1"/>
+          </p:cNvSpPr>
+          <p:nvPr>
+            <p:ph idx="1"/>
+          </p:nvPr>
+        </p:nvSpPr>
+        <p:spPr/>
+        <p:txBody>
           <a:bodyPr/>
           <a:p>
             <a:r>
               <a:rPr lang="en-US"/>
-              <a:t>JSON Data - A name and a Value</a:t>
-            </a:r>
-            <a:endParaRPr lang="en-US"/>
-          </a:p>
-        </p:txBody>
-      </p:sp>
-      <p:sp>
-        <p:nvSpPr>
-          <p:cNvPr id="3" name="Content Placeholder 2"/>
-          <p:cNvSpPr>
-            <a:spLocks noGrp="1"/>
-          </p:cNvSpPr>
-          <p:nvPr>
-            <p:ph idx="1"/>
-          </p:nvPr>
-        </p:nvSpPr>
-        <p:spPr/>
-        <p:txBody>
-          <a:bodyPr/>
-          <a:p>
-            <a:r>
-              <a:rPr lang="en-US"/>
-              <a:t>A name/value pair consists of a field name (in double quotes), followed by a colon, followed by a value:</a:t>
-            </a:r>
-            <a:endParaRPr lang="en-US"/>
-          </a:p>
-          <a:p>
-            <a:pPr marL="0" indent="0">
-              <a:buNone/>
-            </a:pPr>
-            <a:endParaRPr lang="en-US"/>
-          </a:p>
-          <a:p>
-            <a:pPr marL="0" indent="0">
-              <a:buNone/>
-            </a:pPr>
-            <a:r>
-              <a:rPr lang="en-US"/>
-              <a:t>"firstName":"John"</a:t>
+              <a:t>Use Cases:</a:t>
+            </a:r>
+            <a:endParaRPr lang="en-US"/>
+          </a:p>
+          <a:p>
+            <a:pPr lvl="1"/>
+            <a:r>
+              <a:rPr lang="en-US"/>
+              <a:t>Document databases are suitable for a wide range of applications, including content management systems, e-commerce platforms, real-time analytics, mobile apps, and more.</a:t>
+            </a:r>
+            <a:endParaRPr lang="en-US"/>
+          </a:p>
+          <a:p>
+            <a:pPr lvl="1"/>
+            <a:r>
+              <a:rPr lang="en-US"/>
+              <a:t>They are particularly useful in scenarios where data is semi-structured or where flexibility in data model is required.</a:t>
             </a:r>
             <a:endParaRPr lang="en-US"/>
           </a:p>
@@ -9578,7 +9536,7 @@
           <a:p>
             <a:r>
               <a:rPr lang="en-US"/>
-              <a:t>JSON Objects</a:t>
+              <a:t>JSON documents </a:t>
             </a:r>
             <a:endParaRPr lang="en-US"/>
           </a:p>
@@ -9600,20 +9558,35 @@
           <a:p>
             <a:r>
               <a:rPr lang="en-US"/>
-              <a:t>JSON objects are written inside curly braces.</a:t>
-            </a:r>
-            <a:endParaRPr lang="en-US"/>
-          </a:p>
-          <a:p>
-            <a:endParaRPr lang="en-US"/>
-          </a:p>
-          <a:p>
-            <a:pPr marL="0" indent="0">
-              <a:buNone/>
-            </a:pPr>
-            <a:r>
-              <a:rPr lang="en-US"/>
-              <a:t>{"firstName":"John", "lastName":"Doe"}</a:t>
+              <a:t>JSON is a format for storing and transporting data.</a:t>
+            </a:r>
+            <a:endParaRPr lang="en-US"/>
+          </a:p>
+          <a:p>
+            <a:r>
+              <a:rPr lang="en-US"/>
+              <a:t>JSON stands for JavaScript Object Notation</a:t>
+            </a:r>
+            <a:endParaRPr lang="en-US"/>
+          </a:p>
+          <a:p>
+            <a:r>
+              <a:rPr lang="en-US"/>
+              <a:t>JSON is a lightweight data interchange format</a:t>
+            </a:r>
+            <a:endParaRPr lang="en-US"/>
+          </a:p>
+          <a:p>
+            <a:r>
+              <a:rPr lang="en-US"/>
+              <a:t>JSON is language independent</a:t>
+            </a:r>
+            <a:endParaRPr lang="en-US"/>
+          </a:p>
+          <a:p>
+            <a:r>
+              <a:rPr lang="en-US"/>
+              <a:t>JSON is "self-describing" and easy to understand</a:t>
             </a:r>
             <a:endParaRPr lang="en-US"/>
           </a:p>
@@ -9653,7 +9626,7 @@
           <a:p>
             <a:r>
               <a:rPr lang="en-US"/>
-              <a:t>JSON Arrays</a:t>
+              <a:t>JSON Example</a:t>
             </a:r>
             <a:endParaRPr lang="en-US"/>
           </a:p>
@@ -9673,24 +9646,21 @@
         <p:txBody>
           <a:bodyPr/>
           <a:p>
-            <a:r>
-              <a:rPr lang="en-US"/>
-              <a:t>JSON arrays are written inside square brackets.</a:t>
-            </a:r>
-            <a:endParaRPr lang="en-US"/>
-          </a:p>
-          <a:p>
-            <a:endParaRPr lang="en-US"/>
-          </a:p>
-          <a:p>
-            <a:endParaRPr lang="en-US"/>
-          </a:p>
-          <a:p>
             <a:pPr marL="0" indent="0">
               <a:buNone/>
             </a:pPr>
             <a:r>
               <a:rPr lang="en-US"/>
+              <a:t>{</a:t>
+            </a:r>
+            <a:endParaRPr lang="en-US"/>
+          </a:p>
+          <a:p>
+            <a:pPr marL="0" indent="0">
+              <a:buNone/>
+            </a:pPr>
+            <a:r>
+              <a:rPr lang="en-US"/>
               <a:t>"employees":[</a:t>
             </a:r>
             <a:endParaRPr lang="en-US"/>
@@ -9732,6 +9702,16 @@
             <a:r>
               <a:rPr lang="en-US"/>
               <a:t>]</a:t>
+            </a:r>
+            <a:endParaRPr lang="en-US"/>
+          </a:p>
+          <a:p>
+            <a:pPr marL="0" indent="0">
+              <a:buNone/>
+            </a:pPr>
+            <a:r>
+              <a:rPr lang="en-US"/>
+              <a:t>}</a:t>
             </a:r>
             <a:endParaRPr lang="en-US"/>
           </a:p>
@@ -9771,7 +9751,7 @@
           <a:p>
             <a:r>
               <a:rPr lang="en-US"/>
-              <a:t>JSON Complete Example again </a:t>
+              <a:t>JSON Syntax Rules</a:t>
             </a:r>
             <a:endParaRPr lang="en-US"/>
           </a:p>
@@ -9791,72 +9771,30 @@
         <p:txBody>
           <a:bodyPr/>
           <a:p>
-            <a:pPr marL="0" indent="0">
-              <a:buNone/>
-            </a:pPr>
-            <a:r>
-              <a:rPr lang="en-US"/>
-              <a:t>{</a:t>
-            </a:r>
-            <a:endParaRPr lang="en-US"/>
-          </a:p>
-          <a:p>
-            <a:pPr marL="0" indent="0">
-              <a:buNone/>
-            </a:pPr>
-            <a:r>
-              <a:rPr lang="en-US"/>
-              <a:t>"employees":[</a:t>
-            </a:r>
-            <a:endParaRPr lang="en-US"/>
-          </a:p>
-          <a:p>
-            <a:pPr marL="0" indent="0">
-              <a:buNone/>
-            </a:pPr>
-            <a:r>
-              <a:rPr lang="en-US"/>
-              <a:t>  {"firstName":"John", "lastName":"Doe"},</a:t>
-            </a:r>
-            <a:endParaRPr lang="en-US"/>
-          </a:p>
-          <a:p>
-            <a:pPr marL="0" indent="0">
-              <a:buNone/>
-            </a:pPr>
-            <a:r>
-              <a:rPr lang="en-US"/>
-              <a:t>  {"firstName":"Anna", "lastName":"Smith"},</a:t>
-            </a:r>
-            <a:endParaRPr lang="en-US"/>
-          </a:p>
-          <a:p>
-            <a:pPr marL="0" indent="0">
-              <a:buNone/>
-            </a:pPr>
-            <a:r>
-              <a:rPr lang="en-US"/>
-              <a:t>  {"firstName":"Peter", "lastName":"Jones"}</a:t>
-            </a:r>
-            <a:endParaRPr lang="en-US"/>
-          </a:p>
-          <a:p>
-            <a:pPr marL="0" indent="0">
-              <a:buNone/>
-            </a:pPr>
-            <a:r>
-              <a:rPr lang="en-US"/>
-              <a:t>]</a:t>
-            </a:r>
-            <a:endParaRPr lang="en-US"/>
-          </a:p>
-          <a:p>
-            <a:pPr marL="0" indent="0">
-              <a:buNone/>
-            </a:pPr>
-            <a:r>
-              <a:rPr lang="en-US"/>
-              <a:t>}</a:t>
+            <a:r>
+              <a:rPr lang="en-US"/>
+              <a:t>Data is in name/value pairs</a:t>
+            </a:r>
+            <a:endParaRPr lang="en-US"/>
+          </a:p>
+          <a:p>
+            <a:r>
+              <a:rPr lang="en-US"/>
+              <a:t>Data is separated by commas</a:t>
+            </a:r>
+            <a:endParaRPr lang="en-US"/>
+          </a:p>
+          <a:p>
+            <a:r>
+              <a:rPr lang="en-US"/>
+              <a:t>Curly braces hold objects</a:t>
+            </a:r>
+            <a:endParaRPr lang="en-US"/>
+          </a:p>
+          <a:p>
+            <a:r>
+              <a:rPr lang="en-US"/>
+              <a:t>Square brackets hold arrays</a:t>
             </a:r>
             <a:endParaRPr lang="en-US"/>
           </a:p>
@@ -9894,44 +9832,38 @@
         <p:txBody>
           <a:bodyPr/>
           <a:p>
-            <a:pPr algn="ctr"/>
-            <a:r>
-              <a:rPr lang="en-US"/>
-              <a:t>JSON vs XML </a:t>
-            </a:r>
-            <a:endParaRPr lang="en-US"/>
-          </a:p>
-        </p:txBody>
-      </p:sp>
-      <p:sp>
-        <p:nvSpPr>
-          <p:cNvPr id="4" name="Content Placeholder 3"/>
-          <p:cNvSpPr>
-            <a:spLocks noGrp="1"/>
-          </p:cNvSpPr>
-          <p:nvPr>
-            <p:ph sz="half" idx="1"/>
-          </p:nvPr>
-        </p:nvSpPr>
-        <p:spPr>
-          <a:ln>
-            <a:solidFill>
-              <a:schemeClr val="tx1"/>
-            </a:solidFill>
-          </a:ln>
-        </p:spPr>
-        <p:txBody>
-          <a:bodyPr>
-            <a:normAutofit lnSpcReduction="10000"/>
-          </a:bodyPr>
+            <a:r>
+              <a:rPr lang="en-US"/>
+              <a:t>JSON Data - A name and a Value</a:t>
+            </a:r>
+            <a:endParaRPr lang="en-US"/>
+          </a:p>
+        </p:txBody>
+      </p:sp>
+      <p:sp>
+        <p:nvSpPr>
+          <p:cNvPr id="3" name="Content Placeholder 2"/>
+          <p:cNvSpPr>
+            <a:spLocks noGrp="1"/>
+          </p:cNvSpPr>
+          <p:nvPr>
+            <p:ph idx="1"/>
+          </p:nvPr>
+        </p:nvSpPr>
+        <p:spPr/>
+        <p:txBody>
+          <a:bodyPr/>
+          <a:p>
+            <a:r>
+              <a:rPr lang="en-US"/>
+              <a:t>A name/value pair consists of a field name (in double quotes), followed by a colon, followed by a value:</a:t>
+            </a:r>
+            <a:endParaRPr lang="en-US"/>
+          </a:p>
           <a:p>
             <a:pPr marL="0" indent="0">
               <a:buNone/>
             </a:pPr>
-            <a:r>
-              <a:rPr lang="en-US"/>
-              <a:t>{</a:t>
-            </a:r>
             <a:endParaRPr lang="en-US"/>
           </a:p>
           <a:p>
@@ -9940,210 +9872,7 @@
             </a:pPr>
             <a:r>
               <a:rPr lang="en-US"/>
-              <a:t>"employees":[</a:t>
-            </a:r>
-            <a:endParaRPr lang="en-US"/>
-          </a:p>
-          <a:p>
-            <a:pPr marL="0" indent="0">
-              <a:buNone/>
-            </a:pPr>
-            <a:r>
-              <a:rPr lang="en-US"/>
-              <a:t>  {"firstName":"John", "lastName":"Doe"},</a:t>
-            </a:r>
-            <a:endParaRPr lang="en-US"/>
-          </a:p>
-          <a:p>
-            <a:pPr marL="0" indent="0">
-              <a:buNone/>
-            </a:pPr>
-            <a:r>
-              <a:rPr lang="en-US"/>
-              <a:t>  {"firstName":"Anna", "lastName":"Smith"},</a:t>
-            </a:r>
-            <a:endParaRPr lang="en-US"/>
-          </a:p>
-          <a:p>
-            <a:pPr marL="0" indent="0">
-              <a:buNone/>
-            </a:pPr>
-            <a:r>
-              <a:rPr lang="en-US"/>
-              <a:t>  {"firstName":"Peter", "lastName":"Jones"}</a:t>
-            </a:r>
-            <a:endParaRPr lang="en-US"/>
-          </a:p>
-          <a:p>
-            <a:pPr marL="0" indent="0">
-              <a:buNone/>
-            </a:pPr>
-            <a:r>
-              <a:rPr lang="en-US"/>
-              <a:t>]</a:t>
-            </a:r>
-            <a:endParaRPr lang="en-US"/>
-          </a:p>
-          <a:p>
-            <a:pPr marL="0" indent="0">
-              <a:buNone/>
-            </a:pPr>
-            <a:r>
-              <a:rPr lang="en-US"/>
-              <a:t>}</a:t>
-            </a:r>
-            <a:endParaRPr lang="en-US"/>
-          </a:p>
-        </p:txBody>
-      </p:sp>
-      <p:sp>
-        <p:nvSpPr>
-          <p:cNvPr id="5" name="Content Placeholder 4"/>
-          <p:cNvSpPr>
-            <a:spLocks noGrp="1"/>
-          </p:cNvSpPr>
-          <p:nvPr>
-            <p:ph sz="half" idx="2"/>
-          </p:nvPr>
-        </p:nvSpPr>
-        <p:spPr>
-          <a:ln>
-            <a:solidFill>
-              <a:schemeClr val="tx1"/>
-            </a:solidFill>
-          </a:ln>
-        </p:spPr>
-        <p:txBody>
-          <a:bodyPr>
-            <a:normAutofit fontScale="50000"/>
-          </a:bodyPr>
-          <a:p>
-            <a:pPr marL="0" indent="0">
-              <a:buNone/>
-            </a:pPr>
-            <a:r>
-              <a:rPr lang="en-US"/>
-              <a:t>&lt;?xml version="1.0" encoding="UTF-8" ?&gt;</a:t>
-            </a:r>
-            <a:endParaRPr lang="en-US"/>
-          </a:p>
-          <a:p>
-            <a:pPr marL="0" indent="0">
-              <a:buNone/>
-            </a:pPr>
-            <a:r>
-              <a:rPr lang="en-US"/>
-              <a:t>&lt;employees&gt;</a:t>
-            </a:r>
-            <a:endParaRPr lang="en-US"/>
-          </a:p>
-          <a:p>
-            <a:pPr marL="0" indent="0">
-              <a:buNone/>
-            </a:pPr>
-            <a:r>
-              <a:rPr lang="en-US"/>
-              <a:t>    &lt;firstName&gt;John&lt;/firstName&gt;</a:t>
-            </a:r>
-            <a:endParaRPr lang="en-US"/>
-          </a:p>
-          <a:p>
-            <a:pPr marL="0" indent="0">
-              <a:buNone/>
-            </a:pPr>
-            <a:r>
-              <a:rPr lang="en-US"/>
-              <a:t>    &lt;lastName&gt;Doe&lt;/lastName&gt;</a:t>
-            </a:r>
-            <a:endParaRPr lang="en-US"/>
-          </a:p>
-          <a:p>
-            <a:pPr marL="0" indent="0">
-              <a:buNone/>
-            </a:pPr>
-            <a:r>
-              <a:rPr lang="en-US"/>
-              <a:t>&lt;/employees&gt;</a:t>
-            </a:r>
-            <a:endParaRPr lang="en-US"/>
-          </a:p>
-          <a:p>
-            <a:pPr marL="0" indent="0">
-              <a:buNone/>
-            </a:pPr>
-            <a:r>
-              <a:rPr lang="en-US"/>
-              <a:t>&lt;employees&gt;</a:t>
-            </a:r>
-            <a:endParaRPr lang="en-US"/>
-          </a:p>
-          <a:p>
-            <a:pPr marL="0" indent="0">
-              <a:buNone/>
-            </a:pPr>
-            <a:r>
-              <a:rPr lang="en-US"/>
-              <a:t>    &lt;firstName&gt;Anna&lt;/firstName&gt;</a:t>
-            </a:r>
-            <a:endParaRPr lang="en-US"/>
-          </a:p>
-          <a:p>
-            <a:pPr marL="0" indent="0">
-              <a:buNone/>
-            </a:pPr>
-            <a:r>
-              <a:rPr lang="en-US"/>
-              <a:t>    &lt;lastName&gt;Smith&lt;/lastName&gt;</a:t>
-            </a:r>
-            <a:endParaRPr lang="en-US"/>
-          </a:p>
-          <a:p>
-            <a:pPr marL="0" indent="0">
-              <a:buNone/>
-            </a:pPr>
-            <a:r>
-              <a:rPr lang="en-US"/>
-              <a:t>&lt;/employees&gt;</a:t>
-            </a:r>
-            <a:endParaRPr lang="en-US"/>
-          </a:p>
-          <a:p>
-            <a:pPr marL="0" indent="0">
-              <a:buNone/>
-            </a:pPr>
-            <a:r>
-              <a:rPr lang="en-US"/>
-              <a:t>&lt;employees&gt;</a:t>
-            </a:r>
-            <a:endParaRPr lang="en-US"/>
-          </a:p>
-          <a:p>
-            <a:pPr marL="0" indent="0">
-              <a:buNone/>
-            </a:pPr>
-            <a:r>
-              <a:rPr lang="en-US"/>
-              <a:t>    &lt;firstName&gt;Peter&lt;/firstName&gt;</a:t>
-            </a:r>
-            <a:endParaRPr lang="en-US"/>
-          </a:p>
-          <a:p>
-            <a:pPr marL="0" indent="0">
-              <a:buNone/>
-            </a:pPr>
-            <a:r>
-              <a:rPr lang="en-US"/>
-              <a:t>    &lt;lastName&gt;Jones&lt;/lastName&gt;</a:t>
-            </a:r>
-            <a:endParaRPr lang="en-US"/>
-          </a:p>
-          <a:p>
-            <a:pPr marL="0" indent="0">
-              <a:buNone/>
-            </a:pPr>
-            <a:r>
-              <a:rPr lang="en-US"/>
-              <a:t>&lt;/employees&gt;</a:t>
+              <a:t>"firstName":"John"</a:t>
             </a:r>
             <a:endParaRPr lang="en-US"/>
           </a:p>
@@ -10169,7 +9898,7 @@
       <p:grpSpPr/>
       <p:sp>
         <p:nvSpPr>
-          <p:cNvPr id="5" name="Title 4"/>
+          <p:cNvPr id="2" name="Title 1"/>
           <p:cNvSpPr>
             <a:spLocks noGrp="1"/>
           </p:cNvSpPr>
@@ -10183,15 +9912,15 @@
           <a:p>
             <a:r>
               <a:rPr lang="en-US"/>
-              <a:t>MongoDB </a:t>
-            </a:r>
-            <a:endParaRPr lang="en-US"/>
-          </a:p>
-        </p:txBody>
-      </p:sp>
-      <p:sp>
-        <p:nvSpPr>
-          <p:cNvPr id="6" name="Content Placeholder 5"/>
+              <a:t>JSON Objects</a:t>
+            </a:r>
+            <a:endParaRPr lang="en-US"/>
+          </a:p>
+        </p:txBody>
+      </p:sp>
+      <p:sp>
+        <p:nvSpPr>
+          <p:cNvPr id="3" name="Content Placeholder 2"/>
           <p:cNvSpPr>
             <a:spLocks noGrp="1"/>
           </p:cNvSpPr>
@@ -10205,32 +9934,21 @@
           <a:p>
             <a:r>
               <a:rPr lang="en-US"/>
-              <a:t>MongoDB is a document database. It stores data in a type of JSON format called BSON.</a:t>
-            </a:r>
-            <a:endParaRPr lang="en-US"/>
-          </a:p>
-          <a:p>
-            <a:r>
-              <a:rPr lang="en-US"/>
-              <a:t>A record in MongoDB is a document, which is a data structure composed of key value pairs similar to the structure of JSON objects.</a:t>
-            </a:r>
-            <a:endParaRPr lang="en-US"/>
-          </a:p>
-          <a:p>
-            <a:r>
-              <a:rPr lang="en-US"/>
-              <a:t>Records in a MongoDB database are called documents, and the field values may include numbers, strings, booleans, arrays, or even nested documents.</a:t>
-            </a:r>
-            <a:endParaRPr lang="en-US"/>
-          </a:p>
-          <a:p>
-            <a:r>
-              <a:rPr lang="en-US"/>
-              <a:t>Can be installed locally or hosted in the cloud.</a:t>
-            </a:r>
-            <a:endParaRPr lang="en-US"/>
-          </a:p>
-          <a:p>
+              <a:t>JSON objects are written inside curly braces.</a:t>
+            </a:r>
+            <a:endParaRPr lang="en-US"/>
+          </a:p>
+          <a:p>
+            <a:endParaRPr lang="en-US"/>
+          </a:p>
+          <a:p>
+            <a:pPr marL="0" indent="0">
+              <a:buNone/>
+            </a:pPr>
+            <a:r>
+              <a:rPr lang="en-US"/>
+              <a:t>{"firstName":"John", "lastName":"Doe"}</a:t>
+            </a:r>
             <a:endParaRPr lang="en-US"/>
           </a:p>
         </p:txBody>
@@ -10269,7 +9987,7 @@
           <a:p>
             <a:r>
               <a:rPr lang="en-US"/>
-              <a:t>Example Document</a:t>
+              <a:t>JSON Arrays</a:t>
             </a:r>
             <a:endParaRPr lang="en-US"/>
           </a:p>
@@ -10289,12 +10007,25 @@
         <p:txBody>
           <a:bodyPr/>
           <a:p>
+            <a:r>
+              <a:rPr lang="en-US"/>
+              <a:t>JSON arrays are written inside square brackets.</a:t>
+            </a:r>
+            <a:endParaRPr lang="en-US"/>
+          </a:p>
+          <a:p>
+            <a:endParaRPr lang="en-US"/>
+          </a:p>
+          <a:p>
+            <a:endParaRPr lang="en-US"/>
+          </a:p>
+          <a:p>
             <a:pPr marL="0" indent="0">
               <a:buNone/>
             </a:pPr>
             <a:r>
               <a:rPr lang="en-US"/>
-              <a:t>{</a:t>
+              <a:t>"employees":[</a:t>
             </a:r>
             <a:endParaRPr lang="en-US"/>
           </a:p>
@@ -10304,7 +10035,7 @@
             </a:pPr>
             <a:r>
               <a:rPr lang="en-US"/>
-              <a:t>	title: "Post Title 1",</a:t>
+              <a:t>  {"firstName":"John", "lastName":"Doe"},</a:t>
             </a:r>
             <a:endParaRPr lang="en-US"/>
           </a:p>
@@ -10314,7 +10045,7 @@
             </a:pPr>
             <a:r>
               <a:rPr lang="en-US"/>
-              <a:t>	body: "Body of post.",</a:t>
+              <a:t>  {"firstName":"Anna", "lastName":"Smith"},</a:t>
             </a:r>
             <a:endParaRPr lang="en-US"/>
           </a:p>
@@ -10324,7 +10055,7 @@
             </a:pPr>
             <a:r>
               <a:rPr lang="en-US"/>
-              <a:t>	category: "News",</a:t>
+              <a:t>  {"firstName":"Peter", "lastName":"Jones"}</a:t>
             </a:r>
             <a:endParaRPr lang="en-US"/>
           </a:p>
@@ -10334,37 +10065,7 @@
             </a:pPr>
             <a:r>
               <a:rPr lang="en-US"/>
-              <a:t>	likes: 1,</a:t>
-            </a:r>
-            <a:endParaRPr lang="en-US"/>
-          </a:p>
-          <a:p>
-            <a:pPr marL="0" indent="0">
-              <a:buNone/>
-            </a:pPr>
-            <a:r>
-              <a:rPr lang="en-US"/>
-              <a:t>	tags: ["news", "events"],</a:t>
-            </a:r>
-            <a:endParaRPr lang="en-US"/>
-          </a:p>
-          <a:p>
-            <a:pPr marL="0" indent="0">
-              <a:buNone/>
-            </a:pPr>
-            <a:r>
-              <a:rPr lang="en-US"/>
-              <a:t>	date: Date()</a:t>
-            </a:r>
-            <a:endParaRPr lang="en-US"/>
-          </a:p>
-          <a:p>
-            <a:pPr marL="0" indent="0">
-              <a:buNone/>
-            </a:pPr>
-            <a:r>
-              <a:rPr lang="en-US"/>
-              <a:t>}</a:t>
+              <a:t>]</a:t>
             </a:r>
             <a:endParaRPr lang="en-US"/>
           </a:p>
@@ -10379,6 +10080,743 @@
 </file>
 
 <file path=ppt/slides/slide49.xml><?xml version="1.0" encoding="utf-8"?>
+<p:sld xmlns:a="http://schemas.openxmlformats.org/drawingml/2006/main" xmlns:r="http://schemas.openxmlformats.org/officeDocument/2006/relationships" xmlns:p="http://schemas.openxmlformats.org/presentationml/2006/main">
+  <p:cSld>
+    <p:spTree>
+      <p:nvGrpSpPr>
+        <p:cNvPr id="1" name=""/>
+        <p:cNvGrpSpPr/>
+        <p:nvPr/>
+      </p:nvGrpSpPr>
+      <p:grpSpPr/>
+      <p:sp>
+        <p:nvSpPr>
+          <p:cNvPr id="2" name="Title 1"/>
+          <p:cNvSpPr>
+            <a:spLocks noGrp="1"/>
+          </p:cNvSpPr>
+          <p:nvPr>
+            <p:ph type="title"/>
+          </p:nvPr>
+        </p:nvSpPr>
+        <p:spPr/>
+        <p:txBody>
+          <a:bodyPr/>
+          <a:p>
+            <a:r>
+              <a:rPr lang="en-US"/>
+              <a:t>JSON Complete Example again </a:t>
+            </a:r>
+            <a:endParaRPr lang="en-US"/>
+          </a:p>
+        </p:txBody>
+      </p:sp>
+      <p:sp>
+        <p:nvSpPr>
+          <p:cNvPr id="3" name="Content Placeholder 2"/>
+          <p:cNvSpPr>
+            <a:spLocks noGrp="1"/>
+          </p:cNvSpPr>
+          <p:nvPr>
+            <p:ph idx="1"/>
+          </p:nvPr>
+        </p:nvSpPr>
+        <p:spPr/>
+        <p:txBody>
+          <a:bodyPr/>
+          <a:p>
+            <a:pPr marL="0" indent="0">
+              <a:buNone/>
+            </a:pPr>
+            <a:r>
+              <a:rPr lang="en-US"/>
+              <a:t>{</a:t>
+            </a:r>
+            <a:endParaRPr lang="en-US"/>
+          </a:p>
+          <a:p>
+            <a:pPr marL="0" indent="0">
+              <a:buNone/>
+            </a:pPr>
+            <a:r>
+              <a:rPr lang="en-US"/>
+              <a:t>"employees":[</a:t>
+            </a:r>
+            <a:endParaRPr lang="en-US"/>
+          </a:p>
+          <a:p>
+            <a:pPr marL="0" indent="0">
+              <a:buNone/>
+            </a:pPr>
+            <a:r>
+              <a:rPr lang="en-US"/>
+              <a:t>  {"firstName":"John", "lastName":"Doe"},</a:t>
+            </a:r>
+            <a:endParaRPr lang="en-US"/>
+          </a:p>
+          <a:p>
+            <a:pPr marL="0" indent="0">
+              <a:buNone/>
+            </a:pPr>
+            <a:r>
+              <a:rPr lang="en-US"/>
+              <a:t>  {"firstName":"Anna", "lastName":"Smith"},</a:t>
+            </a:r>
+            <a:endParaRPr lang="en-US"/>
+          </a:p>
+          <a:p>
+            <a:pPr marL="0" indent="0">
+              <a:buNone/>
+            </a:pPr>
+            <a:r>
+              <a:rPr lang="en-US"/>
+              <a:t>  {"firstName":"Peter", "lastName":"Jones"}</a:t>
+            </a:r>
+            <a:endParaRPr lang="en-US"/>
+          </a:p>
+          <a:p>
+            <a:pPr marL="0" indent="0">
+              <a:buNone/>
+            </a:pPr>
+            <a:r>
+              <a:rPr lang="en-US"/>
+              <a:t>]</a:t>
+            </a:r>
+            <a:endParaRPr lang="en-US"/>
+          </a:p>
+          <a:p>
+            <a:pPr marL="0" indent="0">
+              <a:buNone/>
+            </a:pPr>
+            <a:r>
+              <a:rPr lang="en-US"/>
+              <a:t>}</a:t>
+            </a:r>
+            <a:endParaRPr lang="en-US"/>
+          </a:p>
+        </p:txBody>
+      </p:sp>
+    </p:spTree>
+  </p:cSld>
+  <p:clrMapOvr>
+    <a:masterClrMapping/>
+  </p:clrMapOvr>
+</p:sld>
+</file>
+
+<file path=ppt/slides/slide5.xml><?xml version="1.0" encoding="utf-8"?>
+<p:sld xmlns:a="http://schemas.openxmlformats.org/drawingml/2006/main" xmlns:r="http://schemas.openxmlformats.org/officeDocument/2006/relationships" xmlns:p="http://schemas.openxmlformats.org/presentationml/2006/main">
+  <p:cSld>
+    <p:spTree>
+      <p:nvGrpSpPr>
+        <p:cNvPr id="1" name=""/>
+        <p:cNvGrpSpPr/>
+        <p:nvPr/>
+      </p:nvGrpSpPr>
+      <p:grpSpPr/>
+      <p:sp>
+        <p:nvSpPr>
+          <p:cNvPr id="2" name="Title 1"/>
+          <p:cNvSpPr>
+            <a:spLocks noGrp="1"/>
+          </p:cNvSpPr>
+          <p:nvPr>
+            <p:ph type="title"/>
+          </p:nvPr>
+        </p:nvSpPr>
+        <p:spPr/>
+        <p:txBody>
+          <a:bodyPr/>
+          <a:p>
+            <a:r>
+              <a:rPr lang="en-US"/>
+              <a:t>Common data models</a:t>
+            </a:r>
+            <a:endParaRPr lang="en-US"/>
+          </a:p>
+        </p:txBody>
+      </p:sp>
+      <p:sp>
+        <p:nvSpPr>
+          <p:cNvPr id="3" name="Content Placeholder 2"/>
+          <p:cNvSpPr>
+            <a:spLocks noGrp="1"/>
+          </p:cNvSpPr>
+          <p:nvPr>
+            <p:ph idx="1"/>
+          </p:nvPr>
+        </p:nvSpPr>
+        <p:spPr/>
+        <p:txBody>
+          <a:bodyPr/>
+          <a:p>
+            <a:r>
+              <a:rPr lang="en-US"/>
+              <a:t>Hierarchical Data Model </a:t>
+            </a:r>
+            <a:endParaRPr lang="en-US"/>
+          </a:p>
+          <a:p>
+            <a:r>
+              <a:rPr lang="en-US"/>
+              <a:t>Relational Data Model</a:t>
+            </a:r>
+            <a:endParaRPr lang="en-US"/>
+          </a:p>
+          <a:p>
+            <a:r>
+              <a:rPr lang="en-US"/>
+              <a:t>Entity-Relationship Model (ER Model)</a:t>
+            </a:r>
+            <a:endParaRPr lang="en-US"/>
+          </a:p>
+          <a:p>
+            <a:r>
+              <a:rPr lang="en-US"/>
+              <a:t>Document Data Model</a:t>
+            </a:r>
+            <a:endParaRPr lang="en-US"/>
+          </a:p>
+          <a:p>
+            <a:r>
+              <a:rPr lang="en-US"/>
+              <a:t>Key-Value Data Mode</a:t>
+            </a:r>
+            <a:endParaRPr lang="en-US"/>
+          </a:p>
+          <a:p>
+            <a:r>
+              <a:rPr lang="en-US"/>
+              <a:t>Graph Data Model</a:t>
+            </a:r>
+            <a:endParaRPr lang="en-US"/>
+          </a:p>
+          <a:p>
+            <a:r>
+              <a:rPr lang="en-US"/>
+              <a:t>Multi-Model Databases</a:t>
+            </a:r>
+            <a:endParaRPr lang="en-US"/>
+          </a:p>
+        </p:txBody>
+      </p:sp>
+    </p:spTree>
+  </p:cSld>
+  <p:clrMapOvr>
+    <a:masterClrMapping/>
+  </p:clrMapOvr>
+</p:sld>
+</file>
+
+<file path=ppt/slides/slide50.xml><?xml version="1.0" encoding="utf-8"?>
+<p:sld xmlns:a="http://schemas.openxmlformats.org/drawingml/2006/main" xmlns:r="http://schemas.openxmlformats.org/officeDocument/2006/relationships" xmlns:p="http://schemas.openxmlformats.org/presentationml/2006/main">
+  <p:cSld>
+    <p:spTree>
+      <p:nvGrpSpPr>
+        <p:cNvPr id="1" name=""/>
+        <p:cNvGrpSpPr/>
+        <p:nvPr/>
+      </p:nvGrpSpPr>
+      <p:grpSpPr/>
+      <p:sp>
+        <p:nvSpPr>
+          <p:cNvPr id="2" name="Title 1"/>
+          <p:cNvSpPr>
+            <a:spLocks noGrp="1"/>
+          </p:cNvSpPr>
+          <p:nvPr>
+            <p:ph type="title"/>
+          </p:nvPr>
+        </p:nvSpPr>
+        <p:spPr/>
+        <p:txBody>
+          <a:bodyPr/>
+          <a:p>
+            <a:pPr algn="ctr"/>
+            <a:r>
+              <a:rPr lang="en-US"/>
+              <a:t>JSON vs XML </a:t>
+            </a:r>
+            <a:endParaRPr lang="en-US"/>
+          </a:p>
+        </p:txBody>
+      </p:sp>
+      <p:sp>
+        <p:nvSpPr>
+          <p:cNvPr id="4" name="Content Placeholder 3"/>
+          <p:cNvSpPr>
+            <a:spLocks noGrp="1"/>
+          </p:cNvSpPr>
+          <p:nvPr>
+            <p:ph sz="half" idx="1"/>
+          </p:nvPr>
+        </p:nvSpPr>
+        <p:spPr>
+          <a:ln>
+            <a:solidFill>
+              <a:schemeClr val="tx1"/>
+            </a:solidFill>
+          </a:ln>
+        </p:spPr>
+        <p:txBody>
+          <a:bodyPr>
+            <a:normAutofit lnSpcReduction="10000"/>
+          </a:bodyPr>
+          <a:p>
+            <a:pPr marL="0" indent="0">
+              <a:buNone/>
+            </a:pPr>
+            <a:r>
+              <a:rPr lang="en-US"/>
+              <a:t>{</a:t>
+            </a:r>
+            <a:endParaRPr lang="en-US"/>
+          </a:p>
+          <a:p>
+            <a:pPr marL="0" indent="0">
+              <a:buNone/>
+            </a:pPr>
+            <a:r>
+              <a:rPr lang="en-US"/>
+              <a:t>"employees":[</a:t>
+            </a:r>
+            <a:endParaRPr lang="en-US"/>
+          </a:p>
+          <a:p>
+            <a:pPr marL="0" indent="0">
+              <a:buNone/>
+            </a:pPr>
+            <a:r>
+              <a:rPr lang="en-US"/>
+              <a:t>  {"firstName":"John", "lastName":"Doe"},</a:t>
+            </a:r>
+            <a:endParaRPr lang="en-US"/>
+          </a:p>
+          <a:p>
+            <a:pPr marL="0" indent="0">
+              <a:buNone/>
+            </a:pPr>
+            <a:r>
+              <a:rPr lang="en-US"/>
+              <a:t>  {"firstName":"Anna", "lastName":"Smith"},</a:t>
+            </a:r>
+            <a:endParaRPr lang="en-US"/>
+          </a:p>
+          <a:p>
+            <a:pPr marL="0" indent="0">
+              <a:buNone/>
+            </a:pPr>
+            <a:r>
+              <a:rPr lang="en-US"/>
+              <a:t>  {"firstName":"Peter", "lastName":"Jones"}</a:t>
+            </a:r>
+            <a:endParaRPr lang="en-US"/>
+          </a:p>
+          <a:p>
+            <a:pPr marL="0" indent="0">
+              <a:buNone/>
+            </a:pPr>
+            <a:r>
+              <a:rPr lang="en-US"/>
+              <a:t>]</a:t>
+            </a:r>
+            <a:endParaRPr lang="en-US"/>
+          </a:p>
+          <a:p>
+            <a:pPr marL="0" indent="0">
+              <a:buNone/>
+            </a:pPr>
+            <a:r>
+              <a:rPr lang="en-US"/>
+              <a:t>}</a:t>
+            </a:r>
+            <a:endParaRPr lang="en-US"/>
+          </a:p>
+        </p:txBody>
+      </p:sp>
+      <p:sp>
+        <p:nvSpPr>
+          <p:cNvPr id="5" name="Content Placeholder 4"/>
+          <p:cNvSpPr>
+            <a:spLocks noGrp="1"/>
+          </p:cNvSpPr>
+          <p:nvPr>
+            <p:ph sz="half" idx="2"/>
+          </p:nvPr>
+        </p:nvSpPr>
+        <p:spPr>
+          <a:ln>
+            <a:solidFill>
+              <a:schemeClr val="tx1"/>
+            </a:solidFill>
+          </a:ln>
+        </p:spPr>
+        <p:txBody>
+          <a:bodyPr>
+            <a:normAutofit fontScale="50000"/>
+          </a:bodyPr>
+          <a:p>
+            <a:pPr marL="0" indent="0">
+              <a:buNone/>
+            </a:pPr>
+            <a:r>
+              <a:rPr lang="en-US"/>
+              <a:t>&lt;?xml version="1.0" encoding="UTF-8" ?&gt;</a:t>
+            </a:r>
+            <a:endParaRPr lang="en-US"/>
+          </a:p>
+          <a:p>
+            <a:pPr marL="0" indent="0">
+              <a:buNone/>
+            </a:pPr>
+            <a:r>
+              <a:rPr lang="en-US"/>
+              <a:t>&lt;employees&gt;</a:t>
+            </a:r>
+            <a:endParaRPr lang="en-US"/>
+          </a:p>
+          <a:p>
+            <a:pPr marL="0" indent="0">
+              <a:buNone/>
+            </a:pPr>
+            <a:r>
+              <a:rPr lang="en-US"/>
+              <a:t>    &lt;firstName&gt;John&lt;/firstName&gt;</a:t>
+            </a:r>
+            <a:endParaRPr lang="en-US"/>
+          </a:p>
+          <a:p>
+            <a:pPr marL="0" indent="0">
+              <a:buNone/>
+            </a:pPr>
+            <a:r>
+              <a:rPr lang="en-US"/>
+              <a:t>    &lt;lastName&gt;Doe&lt;/lastName&gt;</a:t>
+            </a:r>
+            <a:endParaRPr lang="en-US"/>
+          </a:p>
+          <a:p>
+            <a:pPr marL="0" indent="0">
+              <a:buNone/>
+            </a:pPr>
+            <a:r>
+              <a:rPr lang="en-US"/>
+              <a:t>&lt;/employees&gt;</a:t>
+            </a:r>
+            <a:endParaRPr lang="en-US"/>
+          </a:p>
+          <a:p>
+            <a:pPr marL="0" indent="0">
+              <a:buNone/>
+            </a:pPr>
+            <a:r>
+              <a:rPr lang="en-US"/>
+              <a:t>&lt;employees&gt;</a:t>
+            </a:r>
+            <a:endParaRPr lang="en-US"/>
+          </a:p>
+          <a:p>
+            <a:pPr marL="0" indent="0">
+              <a:buNone/>
+            </a:pPr>
+            <a:r>
+              <a:rPr lang="en-US"/>
+              <a:t>    &lt;firstName&gt;Anna&lt;/firstName&gt;</a:t>
+            </a:r>
+            <a:endParaRPr lang="en-US"/>
+          </a:p>
+          <a:p>
+            <a:pPr marL="0" indent="0">
+              <a:buNone/>
+            </a:pPr>
+            <a:r>
+              <a:rPr lang="en-US"/>
+              <a:t>    &lt;lastName&gt;Smith&lt;/lastName&gt;</a:t>
+            </a:r>
+            <a:endParaRPr lang="en-US"/>
+          </a:p>
+          <a:p>
+            <a:pPr marL="0" indent="0">
+              <a:buNone/>
+            </a:pPr>
+            <a:r>
+              <a:rPr lang="en-US"/>
+              <a:t>&lt;/employees&gt;</a:t>
+            </a:r>
+            <a:endParaRPr lang="en-US"/>
+          </a:p>
+          <a:p>
+            <a:pPr marL="0" indent="0">
+              <a:buNone/>
+            </a:pPr>
+            <a:r>
+              <a:rPr lang="en-US"/>
+              <a:t>&lt;employees&gt;</a:t>
+            </a:r>
+            <a:endParaRPr lang="en-US"/>
+          </a:p>
+          <a:p>
+            <a:pPr marL="0" indent="0">
+              <a:buNone/>
+            </a:pPr>
+            <a:r>
+              <a:rPr lang="en-US"/>
+              <a:t>    &lt;firstName&gt;Peter&lt;/firstName&gt;</a:t>
+            </a:r>
+            <a:endParaRPr lang="en-US"/>
+          </a:p>
+          <a:p>
+            <a:pPr marL="0" indent="0">
+              <a:buNone/>
+            </a:pPr>
+            <a:r>
+              <a:rPr lang="en-US"/>
+              <a:t>    &lt;lastName&gt;Jones&lt;/lastName&gt;</a:t>
+            </a:r>
+            <a:endParaRPr lang="en-US"/>
+          </a:p>
+          <a:p>
+            <a:pPr marL="0" indent="0">
+              <a:buNone/>
+            </a:pPr>
+            <a:r>
+              <a:rPr lang="en-US"/>
+              <a:t>&lt;/employees&gt;</a:t>
+            </a:r>
+            <a:endParaRPr lang="en-US"/>
+          </a:p>
+        </p:txBody>
+      </p:sp>
+    </p:spTree>
+  </p:cSld>
+  <p:clrMapOvr>
+    <a:masterClrMapping/>
+  </p:clrMapOvr>
+</p:sld>
+</file>
+
+<file path=ppt/slides/slide51.xml><?xml version="1.0" encoding="utf-8"?>
+<p:sld xmlns:a="http://schemas.openxmlformats.org/drawingml/2006/main" xmlns:r="http://schemas.openxmlformats.org/officeDocument/2006/relationships" xmlns:p="http://schemas.openxmlformats.org/presentationml/2006/main">
+  <p:cSld>
+    <p:spTree>
+      <p:nvGrpSpPr>
+        <p:cNvPr id="1" name=""/>
+        <p:cNvGrpSpPr/>
+        <p:nvPr/>
+      </p:nvGrpSpPr>
+      <p:grpSpPr/>
+      <p:sp>
+        <p:nvSpPr>
+          <p:cNvPr id="5" name="Title 4"/>
+          <p:cNvSpPr>
+            <a:spLocks noGrp="1"/>
+          </p:cNvSpPr>
+          <p:nvPr>
+            <p:ph type="title"/>
+          </p:nvPr>
+        </p:nvSpPr>
+        <p:spPr/>
+        <p:txBody>
+          <a:bodyPr/>
+          <a:p>
+            <a:r>
+              <a:rPr lang="en-US"/>
+              <a:t>MongoDB </a:t>
+            </a:r>
+            <a:endParaRPr lang="en-US"/>
+          </a:p>
+        </p:txBody>
+      </p:sp>
+      <p:sp>
+        <p:nvSpPr>
+          <p:cNvPr id="6" name="Content Placeholder 5"/>
+          <p:cNvSpPr>
+            <a:spLocks noGrp="1"/>
+          </p:cNvSpPr>
+          <p:nvPr>
+            <p:ph idx="1"/>
+          </p:nvPr>
+        </p:nvSpPr>
+        <p:spPr/>
+        <p:txBody>
+          <a:bodyPr/>
+          <a:p>
+            <a:r>
+              <a:rPr lang="en-US"/>
+              <a:t>MongoDB is a document database. It stores data in a type of JSON format called BSON.</a:t>
+            </a:r>
+            <a:endParaRPr lang="en-US"/>
+          </a:p>
+          <a:p>
+            <a:r>
+              <a:rPr lang="en-US"/>
+              <a:t>A record in MongoDB is a document, which is a data structure composed of key value pairs similar to the structure of JSON objects.</a:t>
+            </a:r>
+            <a:endParaRPr lang="en-US"/>
+          </a:p>
+          <a:p>
+            <a:r>
+              <a:rPr lang="en-US"/>
+              <a:t>Records in a MongoDB database are called documents, and the field values may include numbers, strings, booleans, arrays, or even nested documents.</a:t>
+            </a:r>
+            <a:endParaRPr lang="en-US"/>
+          </a:p>
+          <a:p>
+            <a:r>
+              <a:rPr lang="en-US"/>
+              <a:t>Can be installed locally or hosted in the cloud.</a:t>
+            </a:r>
+            <a:endParaRPr lang="en-US"/>
+          </a:p>
+          <a:p>
+            <a:endParaRPr lang="en-US"/>
+          </a:p>
+        </p:txBody>
+      </p:sp>
+    </p:spTree>
+  </p:cSld>
+  <p:clrMapOvr>
+    <a:masterClrMapping/>
+  </p:clrMapOvr>
+</p:sld>
+</file>
+
+<file path=ppt/slides/slide52.xml><?xml version="1.0" encoding="utf-8"?>
+<p:sld xmlns:a="http://schemas.openxmlformats.org/drawingml/2006/main" xmlns:r="http://schemas.openxmlformats.org/officeDocument/2006/relationships" xmlns:p="http://schemas.openxmlformats.org/presentationml/2006/main">
+  <p:cSld>
+    <p:spTree>
+      <p:nvGrpSpPr>
+        <p:cNvPr id="1" name=""/>
+        <p:cNvGrpSpPr/>
+        <p:nvPr/>
+      </p:nvGrpSpPr>
+      <p:grpSpPr/>
+      <p:sp>
+        <p:nvSpPr>
+          <p:cNvPr id="2" name="Title 1"/>
+          <p:cNvSpPr>
+            <a:spLocks noGrp="1"/>
+          </p:cNvSpPr>
+          <p:nvPr>
+            <p:ph type="title"/>
+          </p:nvPr>
+        </p:nvSpPr>
+        <p:spPr/>
+        <p:txBody>
+          <a:bodyPr/>
+          <a:p>
+            <a:r>
+              <a:rPr lang="en-US"/>
+              <a:t>Example Document</a:t>
+            </a:r>
+            <a:endParaRPr lang="en-US"/>
+          </a:p>
+        </p:txBody>
+      </p:sp>
+      <p:sp>
+        <p:nvSpPr>
+          <p:cNvPr id="3" name="Content Placeholder 2"/>
+          <p:cNvSpPr>
+            <a:spLocks noGrp="1"/>
+          </p:cNvSpPr>
+          <p:nvPr>
+            <p:ph idx="1"/>
+          </p:nvPr>
+        </p:nvSpPr>
+        <p:spPr/>
+        <p:txBody>
+          <a:bodyPr/>
+          <a:p>
+            <a:pPr marL="0" indent="0">
+              <a:buNone/>
+            </a:pPr>
+            <a:r>
+              <a:rPr lang="en-US"/>
+              <a:t>{</a:t>
+            </a:r>
+            <a:endParaRPr lang="en-US"/>
+          </a:p>
+          <a:p>
+            <a:pPr marL="0" indent="0">
+              <a:buNone/>
+            </a:pPr>
+            <a:r>
+              <a:rPr lang="en-US"/>
+              <a:t>	title: "Post Title 1",</a:t>
+            </a:r>
+            <a:endParaRPr lang="en-US"/>
+          </a:p>
+          <a:p>
+            <a:pPr marL="0" indent="0">
+              <a:buNone/>
+            </a:pPr>
+            <a:r>
+              <a:rPr lang="en-US"/>
+              <a:t>	body: "Body of post.",</a:t>
+            </a:r>
+            <a:endParaRPr lang="en-US"/>
+          </a:p>
+          <a:p>
+            <a:pPr marL="0" indent="0">
+              <a:buNone/>
+            </a:pPr>
+            <a:r>
+              <a:rPr lang="en-US"/>
+              <a:t>	category: "News",</a:t>
+            </a:r>
+            <a:endParaRPr lang="en-US"/>
+          </a:p>
+          <a:p>
+            <a:pPr marL="0" indent="0">
+              <a:buNone/>
+            </a:pPr>
+            <a:r>
+              <a:rPr lang="en-US"/>
+              <a:t>	likes: 1,</a:t>
+            </a:r>
+            <a:endParaRPr lang="en-US"/>
+          </a:p>
+          <a:p>
+            <a:pPr marL="0" indent="0">
+              <a:buNone/>
+            </a:pPr>
+            <a:r>
+              <a:rPr lang="en-US"/>
+              <a:t>	tags: ["news", "events"],</a:t>
+            </a:r>
+            <a:endParaRPr lang="en-US"/>
+          </a:p>
+          <a:p>
+            <a:pPr marL="0" indent="0">
+              <a:buNone/>
+            </a:pPr>
+            <a:r>
+              <a:rPr lang="en-US"/>
+              <a:t>	date: Date()</a:t>
+            </a:r>
+            <a:endParaRPr lang="en-US"/>
+          </a:p>
+          <a:p>
+            <a:pPr marL="0" indent="0">
+              <a:buNone/>
+            </a:pPr>
+            <a:r>
+              <a:rPr lang="en-US"/>
+              <a:t>}</a:t>
+            </a:r>
+            <a:endParaRPr lang="en-US"/>
+          </a:p>
+        </p:txBody>
+      </p:sp>
+    </p:spTree>
+  </p:cSld>
+  <p:clrMapOvr>
+    <a:masterClrMapping/>
+  </p:clrMapOvr>
+</p:sld>
+</file>
+
+<file path=ppt/slides/slide53.xml><?xml version="1.0" encoding="utf-8"?>
 <p:sld xmlns:a="http://schemas.openxmlformats.org/drawingml/2006/main" xmlns:r="http://schemas.openxmlformats.org/officeDocument/2006/relationships" xmlns:p="http://schemas.openxmlformats.org/presentationml/2006/main">
   <p:cSld>
     <p:spTree>
@@ -12064,7 +12502,7 @@
 </p:sld>
 </file>
 
-<file path=ppt/slides/slide5.xml><?xml version="1.0" encoding="utf-8"?>
+<file path=ppt/slides/slide54.xml><?xml version="1.0" encoding="utf-8"?>
 <p:sld xmlns:a="http://schemas.openxmlformats.org/drawingml/2006/main" xmlns:r="http://schemas.openxmlformats.org/officeDocument/2006/relationships" xmlns:p="http://schemas.openxmlformats.org/presentationml/2006/main">
   <p:cSld>
     <p:spTree>
@@ -12090,7 +12528,7 @@
           <a:p>
             <a:r>
               <a:rPr lang="en-US"/>
-              <a:t>Common data models</a:t>
+              <a:t>Local vs Cloud Database</a:t>
             </a:r>
             <a:endParaRPr lang="en-US"/>
           </a:p>
@@ -12108,53 +12546,37 @@
         </p:nvSpPr>
         <p:spPr/>
         <p:txBody>
-          <a:bodyPr/>
-          <a:p>
-            <a:r>
-              <a:rPr lang="en-US"/>
-              <a:t>Hierarchical Data Model </a:t>
-            </a:r>
-            <a:endParaRPr lang="en-US"/>
-          </a:p>
-          <a:p>
-            <a:r>
-              <a:rPr lang="en-US"/>
-              <a:t>Relational Data Model</a:t>
-            </a:r>
-            <a:endParaRPr lang="en-US"/>
-          </a:p>
-          <a:p>
-            <a:r>
-              <a:rPr lang="en-US"/>
-              <a:t>Entity-Relationship Model (ER Model)</a:t>
-            </a:r>
-            <a:endParaRPr lang="en-US"/>
-          </a:p>
-          <a:p>
-            <a:r>
-              <a:rPr lang="en-US"/>
-              <a:t>Document Data Model</a:t>
-            </a:r>
-            <a:endParaRPr lang="en-US"/>
-          </a:p>
-          <a:p>
-            <a:r>
-              <a:rPr lang="en-US"/>
-              <a:t>Key-Value Data Mode</a:t>
-            </a:r>
-            <a:endParaRPr lang="en-US"/>
-          </a:p>
-          <a:p>
-            <a:r>
-              <a:rPr lang="en-US"/>
-              <a:t>Graph Data Model</a:t>
-            </a:r>
-            <a:endParaRPr lang="en-US"/>
-          </a:p>
-          <a:p>
-            <a:r>
-              <a:rPr lang="en-US"/>
-              <a:t>Multi-Model Databases</a:t>
+          <a:bodyPr>
+            <a:normAutofit fontScale="90000"/>
+          </a:bodyPr>
+          <a:p>
+            <a:r>
+              <a:rPr lang="en-US"/>
+              <a:t>MongoDB can be installed locally, which will allow you to host your own MongoDB server on your hardware. This requires you to manage your server, upgrades, and any other maintenance.</a:t>
+            </a:r>
+            <a:endParaRPr lang="en-US"/>
+          </a:p>
+          <a:p>
+            <a:r>
+              <a:rPr lang="en-US"/>
+              <a:t>You can download and use the MongoDB open source Community Server on your hardware for free.</a:t>
+            </a:r>
+            <a:endParaRPr lang="en-US"/>
+          </a:p>
+          <a:p>
+            <a:endParaRPr lang="en-US"/>
+          </a:p>
+          <a:p>
+            <a:r>
+              <a:rPr lang="en-US"/>
+              <a:t>on the other hand, you can use MongoDB Atlas, a cloud database platform. This is much easier than hosting your own local database.</a:t>
+            </a:r>
+            <a:endParaRPr lang="en-US"/>
+          </a:p>
+          <a:p>
+            <a:r>
+              <a:rPr lang="en-US"/>
+              <a:t>To be able to experiment with the code examples, you will need access to a MongoDB database.</a:t>
             </a:r>
             <a:endParaRPr lang="en-US"/>
           </a:p>
@@ -12168,95 +12590,7 @@
 </p:sld>
 </file>
 
-<file path=ppt/slides/slide50.xml><?xml version="1.0" encoding="utf-8"?>
-<p:sld xmlns:a="http://schemas.openxmlformats.org/drawingml/2006/main" xmlns:r="http://schemas.openxmlformats.org/officeDocument/2006/relationships" xmlns:p="http://schemas.openxmlformats.org/presentationml/2006/main">
-  <p:cSld>
-    <p:spTree>
-      <p:nvGrpSpPr>
-        <p:cNvPr id="1" name=""/>
-        <p:cNvGrpSpPr/>
-        <p:nvPr/>
-      </p:nvGrpSpPr>
-      <p:grpSpPr/>
-      <p:sp>
-        <p:nvSpPr>
-          <p:cNvPr id="2" name="Title 1"/>
-          <p:cNvSpPr>
-            <a:spLocks noGrp="1"/>
-          </p:cNvSpPr>
-          <p:nvPr>
-            <p:ph type="title"/>
-          </p:nvPr>
-        </p:nvSpPr>
-        <p:spPr/>
-        <p:txBody>
-          <a:bodyPr/>
-          <a:p>
-            <a:r>
-              <a:rPr lang="en-US"/>
-              <a:t>Local vs Cloud Database</a:t>
-            </a:r>
-            <a:endParaRPr lang="en-US"/>
-          </a:p>
-        </p:txBody>
-      </p:sp>
-      <p:sp>
-        <p:nvSpPr>
-          <p:cNvPr id="3" name="Content Placeholder 2"/>
-          <p:cNvSpPr>
-            <a:spLocks noGrp="1"/>
-          </p:cNvSpPr>
-          <p:nvPr>
-            <p:ph idx="1"/>
-          </p:nvPr>
-        </p:nvSpPr>
-        <p:spPr/>
-        <p:txBody>
-          <a:bodyPr>
-            <a:normAutofit fontScale="90000"/>
-          </a:bodyPr>
-          <a:p>
-            <a:r>
-              <a:rPr lang="en-US"/>
-              <a:t>MongoDB can be installed locally, which will allow you to host your own MongoDB server on your hardware. This requires you to manage your server, upgrades, and any other maintenance.</a:t>
-            </a:r>
-            <a:endParaRPr lang="en-US"/>
-          </a:p>
-          <a:p>
-            <a:r>
-              <a:rPr lang="en-US"/>
-              <a:t>You can download and use the MongoDB open source Community Server on your hardware for free.</a:t>
-            </a:r>
-            <a:endParaRPr lang="en-US"/>
-          </a:p>
-          <a:p>
-            <a:endParaRPr lang="en-US"/>
-          </a:p>
-          <a:p>
-            <a:r>
-              <a:rPr lang="en-US"/>
-              <a:t>on the other hand, you can use MongoDB Atlas, a cloud database platform. This is much easier than hosting your own local database.</a:t>
-            </a:r>
-            <a:endParaRPr lang="en-US"/>
-          </a:p>
-          <a:p>
-            <a:r>
-              <a:rPr lang="en-US"/>
-              <a:t>To be able to experiment with the code examples, you will need access to a MongoDB database.</a:t>
-            </a:r>
-            <a:endParaRPr lang="en-US"/>
-          </a:p>
-        </p:txBody>
-      </p:sp>
-    </p:spTree>
-  </p:cSld>
-  <p:clrMapOvr>
-    <a:masterClrMapping/>
-  </p:clrMapOvr>
-</p:sld>
-</file>
-
-<file path=ppt/slides/slide51.xml><?xml version="1.0" encoding="utf-8"?>
+<file path=ppt/slides/slide55.xml><?xml version="1.0" encoding="utf-8"?>
 <p:sld xmlns:a="http://schemas.openxmlformats.org/drawingml/2006/main" xmlns:r="http://schemas.openxmlformats.org/officeDocument/2006/relationships" xmlns:p="http://schemas.openxmlformats.org/presentationml/2006/main">
   <p:cSld>
     <p:spTree>
@@ -12322,7 +12656,7 @@
 </p:sld>
 </file>
 
-<file path=ppt/slides/slide52.xml><?xml version="1.0" encoding="utf-8"?>
+<file path=ppt/slides/slide56.xml><?xml version="1.0" encoding="utf-8"?>
 <p:sld xmlns:a="http://schemas.openxmlformats.org/drawingml/2006/main" xmlns:r="http://schemas.openxmlformats.org/officeDocument/2006/relationships" xmlns:p="http://schemas.openxmlformats.org/presentationml/2006/main">
   <p:cSld>
     <p:spTree>
@@ -12386,7 +12720,7 @@
 </p:sld>
 </file>
 
-<file path=ppt/slides/slide53.xml><?xml version="1.0" encoding="utf-8"?>
+<file path=ppt/slides/slide57.xml><?xml version="1.0" encoding="utf-8"?>
 <p:sld xmlns:a="http://schemas.openxmlformats.org/drawingml/2006/main" xmlns:r="http://schemas.openxmlformats.org/officeDocument/2006/relationships" xmlns:p="http://schemas.openxmlformats.org/presentationml/2006/main">
   <p:cSld>
     <p:spTree>
@@ -12448,7 +12782,7 @@
 </p:sld>
 </file>
 
-<file path=ppt/slides/slide54.xml><?xml version="1.0" encoding="utf-8"?>
+<file path=ppt/slides/slide58.xml><?xml version="1.0" encoding="utf-8"?>
 <p:sld xmlns:a="http://schemas.openxmlformats.org/drawingml/2006/main" xmlns:r="http://schemas.openxmlformats.org/officeDocument/2006/relationships" xmlns:p="http://schemas.openxmlformats.org/presentationml/2006/main">
   <p:cSld>
     <p:spTree>
@@ -12510,7 +12844,7 @@
 </p:sld>
 </file>
 
-<file path=ppt/slides/slide55.xml><?xml version="1.0" encoding="utf-8"?>
+<file path=ppt/slides/slide59.xml><?xml version="1.0" encoding="utf-8"?>
 <p:sld xmlns:a="http://schemas.openxmlformats.org/drawingml/2006/main" xmlns:r="http://schemas.openxmlformats.org/officeDocument/2006/relationships" xmlns:p="http://schemas.openxmlformats.org/presentationml/2006/main">
   <p:cSld>
     <p:spTree>
@@ -12684,72 +13018,6 @@
           </a:p>
         </p:txBody>
       </p:sp>
-    </p:spTree>
-  </p:cSld>
-  <p:clrMapOvr>
-    <a:masterClrMapping/>
-  </p:clrMapOvr>
-</p:sld>
-</file>
-
-<file path=ppt/slides/slide56.xml><?xml version="1.0" encoding="utf-8"?>
-<p:sld xmlns:a="http://schemas.openxmlformats.org/drawingml/2006/main" xmlns:r="http://schemas.openxmlformats.org/officeDocument/2006/relationships" xmlns:p="http://schemas.openxmlformats.org/presentationml/2006/main">
-  <p:cSld>
-    <p:spTree>
-      <p:nvGrpSpPr>
-        <p:cNvPr id="1" name=""/>
-        <p:cNvGrpSpPr/>
-        <p:nvPr/>
-      </p:nvGrpSpPr>
-      <p:grpSpPr/>
-      <p:sp>
-        <p:nvSpPr>
-          <p:cNvPr id="2" name="Title 1"/>
-          <p:cNvSpPr>
-            <a:spLocks noGrp="1"/>
-          </p:cNvSpPr>
-          <p:nvPr>
-            <p:ph type="title"/>
-          </p:nvPr>
-        </p:nvSpPr>
-        <p:spPr/>
-        <p:txBody>
-          <a:bodyPr/>
-          <a:p>
-            <a:r>
-              <a:rPr lang="en-US"/>
-              <a:t>Questions </a:t>
-            </a:r>
-            <a:endParaRPr lang="en-US"/>
-          </a:p>
-        </p:txBody>
-      </p:sp>
-      <p:pic>
-        <p:nvPicPr>
-          <p:cNvPr id="100" name="Picture 99"/>
-          <p:cNvPicPr/>
-          <p:nvPr/>
-        </p:nvPicPr>
-        <p:blipFill>
-          <a:blip r:embed="rId1"/>
-          <a:stretch>
-            <a:fillRect/>
-          </a:stretch>
-        </p:blipFill>
-        <p:spPr>
-          <a:xfrm>
-            <a:off x="3168015" y="1355725"/>
-            <a:ext cx="7316470" cy="4617720"/>
-          </a:xfrm>
-          <a:prstGeom prst="rect">
-            <a:avLst/>
-          </a:prstGeom>
-          <a:noFill/>
-          <a:ln w="9525">
-            <a:noFill/>
-          </a:ln>
-        </p:spPr>
-      </p:pic>
     </p:spTree>
   </p:cSld>
   <p:clrMapOvr>
@@ -13357,6 +13625,72 @@
 </p:sld>
 </file>
 
+<file path=ppt/slides/slide60.xml><?xml version="1.0" encoding="utf-8"?>
+<p:sld xmlns:a="http://schemas.openxmlformats.org/drawingml/2006/main" xmlns:r="http://schemas.openxmlformats.org/officeDocument/2006/relationships" xmlns:p="http://schemas.openxmlformats.org/presentationml/2006/main">
+  <p:cSld>
+    <p:spTree>
+      <p:nvGrpSpPr>
+        <p:cNvPr id="1" name=""/>
+        <p:cNvGrpSpPr/>
+        <p:nvPr/>
+      </p:nvGrpSpPr>
+      <p:grpSpPr/>
+      <p:sp>
+        <p:nvSpPr>
+          <p:cNvPr id="2" name="Title 1"/>
+          <p:cNvSpPr>
+            <a:spLocks noGrp="1"/>
+          </p:cNvSpPr>
+          <p:nvPr>
+            <p:ph type="title"/>
+          </p:nvPr>
+        </p:nvSpPr>
+        <p:spPr/>
+        <p:txBody>
+          <a:bodyPr/>
+          <a:p>
+            <a:r>
+              <a:rPr lang="en-US"/>
+              <a:t>Questions </a:t>
+            </a:r>
+            <a:endParaRPr lang="en-US"/>
+          </a:p>
+        </p:txBody>
+      </p:sp>
+      <p:pic>
+        <p:nvPicPr>
+          <p:cNvPr id="100" name="Picture 99"/>
+          <p:cNvPicPr/>
+          <p:nvPr/>
+        </p:nvPicPr>
+        <p:blipFill>
+          <a:blip r:embed="rId1"/>
+          <a:stretch>
+            <a:fillRect/>
+          </a:stretch>
+        </p:blipFill>
+        <p:spPr>
+          <a:xfrm>
+            <a:off x="3168015" y="1355725"/>
+            <a:ext cx="7316470" cy="4617720"/>
+          </a:xfrm>
+          <a:prstGeom prst="rect">
+            <a:avLst/>
+          </a:prstGeom>
+          <a:noFill/>
+          <a:ln w="9525">
+            <a:noFill/>
+          </a:ln>
+        </p:spPr>
+      </p:pic>
+    </p:spTree>
+  </p:cSld>
+  <p:clrMapOvr>
+    <a:masterClrMapping/>
+  </p:clrMapOvr>
+</p:sld>
+</file>
+
 <file path=ppt/slides/slide7.xml><?xml version="1.0" encoding="utf-8"?>
 <p:sld xmlns:a="http://schemas.openxmlformats.org/drawingml/2006/main" xmlns:r="http://schemas.openxmlformats.org/officeDocument/2006/relationships" xmlns:p="http://schemas.openxmlformats.org/presentationml/2006/main">
   <p:cSld>

</xml_diff>

<commit_message>
Update 02 EDABDC - Data Models - part 1.pptx
</commit_message>
<xml_diff>
--- a/PPT slides/02 EDABDC - Data Models - part 1.pptx
+++ b/PPT slides/02 EDABDC - Data Models - part 1.pptx
@@ -36,38 +36,39 @@
     <p:sldId id="312" r:id="rId29"/>
     <p:sldId id="427" r:id="rId30"/>
     <p:sldId id="317" r:id="rId31"/>
-    <p:sldId id="319" r:id="rId32"/>
-    <p:sldId id="326" r:id="rId33"/>
-    <p:sldId id="320" r:id="rId34"/>
-    <p:sldId id="321" r:id="rId35"/>
-    <p:sldId id="322" r:id="rId36"/>
-    <p:sldId id="382" r:id="rId37"/>
-    <p:sldId id="323" r:id="rId38"/>
-    <p:sldId id="324" r:id="rId39"/>
-    <p:sldId id="387" r:id="rId40"/>
-    <p:sldId id="422" r:id="rId41"/>
-    <p:sldId id="385" r:id="rId42"/>
-    <p:sldId id="339" r:id="rId43"/>
-    <p:sldId id="340" r:id="rId44"/>
-    <p:sldId id="341" r:id="rId45"/>
-    <p:sldId id="342" r:id="rId46"/>
-    <p:sldId id="343" r:id="rId47"/>
-    <p:sldId id="344" r:id="rId48"/>
-    <p:sldId id="345" r:id="rId49"/>
-    <p:sldId id="346" r:id="rId50"/>
-    <p:sldId id="347" r:id="rId51"/>
-    <p:sldId id="349" r:id="rId52"/>
-    <p:sldId id="348" r:id="rId53"/>
-    <p:sldId id="350" r:id="rId54"/>
-    <p:sldId id="423" r:id="rId55"/>
-    <p:sldId id="424" r:id="rId56"/>
-    <p:sldId id="425" r:id="rId57"/>
-    <p:sldId id="426" r:id="rId58"/>
-    <p:sldId id="457" r:id="rId59"/>
-    <p:sldId id="458" r:id="rId60"/>
-    <p:sldId id="461" r:id="rId61"/>
-    <p:sldId id="459" r:id="rId62"/>
-    <p:sldId id="264" r:id="rId63"/>
+    <p:sldId id="571" r:id="rId32"/>
+    <p:sldId id="319" r:id="rId33"/>
+    <p:sldId id="326" r:id="rId34"/>
+    <p:sldId id="320" r:id="rId35"/>
+    <p:sldId id="321" r:id="rId36"/>
+    <p:sldId id="322" r:id="rId37"/>
+    <p:sldId id="382" r:id="rId38"/>
+    <p:sldId id="323" r:id="rId39"/>
+    <p:sldId id="324" r:id="rId40"/>
+    <p:sldId id="387" r:id="rId41"/>
+    <p:sldId id="422" r:id="rId42"/>
+    <p:sldId id="385" r:id="rId43"/>
+    <p:sldId id="339" r:id="rId44"/>
+    <p:sldId id="340" r:id="rId45"/>
+    <p:sldId id="341" r:id="rId46"/>
+    <p:sldId id="342" r:id="rId47"/>
+    <p:sldId id="343" r:id="rId48"/>
+    <p:sldId id="344" r:id="rId49"/>
+    <p:sldId id="345" r:id="rId50"/>
+    <p:sldId id="346" r:id="rId51"/>
+    <p:sldId id="347" r:id="rId52"/>
+    <p:sldId id="349" r:id="rId53"/>
+    <p:sldId id="348" r:id="rId54"/>
+    <p:sldId id="350" r:id="rId55"/>
+    <p:sldId id="423" r:id="rId56"/>
+    <p:sldId id="424" r:id="rId57"/>
+    <p:sldId id="425" r:id="rId58"/>
+    <p:sldId id="426" r:id="rId59"/>
+    <p:sldId id="457" r:id="rId60"/>
+    <p:sldId id="458" r:id="rId61"/>
+    <p:sldId id="461" r:id="rId62"/>
+    <p:sldId id="459" r:id="rId63"/>
+    <p:sldId id="264" r:id="rId64"/>
   </p:sldIdLst>
   <p:sldSz cx="12192000" cy="6858000"/>
   <p:notesSz cx="6858000" cy="9144000"/>
@@ -8246,42 +8247,39 @@
           <a:bodyPr/>
           <a:p>
             <a:r>
-              <a:rPr lang="en-US"/>
-              <a:t>Relations in Relational data model (RDM)</a:t>
-            </a:r>
-            <a:endParaRPr lang="en-US"/>
-          </a:p>
-        </p:txBody>
-      </p:sp>
-      <p:sp>
-        <p:nvSpPr>
-          <p:cNvPr id="3" name="Content Placeholder 2"/>
-          <p:cNvSpPr>
-            <a:spLocks noGrp="1"/>
-          </p:cNvSpPr>
+              <a:rPr lang="en-US" altLang="en-GB"/>
+              <a:t>Client server model </a:t>
+            </a:r>
+            <a:endParaRPr lang="en-US" altLang="en-GB"/>
+          </a:p>
+        </p:txBody>
+      </p:sp>
+      <p:pic>
+        <p:nvPicPr>
+          <p:cNvPr id="4" name="Content Placeholder 3"/>
+          <p:cNvPicPr>
+            <a:picLocks noChangeAspect="1"/>
+          </p:cNvPicPr>
           <p:nvPr>
             <p:ph idx="1"/>
           </p:nvPr>
-        </p:nvSpPr>
-        <p:spPr/>
-        <p:txBody>
-          <a:bodyPr/>
-          <a:p>
-            <a:r>
-              <a:rPr lang="en-US"/>
-              <a:t>In a relational data model, relationships between entities (tables) are crucial for organizing and structuring the data effectively. </a:t>
-            </a:r>
-            <a:endParaRPr lang="en-US"/>
-          </a:p>
-          <a:p>
-            <a:r>
-              <a:rPr lang="en-US"/>
-              <a:t>These relationships help in defining how data in one table is related to data in another table. </a:t>
-            </a:r>
-            <a:endParaRPr lang="en-US"/>
-          </a:p>
-        </p:txBody>
-      </p:sp>
+        </p:nvPicPr>
+        <p:blipFill>
+          <a:blip r:embed="rId1"/>
+          <a:stretch>
+            <a:fillRect/>
+          </a:stretch>
+        </p:blipFill>
+        <p:spPr>
+          <a:xfrm>
+            <a:off x="3126105" y="1825625"/>
+            <a:ext cx="5938520" cy="4351655"/>
+          </a:xfrm>
+          <a:prstGeom prst="rect">
+            <a:avLst/>
+          </a:prstGeom>
+        </p:spPr>
+      </p:pic>
     </p:spTree>
   </p:cSld>
   <p:clrMapOvr>
@@ -8434,10 +8432,8 @@
           <a:bodyPr/>
           <a:p>
             <a:r>
-              <a:rPr lang="en-US">
-                <a:sym typeface="+mn-ea"/>
-              </a:rPr>
-              <a:t>Keys in Relationships</a:t>
+              <a:rPr lang="en-US"/>
+              <a:t>Relations in Relational data model (RDM)</a:t>
             </a:r>
             <a:endParaRPr lang="en-US"/>
           </a:p>
@@ -8459,14 +8455,14 @@
           <a:p>
             <a:r>
               <a:rPr lang="en-US"/>
-              <a:t>Primary Key (PK): A unique identifier for a record in a table.</a:t>
-            </a:r>
-            <a:endParaRPr lang="en-US"/>
-          </a:p>
-          <a:p>
-            <a:r>
-              <a:rPr lang="en-US"/>
-              <a:t>Foreign Key (FK): A field in one table that uniquely identifies a row of another table. It is used to establish and enforce a link between the data in the two tables.</a:t>
+              <a:t>In a relational data model, relationships between entities (tables) are crucial for organizing and structuring the data effectively. </a:t>
+            </a:r>
+            <a:endParaRPr lang="en-US"/>
+          </a:p>
+          <a:p>
+            <a:r>
+              <a:rPr lang="en-US"/>
+              <a:t>These relationships help in defining how data in one table is related to data in another table. </a:t>
             </a:r>
             <a:endParaRPr lang="en-US"/>
           </a:p>
@@ -8502,13 +8498,13 @@
         </p:nvSpPr>
         <p:spPr/>
         <p:txBody>
-          <a:bodyPr>
-            <a:normAutofit/>
-          </a:bodyPr>
-          <a:p>
-            <a:r>
-              <a:rPr lang="en-US"/>
-              <a:t>One-to-Many (1:N) Relationship</a:t>
+          <a:bodyPr/>
+          <a:p>
+            <a:r>
+              <a:rPr lang="en-US">
+                <a:sym typeface="+mn-ea"/>
+              </a:rPr>
+              <a:t>Keys in Relationships</a:t>
             </a:r>
             <a:endParaRPr lang="en-US"/>
           </a:p>
@@ -8530,7 +8526,14 @@
           <a:p>
             <a:r>
               <a:rPr lang="en-US"/>
-              <a:t>In a one-to-many relationship, a record in one table (the "one" side) can be related to multiple records in another table (the "many" side), but each record in the "many" side is related to only one record in the "one" side. This is the most common type of relationship.</a:t>
+              <a:t>Primary Key (PK): A unique identifier for a record in a table.</a:t>
+            </a:r>
+            <a:endParaRPr lang="en-US"/>
+          </a:p>
+          <a:p>
+            <a:r>
+              <a:rPr lang="en-US"/>
+              <a:t>Foreign Key (FK): A field in one table that uniquely identifies a row of another table. It is used to establish and enforce a link between the data in the two tables.</a:t>
             </a:r>
             <a:endParaRPr lang="en-US"/>
           </a:p>
@@ -8567,135 +8570,34 @@
         <p:spPr/>
         <p:txBody>
           <a:bodyPr>
-            <a:normAutofit fontScale="90000"/>
-          </a:bodyPr>
-          <a:p>
-            <a:r>
-              <a:rPr lang="ar-EG" altLang="en-US"/>
-              <a:t>1</a:t>
-            </a:r>
-            <a:r>
-              <a:rPr lang="en-US" altLang="ar-EG"/>
-              <a:t>:N relationship example: </a:t>
-            </a:r>
-            <a:r>
-              <a:rPr lang="en-US">
-                <a:sym typeface="+mn-ea"/>
-              </a:rPr>
-              <a:t>two tables, Department and Employee.</a:t>
-            </a:r>
-            <a:r>
-              <a:rPr lang="en-US" altLang="ar-EG"/>
-              <a:t> </a:t>
-            </a:r>
-            <a:endParaRPr lang="en-US" altLang="ar-EG"/>
-          </a:p>
-        </p:txBody>
-      </p:sp>
-      <p:sp>
-        <p:nvSpPr>
-          <p:cNvPr id="3" name="Content Placeholder 2"/>
-          <p:cNvSpPr>
-            <a:spLocks noGrp="1"/>
-          </p:cNvSpPr>
-          <p:nvPr>
-            <p:ph idx="1"/>
-          </p:nvPr>
-        </p:nvSpPr>
-        <p:spPr>
-          <a:xfrm>
-            <a:off x="838200" y="1825625"/>
-            <a:ext cx="10958830" cy="4826635"/>
-          </a:xfrm>
-        </p:spPr>
-        <p:txBody>
-          <a:bodyPr>
             <a:normAutofit/>
           </a:bodyPr>
           <a:p>
             <a:r>
               <a:rPr lang="en-US"/>
-              <a:t>Department table: Contains information about departments.</a:t>
-            </a:r>
-            <a:endParaRPr lang="en-US"/>
-          </a:p>
-          <a:p>
-            <a:r>
-              <a:rPr lang="en-US"/>
-              <a:t>Employee table: Contains information about employees.</a:t>
-            </a:r>
-            <a:endParaRPr lang="en-US"/>
-          </a:p>
-          <a:p>
-            <a:r>
-              <a:rPr lang="en-US"/>
-              <a:t>Each department can have multiple employees, but each employee belongs to only one department.</a:t>
-            </a:r>
-            <a:endParaRPr lang="en-US"/>
-          </a:p>
-          <a:p>
-            <a:pPr marL="0" indent="0">
-              <a:buNone/>
-            </a:pPr>
-            <a:endParaRPr lang="en-US"/>
-          </a:p>
-          <a:p>
-            <a:pPr marL="457200" lvl="1" indent="0">
-              <a:buNone/>
-            </a:pPr>
-            <a:r>
-              <a:rPr lang="en-US"/>
-              <a:t>Department                 			Employee</a:t>
-            </a:r>
-            <a:endParaRPr lang="en-US"/>
-          </a:p>
-          <a:p>
-            <a:pPr marL="457200" lvl="1" indent="0">
-              <a:buNone/>
-            </a:pPr>
-            <a:r>
-              <a:rPr lang="en-US"/>
-              <a:t>-----------                				-----------</a:t>
-            </a:r>
-            <a:endParaRPr lang="en-US"/>
-          </a:p>
-          <a:p>
-            <a:pPr marL="457200" lvl="1" indent="0">
-              <a:buNone/>
-            </a:pPr>
-            <a:r>
-              <a:rPr lang="en-US"/>
-              <a:t>DepartmentID (PK)          			EmployeeID (PK)</a:t>
-            </a:r>
-            <a:endParaRPr lang="en-US"/>
-          </a:p>
-          <a:p>
-            <a:pPr marL="457200" lvl="1" indent="0">
-              <a:buNone/>
-            </a:pPr>
-            <a:r>
-              <a:rPr lang="en-US"/>
-              <a:t>DepartmentName             			Name</a:t>
-            </a:r>
-            <a:endParaRPr lang="en-US"/>
-          </a:p>
-          <a:p>
-            <a:pPr marL="457200" lvl="1" indent="0">
-              <a:buNone/>
-            </a:pPr>
-            <a:r>
-              <a:rPr lang="en-US"/>
-              <a:t>                           				DateOfBirth</a:t>
-            </a:r>
-            <a:endParaRPr lang="en-US"/>
-          </a:p>
-          <a:p>
-            <a:pPr marL="457200" lvl="1" indent="0">
-              <a:buNone/>
-            </a:pPr>
-            <a:r>
-              <a:rPr lang="en-US"/>
-              <a:t>                           				DepartmentID (FK)</a:t>
+              <a:t>One-to-Many (1:N) Relationship</a:t>
+            </a:r>
+            <a:endParaRPr lang="en-US"/>
+          </a:p>
+        </p:txBody>
+      </p:sp>
+      <p:sp>
+        <p:nvSpPr>
+          <p:cNvPr id="3" name="Content Placeholder 2"/>
+          <p:cNvSpPr>
+            <a:spLocks noGrp="1"/>
+          </p:cNvSpPr>
+          <p:nvPr>
+            <p:ph idx="1"/>
+          </p:nvPr>
+        </p:nvSpPr>
+        <p:spPr/>
+        <p:txBody>
+          <a:bodyPr/>
+          <a:p>
+            <a:r>
+              <a:rPr lang="en-US"/>
+              <a:t>In a one-to-many relationship, a record in one table (the "one" side) can be related to multiple records in another table (the "many" side), but each record in the "many" side is related to only one record in the "one" side. This is the most common type of relationship.</a:t>
             </a:r>
             <a:endParaRPr lang="en-US"/>
           </a:p>
@@ -8710,6 +8612,171 @@
 </file>
 
 <file path=ppt/slides/slide33.xml><?xml version="1.0" encoding="utf-8"?>
+<p:sld xmlns:a="http://schemas.openxmlformats.org/drawingml/2006/main" xmlns:r="http://schemas.openxmlformats.org/officeDocument/2006/relationships" xmlns:p="http://schemas.openxmlformats.org/presentationml/2006/main">
+  <p:cSld>
+    <p:spTree>
+      <p:nvGrpSpPr>
+        <p:cNvPr id="1" name=""/>
+        <p:cNvGrpSpPr/>
+        <p:nvPr/>
+      </p:nvGrpSpPr>
+      <p:grpSpPr/>
+      <p:sp>
+        <p:nvSpPr>
+          <p:cNvPr id="2" name="Title 1"/>
+          <p:cNvSpPr>
+            <a:spLocks noGrp="1"/>
+          </p:cNvSpPr>
+          <p:nvPr>
+            <p:ph type="title"/>
+          </p:nvPr>
+        </p:nvSpPr>
+        <p:spPr/>
+        <p:txBody>
+          <a:bodyPr>
+            <a:normAutofit fontScale="90000"/>
+          </a:bodyPr>
+          <a:p>
+            <a:r>
+              <a:rPr lang="ar-EG" altLang="en-US"/>
+              <a:t>1</a:t>
+            </a:r>
+            <a:r>
+              <a:rPr lang="en-US" altLang="ar-EG"/>
+              <a:t>:N relationship example: </a:t>
+            </a:r>
+            <a:r>
+              <a:rPr lang="en-US">
+                <a:sym typeface="+mn-ea"/>
+              </a:rPr>
+              <a:t>two tables, Department and Employee.</a:t>
+            </a:r>
+            <a:r>
+              <a:rPr lang="en-US" altLang="ar-EG"/>
+              <a:t> </a:t>
+            </a:r>
+            <a:endParaRPr lang="en-US" altLang="ar-EG"/>
+          </a:p>
+        </p:txBody>
+      </p:sp>
+      <p:sp>
+        <p:nvSpPr>
+          <p:cNvPr id="3" name="Content Placeholder 2"/>
+          <p:cNvSpPr>
+            <a:spLocks noGrp="1"/>
+          </p:cNvSpPr>
+          <p:nvPr>
+            <p:ph idx="1"/>
+          </p:nvPr>
+        </p:nvSpPr>
+        <p:spPr>
+          <a:xfrm>
+            <a:off x="838200" y="1825625"/>
+            <a:ext cx="10958830" cy="4826635"/>
+          </a:xfrm>
+        </p:spPr>
+        <p:txBody>
+          <a:bodyPr>
+            <a:normAutofit/>
+          </a:bodyPr>
+          <a:p>
+            <a:r>
+              <a:rPr lang="en-US"/>
+              <a:t>Department table: Contains information about departments.</a:t>
+            </a:r>
+            <a:endParaRPr lang="en-US"/>
+          </a:p>
+          <a:p>
+            <a:r>
+              <a:rPr lang="en-US"/>
+              <a:t>Employee table: Contains information about employees.</a:t>
+            </a:r>
+            <a:endParaRPr lang="en-US"/>
+          </a:p>
+          <a:p>
+            <a:r>
+              <a:rPr lang="en-US"/>
+              <a:t>Each department can have multiple employees, but each employee belongs to only one department.</a:t>
+            </a:r>
+            <a:endParaRPr lang="en-US"/>
+          </a:p>
+          <a:p>
+            <a:pPr marL="0" indent="0">
+              <a:buNone/>
+            </a:pPr>
+            <a:endParaRPr lang="en-US"/>
+          </a:p>
+          <a:p>
+            <a:pPr marL="457200" lvl="1" indent="0">
+              <a:buNone/>
+            </a:pPr>
+            <a:r>
+              <a:rPr lang="en-US"/>
+              <a:t>Department                 			Employee</a:t>
+            </a:r>
+            <a:endParaRPr lang="en-US"/>
+          </a:p>
+          <a:p>
+            <a:pPr marL="457200" lvl="1" indent="0">
+              <a:buNone/>
+            </a:pPr>
+            <a:r>
+              <a:rPr lang="en-US"/>
+              <a:t>-----------                				-----------</a:t>
+            </a:r>
+            <a:endParaRPr lang="en-US"/>
+          </a:p>
+          <a:p>
+            <a:pPr marL="457200" lvl="1" indent="0">
+              <a:buNone/>
+            </a:pPr>
+            <a:r>
+              <a:rPr lang="en-US"/>
+              <a:t>DepartmentID (PK)          			EmployeeID (PK)</a:t>
+            </a:r>
+            <a:endParaRPr lang="en-US"/>
+          </a:p>
+          <a:p>
+            <a:pPr marL="457200" lvl="1" indent="0">
+              <a:buNone/>
+            </a:pPr>
+            <a:r>
+              <a:rPr lang="en-US"/>
+              <a:t>DepartmentName             			Name</a:t>
+            </a:r>
+            <a:endParaRPr lang="en-US"/>
+          </a:p>
+          <a:p>
+            <a:pPr marL="457200" lvl="1" indent="0">
+              <a:buNone/>
+            </a:pPr>
+            <a:r>
+              <a:rPr lang="en-US"/>
+              <a:t>                           				DateOfBirth</a:t>
+            </a:r>
+            <a:endParaRPr lang="en-US"/>
+          </a:p>
+          <a:p>
+            <a:pPr marL="457200" lvl="1" indent="0">
+              <a:buNone/>
+            </a:pPr>
+            <a:r>
+              <a:rPr lang="en-US"/>
+              <a:t>                           				DepartmentID (FK)</a:t>
+            </a:r>
+            <a:endParaRPr lang="en-US"/>
+          </a:p>
+        </p:txBody>
+      </p:sp>
+    </p:spTree>
+  </p:cSld>
+  <p:clrMapOvr>
+    <a:masterClrMapping/>
+  </p:clrMapOvr>
+</p:sld>
+</file>
+
+<file path=ppt/slides/slide34.xml><?xml version="1.0" encoding="utf-8"?>
 <p:sld xmlns:a="http://schemas.openxmlformats.org/drawingml/2006/main" xmlns:r="http://schemas.openxmlformats.org/officeDocument/2006/relationships" xmlns:p="http://schemas.openxmlformats.org/presentationml/2006/main">
   <p:cSld>
     <p:spTree>
@@ -8776,7 +8843,7 @@
 </p:sld>
 </file>
 
-<file path=ppt/slides/slide34.xml><?xml version="1.0" encoding="utf-8"?>
+<file path=ppt/slides/slide35.xml><?xml version="1.0" encoding="utf-8"?>
 <p:sld xmlns:a="http://schemas.openxmlformats.org/drawingml/2006/main" xmlns:r="http://schemas.openxmlformats.org/officeDocument/2006/relationships" xmlns:p="http://schemas.openxmlformats.org/presentationml/2006/main">
   <p:cSld>
     <p:spTree>
@@ -8818,7 +8885,7 @@
 </p:sld>
 </file>
 
-<file path=ppt/slides/slide35.xml><?xml version="1.0" encoding="utf-8"?>
+<file path=ppt/slides/slide36.xml><?xml version="1.0" encoding="utf-8"?>
 <p:sld xmlns:a="http://schemas.openxmlformats.org/drawingml/2006/main" xmlns:r="http://schemas.openxmlformats.org/officeDocument/2006/relationships" xmlns:p="http://schemas.openxmlformats.org/presentationml/2006/main">
   <p:cSld>
     <p:spTree>
@@ -8892,7 +8959,7 @@
 </p:sld>
 </file>
 
-<file path=ppt/slides/slide36.xml><?xml version="1.0" encoding="utf-8"?>
+<file path=ppt/slides/slide37.xml><?xml version="1.0" encoding="utf-8"?>
 <p:sld xmlns:a="http://schemas.openxmlformats.org/drawingml/2006/main" xmlns:r="http://schemas.openxmlformats.org/officeDocument/2006/relationships" xmlns:p="http://schemas.openxmlformats.org/presentationml/2006/main">
   <p:cSld>
     <p:spTree>
@@ -8956,7 +9023,7 @@
 </p:sld>
 </file>
 
-<file path=ppt/slides/slide37.xml><?xml version="1.0" encoding="utf-8"?>
+<file path=ppt/slides/slide38.xml><?xml version="1.0" encoding="utf-8"?>
 <p:sld xmlns:a="http://schemas.openxmlformats.org/drawingml/2006/main" xmlns:r="http://schemas.openxmlformats.org/officeDocument/2006/relationships" xmlns:p="http://schemas.openxmlformats.org/presentationml/2006/main">
   <p:cSld>
     <p:spTree>
@@ -9018,7 +9085,7 @@
 </p:sld>
 </file>
 
-<file path=ppt/slides/slide38.xml><?xml version="1.0" encoding="utf-8"?>
+<file path=ppt/slides/slide39.xml><?xml version="1.0" encoding="utf-8"?>
 <p:sld xmlns:a="http://schemas.openxmlformats.org/drawingml/2006/main" xmlns:r="http://schemas.openxmlformats.org/officeDocument/2006/relationships" xmlns:p="http://schemas.openxmlformats.org/presentationml/2006/main">
   <p:cSld>
     <p:spTree>
@@ -9060,110 +9127,6 @@
 </p:sld>
 </file>
 
-<file path=ppt/slides/slide39.xml><?xml version="1.0" encoding="utf-8"?>
-<p:sld xmlns:a="http://schemas.openxmlformats.org/drawingml/2006/main" xmlns:r="http://schemas.openxmlformats.org/officeDocument/2006/relationships" xmlns:p="http://schemas.openxmlformats.org/presentationml/2006/main">
-  <p:cSld>
-    <p:spTree>
-      <p:nvGrpSpPr>
-        <p:cNvPr id="1" name=""/>
-        <p:cNvGrpSpPr/>
-        <p:nvPr/>
-      </p:nvGrpSpPr>
-      <p:grpSpPr/>
-      <p:sp>
-        <p:nvSpPr>
-          <p:cNvPr id="2" name="Title 1"/>
-          <p:cNvSpPr>
-            <a:spLocks noGrp="1"/>
-          </p:cNvSpPr>
-          <p:nvPr>
-            <p:ph type="title"/>
-          </p:nvPr>
-        </p:nvSpPr>
-        <p:spPr/>
-        <p:txBody>
-          <a:bodyPr/>
-          <a:p>
-            <a:r>
-              <a:rPr lang="en-US"/>
-              <a:t>Common data models</a:t>
-            </a:r>
-            <a:endParaRPr lang="en-US"/>
-          </a:p>
-        </p:txBody>
-      </p:sp>
-      <p:sp>
-        <p:nvSpPr>
-          <p:cNvPr id="3" name="Content Placeholder 2"/>
-          <p:cNvSpPr>
-            <a:spLocks noGrp="1"/>
-          </p:cNvSpPr>
-          <p:nvPr>
-            <p:ph idx="1"/>
-          </p:nvPr>
-        </p:nvSpPr>
-        <p:spPr/>
-        <p:txBody>
-          <a:bodyPr/>
-          <a:p>
-            <a:r>
-              <a:rPr lang="en-US"/>
-              <a:t>Hierarchical Data Model </a:t>
-            </a:r>
-            <a:endParaRPr lang="en-US"/>
-          </a:p>
-          <a:p>
-            <a:r>
-              <a:rPr lang="en-US"/>
-              <a:t>Relational Data Model</a:t>
-            </a:r>
-            <a:endParaRPr lang="en-US"/>
-          </a:p>
-          <a:p>
-            <a:r>
-              <a:rPr lang="en-US"/>
-              <a:t>Entity-Relationship Model (ER Model)</a:t>
-            </a:r>
-            <a:endParaRPr lang="en-US"/>
-          </a:p>
-          <a:p>
-            <a:r>
-              <a:rPr lang="en-US" b="1"/>
-              <a:t>Document Data Model</a:t>
-            </a:r>
-            <a:endParaRPr lang="en-US" b="1"/>
-          </a:p>
-          <a:p>
-            <a:r>
-              <a:rPr lang="en-US"/>
-              <a:t>Key-Value Data Mode</a:t>
-            </a:r>
-            <a:endParaRPr lang="en-US"/>
-          </a:p>
-          <a:p>
-            <a:r>
-              <a:rPr lang="en-US"/>
-              <a:t>Graph Data Model</a:t>
-            </a:r>
-            <a:endParaRPr lang="en-US"/>
-          </a:p>
-          <a:p>
-            <a:r>
-              <a:rPr lang="en-US"/>
-              <a:t>Multi-Model Databases</a:t>
-            </a:r>
-            <a:endParaRPr lang="en-US"/>
-          </a:p>
-        </p:txBody>
-      </p:sp>
-    </p:spTree>
-  </p:cSld>
-  <p:clrMapOvr>
-    <a:masterClrMapping/>
-  </p:clrMapOvr>
-</p:sld>
-</file>
-
 <file path=ppt/slides/slide4.xml><?xml version="1.0" encoding="utf-8"?>
 <p:sld xmlns:a="http://schemas.openxmlformats.org/drawingml/2006/main" xmlns:r="http://schemas.openxmlformats.org/officeDocument/2006/relationships" xmlns:p="http://schemas.openxmlformats.org/presentationml/2006/main">
   <p:cSld>
@@ -9296,7 +9259,7 @@
           <a:p>
             <a:r>
               <a:rPr lang="en-US"/>
-              <a:t>The Document Data Model </a:t>
+              <a:t>Common data models</a:t>
             </a:r>
             <a:endParaRPr lang="en-US"/>
           </a:p>
@@ -9318,7 +9281,49 @@
           <a:p>
             <a:r>
               <a:rPr lang="en-US"/>
-              <a:t>The Document Data Model is a type of NoSQL database model that is designed for storing, retrieving, and managing semi-structured or structured data as documents.</a:t>
+              <a:t>Hierarchical Data Model </a:t>
+            </a:r>
+            <a:endParaRPr lang="en-US"/>
+          </a:p>
+          <a:p>
+            <a:r>
+              <a:rPr lang="en-US"/>
+              <a:t>Relational Data Model</a:t>
+            </a:r>
+            <a:endParaRPr lang="en-US"/>
+          </a:p>
+          <a:p>
+            <a:r>
+              <a:rPr lang="en-US"/>
+              <a:t>Entity-Relationship Model (ER Model)</a:t>
+            </a:r>
+            <a:endParaRPr lang="en-US"/>
+          </a:p>
+          <a:p>
+            <a:r>
+              <a:rPr lang="en-US" b="1"/>
+              <a:t>Document Data Model</a:t>
+            </a:r>
+            <a:endParaRPr lang="en-US" b="1"/>
+          </a:p>
+          <a:p>
+            <a:r>
+              <a:rPr lang="en-US"/>
+              <a:t>Key-Value Data Mode</a:t>
+            </a:r>
+            <a:endParaRPr lang="en-US"/>
+          </a:p>
+          <a:p>
+            <a:r>
+              <a:rPr lang="en-US"/>
+              <a:t>Graph Data Model</a:t>
+            </a:r>
+            <a:endParaRPr lang="en-US"/>
+          </a:p>
+          <a:p>
+            <a:r>
+              <a:rPr lang="en-US"/>
+              <a:t>Multi-Model Databases</a:t>
             </a:r>
             <a:endParaRPr lang="en-US"/>
           </a:p>
@@ -9358,7 +9363,7 @@
           <a:p>
             <a:r>
               <a:rPr lang="en-US"/>
-              <a:t>Key aspects of the Document Data Model</a:t>
+              <a:t>The Document Data Model </a:t>
             </a:r>
             <a:endParaRPr lang="en-US"/>
           </a:p>
@@ -9376,45 +9381,11 @@
         </p:nvSpPr>
         <p:spPr/>
         <p:txBody>
-          <a:bodyPr>
-            <a:normAutofit/>
-          </a:bodyPr>
-          <a:p>
-            <a:r>
-              <a:rPr lang="en-US"/>
-              <a:t>Structure:</a:t>
-            </a:r>
-            <a:endParaRPr lang="en-US"/>
-          </a:p>
-          <a:p>
-            <a:pPr lvl="1"/>
-            <a:r>
-              <a:rPr lang="en-US"/>
-              <a:t>Documents are self-contained pieces of data that store information in a standard format, typically JSON (JavaScript Object Notation), BSON (Binary JSON), XML, or similar formats.</a:t>
-            </a:r>
-            <a:endParaRPr lang="en-US"/>
-          </a:p>
-          <a:p>
-            <a:pPr lvl="1"/>
-            <a:r>
-              <a:rPr lang="en-US"/>
-              <a:t>Each document is stored in the database as a unique record and does not require a fixed schema like traditional relational databases.</a:t>
-            </a:r>
-            <a:endParaRPr lang="en-US"/>
-          </a:p>
-          <a:p>
-            <a:pPr lvl="0"/>
-            <a:r>
-              <a:rPr lang="en-US"/>
-              <a:t>Tool: </a:t>
-            </a:r>
-            <a:endParaRPr lang="en-US"/>
-          </a:p>
-          <a:p>
-            <a:pPr lvl="1"/>
-            <a:r>
-              <a:rPr lang="en-US"/>
-              <a:t>MongoDB: A popular document database that uses BSON (Binary JSON) for storage. It is widely used for its scalability, flexibility, and ease of use.</a:t>
+          <a:bodyPr/>
+          <a:p>
+            <a:r>
+              <a:rPr lang="en-US"/>
+              <a:t>The Document Data Model is a type of NoSQL database model that is designed for storing, retrieving, and managing semi-structured or structured data as documents.</a:t>
             </a:r>
             <a:endParaRPr lang="en-US"/>
           </a:p>
@@ -9450,37 +9421,35 @@
         </p:nvSpPr>
         <p:spPr/>
         <p:txBody>
+          <a:bodyPr/>
+          <a:p>
+            <a:r>
+              <a:rPr lang="en-US"/>
+              <a:t>Key aspects of the Document Data Model</a:t>
+            </a:r>
+            <a:endParaRPr lang="en-US"/>
+          </a:p>
+        </p:txBody>
+      </p:sp>
+      <p:sp>
+        <p:nvSpPr>
+          <p:cNvPr id="3" name="Content Placeholder 2"/>
+          <p:cNvSpPr>
+            <a:spLocks noGrp="1"/>
+          </p:cNvSpPr>
+          <p:nvPr>
+            <p:ph idx="1"/>
+          </p:nvPr>
+        </p:nvSpPr>
+        <p:spPr/>
+        <p:txBody>
           <a:bodyPr>
-            <a:normAutofit fontScale="90000"/>
+            <a:normAutofit/>
           </a:bodyPr>
           <a:p>
             <a:r>
-              <a:rPr lang="en-US">
-                <a:sym typeface="+mn-ea"/>
-              </a:rPr>
-              <a:t>Key aspects of the Document Data Model (Cont.)</a:t>
-            </a:r>
-            <a:endParaRPr lang="en-US"/>
-          </a:p>
-        </p:txBody>
-      </p:sp>
-      <p:sp>
-        <p:nvSpPr>
-          <p:cNvPr id="3" name="Content Placeholder 2"/>
-          <p:cNvSpPr>
-            <a:spLocks noGrp="1"/>
-          </p:cNvSpPr>
-          <p:nvPr>
-            <p:ph idx="1"/>
-          </p:nvPr>
-        </p:nvSpPr>
-        <p:spPr/>
-        <p:txBody>
-          <a:bodyPr/>
-          <a:p>
-            <a:r>
-              <a:rPr lang="en-US"/>
-              <a:t>Use Cases:</a:t>
+              <a:rPr lang="en-US"/>
+              <a:t>Structure:</a:t>
             </a:r>
             <a:endParaRPr lang="en-US"/>
           </a:p>
@@ -9488,7 +9457,7 @@
             <a:pPr lvl="1"/>
             <a:r>
               <a:rPr lang="en-US"/>
-              <a:t>Document databases are suitable for a wide range of applications, including content management systems, e-commerce platforms, real-time analytics, mobile apps, and more.</a:t>
+              <a:t>Documents are self-contained pieces of data that store information in a standard format, typically JSON (JavaScript Object Notation), BSON (Binary JSON), XML, or similar formats.</a:t>
             </a:r>
             <a:endParaRPr lang="en-US"/>
           </a:p>
@@ -9496,7 +9465,23 @@
             <a:pPr lvl="1"/>
             <a:r>
               <a:rPr lang="en-US"/>
-              <a:t>They are particularly useful in scenarios where data is semi-structured or where flexibility in data model is required.</a:t>
+              <a:t>Each document is stored in the database as a unique record and does not require a fixed schema like traditional relational databases.</a:t>
+            </a:r>
+            <a:endParaRPr lang="en-US"/>
+          </a:p>
+          <a:p>
+            <a:pPr lvl="0"/>
+            <a:r>
+              <a:rPr lang="en-US"/>
+              <a:t>Tool: </a:t>
+            </a:r>
+            <a:endParaRPr lang="en-US"/>
+          </a:p>
+          <a:p>
+            <a:pPr lvl="1"/>
+            <a:r>
+              <a:rPr lang="en-US"/>
+              <a:t>MongoDB: A popular document database that uses BSON (Binary JSON) for storage. It is widely used for its scalability, flexibility, and ease of use.</a:t>
             </a:r>
             <a:endParaRPr lang="en-US"/>
           </a:p>
@@ -9532,61 +9517,53 @@
         </p:nvSpPr>
         <p:spPr/>
         <p:txBody>
+          <a:bodyPr>
+            <a:normAutofit fontScale="90000"/>
+          </a:bodyPr>
+          <a:p>
+            <a:r>
+              <a:rPr lang="en-US">
+                <a:sym typeface="+mn-ea"/>
+              </a:rPr>
+              <a:t>Key aspects of the Document Data Model (Cont.)</a:t>
+            </a:r>
+            <a:endParaRPr lang="en-US"/>
+          </a:p>
+        </p:txBody>
+      </p:sp>
+      <p:sp>
+        <p:nvSpPr>
+          <p:cNvPr id="3" name="Content Placeholder 2"/>
+          <p:cNvSpPr>
+            <a:spLocks noGrp="1"/>
+          </p:cNvSpPr>
+          <p:nvPr>
+            <p:ph idx="1"/>
+          </p:nvPr>
+        </p:nvSpPr>
+        <p:spPr/>
+        <p:txBody>
           <a:bodyPr/>
           <a:p>
             <a:r>
               <a:rPr lang="en-US"/>
-              <a:t>JSON documents </a:t>
-            </a:r>
-            <a:endParaRPr lang="en-US"/>
-          </a:p>
-        </p:txBody>
-      </p:sp>
-      <p:sp>
-        <p:nvSpPr>
-          <p:cNvPr id="3" name="Content Placeholder 2"/>
-          <p:cNvSpPr>
-            <a:spLocks noGrp="1"/>
-          </p:cNvSpPr>
-          <p:nvPr>
-            <p:ph idx="1"/>
-          </p:nvPr>
-        </p:nvSpPr>
-        <p:spPr/>
-        <p:txBody>
-          <a:bodyPr/>
-          <a:p>
-            <a:r>
-              <a:rPr lang="en-US"/>
-              <a:t>JSON is a format for storing and transporting data.</a:t>
-            </a:r>
-            <a:endParaRPr lang="en-US"/>
-          </a:p>
-          <a:p>
-            <a:r>
-              <a:rPr lang="en-US"/>
-              <a:t>JSON stands for JavaScript Object Notation</a:t>
-            </a:r>
-            <a:endParaRPr lang="en-US"/>
-          </a:p>
-          <a:p>
-            <a:r>
-              <a:rPr lang="en-US"/>
-              <a:t>JSON is a lightweight data interchange format</a:t>
-            </a:r>
-            <a:endParaRPr lang="en-US"/>
-          </a:p>
-          <a:p>
-            <a:r>
-              <a:rPr lang="en-US"/>
-              <a:t>JSON is language independent</a:t>
-            </a:r>
-            <a:endParaRPr lang="en-US"/>
-          </a:p>
-          <a:p>
-            <a:r>
-              <a:rPr lang="en-US"/>
-              <a:t>JSON is "self-describing" and easy to understand</a:t>
+              <a:t>Use Cases:</a:t>
+            </a:r>
+            <a:endParaRPr lang="en-US"/>
+          </a:p>
+          <a:p>
+            <a:pPr lvl="1"/>
+            <a:r>
+              <a:rPr lang="en-US"/>
+              <a:t>Document databases are suitable for a wide range of applications, including content management systems, e-commerce platforms, real-time analytics, mobile apps, and more.</a:t>
+            </a:r>
+            <a:endParaRPr lang="en-US"/>
+          </a:p>
+          <a:p>
+            <a:pPr lvl="1"/>
+            <a:r>
+              <a:rPr lang="en-US"/>
+              <a:t>They are particularly useful in scenarios where data is semi-structured or where flexibility in data model is required.</a:t>
             </a:r>
             <a:endParaRPr lang="en-US"/>
           </a:p>
@@ -9626,7 +9603,7 @@
           <a:p>
             <a:r>
               <a:rPr lang="en-US"/>
-              <a:t>JSON Example</a:t>
+              <a:t>JSON documents </a:t>
             </a:r>
             <a:endParaRPr lang="en-US"/>
           </a:p>
@@ -9646,72 +9623,37 @@
         <p:txBody>
           <a:bodyPr/>
           <a:p>
-            <a:pPr marL="0" indent="0">
-              <a:buNone/>
-            </a:pPr>
-            <a:r>
-              <a:rPr lang="en-US"/>
-              <a:t>{</a:t>
-            </a:r>
-            <a:endParaRPr lang="en-US"/>
-          </a:p>
-          <a:p>
-            <a:pPr marL="0" indent="0">
-              <a:buNone/>
-            </a:pPr>
-            <a:r>
-              <a:rPr lang="en-US"/>
-              <a:t>"employees":[</a:t>
-            </a:r>
-            <a:endParaRPr lang="en-US"/>
-          </a:p>
-          <a:p>
-            <a:pPr marL="0" indent="0">
-              <a:buNone/>
-            </a:pPr>
-            <a:r>
-              <a:rPr lang="en-US"/>
-              <a:t>  {"firstName":"John", "lastName":"Doe"},</a:t>
-            </a:r>
-            <a:endParaRPr lang="en-US"/>
-          </a:p>
-          <a:p>
-            <a:pPr marL="0" indent="0">
-              <a:buNone/>
-            </a:pPr>
-            <a:r>
-              <a:rPr lang="en-US"/>
-              <a:t>  {"firstName":"Anna", "lastName":"Smith"},</a:t>
-            </a:r>
-            <a:endParaRPr lang="en-US"/>
-          </a:p>
-          <a:p>
-            <a:pPr marL="0" indent="0">
-              <a:buNone/>
-            </a:pPr>
-            <a:r>
-              <a:rPr lang="en-US"/>
-              <a:t>  {"firstName":"Peter", "lastName":"Jones"}</a:t>
-            </a:r>
-            <a:endParaRPr lang="en-US"/>
-          </a:p>
-          <a:p>
-            <a:pPr marL="0" indent="0">
-              <a:buNone/>
-            </a:pPr>
-            <a:r>
-              <a:rPr lang="en-US"/>
-              <a:t>]</a:t>
-            </a:r>
-            <a:endParaRPr lang="en-US"/>
-          </a:p>
-          <a:p>
-            <a:pPr marL="0" indent="0">
-              <a:buNone/>
-            </a:pPr>
-            <a:r>
-              <a:rPr lang="en-US"/>
-              <a:t>}</a:t>
+            <a:r>
+              <a:rPr lang="en-US"/>
+              <a:t>JSON is a format for storing and transporting data.</a:t>
+            </a:r>
+            <a:endParaRPr lang="en-US"/>
+          </a:p>
+          <a:p>
+            <a:r>
+              <a:rPr lang="en-US"/>
+              <a:t>JSON stands for JavaScript Object Notation</a:t>
+            </a:r>
+            <a:endParaRPr lang="en-US"/>
+          </a:p>
+          <a:p>
+            <a:r>
+              <a:rPr lang="en-US"/>
+              <a:t>JSON is a lightweight data interchange format</a:t>
+            </a:r>
+            <a:endParaRPr lang="en-US"/>
+          </a:p>
+          <a:p>
+            <a:r>
+              <a:rPr lang="en-US"/>
+              <a:t>JSON is language independent</a:t>
+            </a:r>
+            <a:endParaRPr lang="en-US"/>
+          </a:p>
+          <a:p>
+            <a:r>
+              <a:rPr lang="en-US"/>
+              <a:t>JSON is "self-describing" and easy to understand</a:t>
             </a:r>
             <a:endParaRPr lang="en-US"/>
           </a:p>
@@ -9751,7 +9693,7 @@
           <a:p>
             <a:r>
               <a:rPr lang="en-US"/>
-              <a:t>JSON Syntax Rules</a:t>
+              <a:t>JSON Example</a:t>
             </a:r>
             <a:endParaRPr lang="en-US"/>
           </a:p>
@@ -9771,30 +9713,72 @@
         <p:txBody>
           <a:bodyPr/>
           <a:p>
-            <a:r>
-              <a:rPr lang="en-US"/>
-              <a:t>Data is in name/value pairs</a:t>
-            </a:r>
-            <a:endParaRPr lang="en-US"/>
-          </a:p>
-          <a:p>
-            <a:r>
-              <a:rPr lang="en-US"/>
-              <a:t>Data is separated by commas</a:t>
-            </a:r>
-            <a:endParaRPr lang="en-US"/>
-          </a:p>
-          <a:p>
-            <a:r>
-              <a:rPr lang="en-US"/>
-              <a:t>Curly braces hold objects</a:t>
-            </a:r>
-            <a:endParaRPr lang="en-US"/>
-          </a:p>
-          <a:p>
-            <a:r>
-              <a:rPr lang="en-US"/>
-              <a:t>Square brackets hold arrays</a:t>
+            <a:pPr marL="0" indent="0">
+              <a:buNone/>
+            </a:pPr>
+            <a:r>
+              <a:rPr lang="en-US"/>
+              <a:t>{</a:t>
+            </a:r>
+            <a:endParaRPr lang="en-US"/>
+          </a:p>
+          <a:p>
+            <a:pPr marL="0" indent="0">
+              <a:buNone/>
+            </a:pPr>
+            <a:r>
+              <a:rPr lang="en-US"/>
+              <a:t>"employees":[</a:t>
+            </a:r>
+            <a:endParaRPr lang="en-US"/>
+          </a:p>
+          <a:p>
+            <a:pPr marL="0" indent="0">
+              <a:buNone/>
+            </a:pPr>
+            <a:r>
+              <a:rPr lang="en-US"/>
+              <a:t>  {"firstName":"John", "lastName":"Doe"},</a:t>
+            </a:r>
+            <a:endParaRPr lang="en-US"/>
+          </a:p>
+          <a:p>
+            <a:pPr marL="0" indent="0">
+              <a:buNone/>
+            </a:pPr>
+            <a:r>
+              <a:rPr lang="en-US"/>
+              <a:t>  {"firstName":"Anna", "lastName":"Smith"},</a:t>
+            </a:r>
+            <a:endParaRPr lang="en-US"/>
+          </a:p>
+          <a:p>
+            <a:pPr marL="0" indent="0">
+              <a:buNone/>
+            </a:pPr>
+            <a:r>
+              <a:rPr lang="en-US"/>
+              <a:t>  {"firstName":"Peter", "lastName":"Jones"}</a:t>
+            </a:r>
+            <a:endParaRPr lang="en-US"/>
+          </a:p>
+          <a:p>
+            <a:pPr marL="0" indent="0">
+              <a:buNone/>
+            </a:pPr>
+            <a:r>
+              <a:rPr lang="en-US"/>
+              <a:t>]</a:t>
+            </a:r>
+            <a:endParaRPr lang="en-US"/>
+          </a:p>
+          <a:p>
+            <a:pPr marL="0" indent="0">
+              <a:buNone/>
+            </a:pPr>
+            <a:r>
+              <a:rPr lang="en-US"/>
+              <a:t>}</a:t>
             </a:r>
             <a:endParaRPr lang="en-US"/>
           </a:p>
@@ -9834,7 +9818,7 @@
           <a:p>
             <a:r>
               <a:rPr lang="en-US"/>
-              <a:t>JSON Data - A name and a Value</a:t>
+              <a:t>JSON Syntax Rules</a:t>
             </a:r>
             <a:endParaRPr lang="en-US"/>
           </a:p>
@@ -9856,23 +9840,28 @@
           <a:p>
             <a:r>
               <a:rPr lang="en-US"/>
-              <a:t>A name/value pair consists of a field name (in double quotes), followed by a colon, followed by a value:</a:t>
-            </a:r>
-            <a:endParaRPr lang="en-US"/>
-          </a:p>
-          <a:p>
-            <a:pPr marL="0" indent="0">
-              <a:buNone/>
-            </a:pPr>
-            <a:endParaRPr lang="en-US"/>
-          </a:p>
-          <a:p>
-            <a:pPr marL="0" indent="0">
-              <a:buNone/>
-            </a:pPr>
-            <a:r>
-              <a:rPr lang="en-US"/>
-              <a:t>"firstName":"John"</a:t>
+              <a:t>Data is in name/value pairs</a:t>
+            </a:r>
+            <a:endParaRPr lang="en-US"/>
+          </a:p>
+          <a:p>
+            <a:r>
+              <a:rPr lang="en-US"/>
+              <a:t>Data is separated by commas</a:t>
+            </a:r>
+            <a:endParaRPr lang="en-US"/>
+          </a:p>
+          <a:p>
+            <a:r>
+              <a:rPr lang="en-US"/>
+              <a:t>Curly braces hold objects</a:t>
+            </a:r>
+            <a:endParaRPr lang="en-US"/>
+          </a:p>
+          <a:p>
+            <a:r>
+              <a:rPr lang="en-US"/>
+              <a:t>Square brackets hold arrays</a:t>
             </a:r>
             <a:endParaRPr lang="en-US"/>
           </a:p>
@@ -9912,7 +9901,7 @@
           <a:p>
             <a:r>
               <a:rPr lang="en-US"/>
-              <a:t>JSON Objects</a:t>
+              <a:t>JSON Data - A name and a Value</a:t>
             </a:r>
             <a:endParaRPr lang="en-US"/>
           </a:p>
@@ -9934,20 +9923,23 @@
           <a:p>
             <a:r>
               <a:rPr lang="en-US"/>
-              <a:t>JSON objects are written inside curly braces.</a:t>
-            </a:r>
-            <a:endParaRPr lang="en-US"/>
-          </a:p>
-          <a:p>
+              <a:t>A name/value pair consists of a field name (in double quotes), followed by a colon, followed by a value:</a:t>
+            </a:r>
             <a:endParaRPr lang="en-US"/>
           </a:p>
           <a:p>
             <a:pPr marL="0" indent="0">
               <a:buNone/>
             </a:pPr>
-            <a:r>
-              <a:rPr lang="en-US"/>
-              <a:t>{"firstName":"John", "lastName":"Doe"}</a:t>
+            <a:endParaRPr lang="en-US"/>
+          </a:p>
+          <a:p>
+            <a:pPr marL="0" indent="0">
+              <a:buNone/>
+            </a:pPr>
+            <a:r>
+              <a:rPr lang="en-US"/>
+              <a:t>"firstName":"John"</a:t>
             </a:r>
             <a:endParaRPr lang="en-US"/>
           </a:p>
@@ -9987,7 +9979,7 @@
           <a:p>
             <a:r>
               <a:rPr lang="en-US"/>
-              <a:t>JSON Arrays</a:t>
+              <a:t>JSON Objects</a:t>
             </a:r>
             <a:endParaRPr lang="en-US"/>
           </a:p>
@@ -10009,11 +10001,8 @@
           <a:p>
             <a:r>
               <a:rPr lang="en-US"/>
-              <a:t>JSON arrays are written inside square brackets.</a:t>
-            </a:r>
-            <a:endParaRPr lang="en-US"/>
-          </a:p>
-          <a:p>
+              <a:t>JSON objects are written inside curly braces.</a:t>
+            </a:r>
             <a:endParaRPr lang="en-US"/>
           </a:p>
           <a:p>
@@ -10025,47 +10014,7 @@
             </a:pPr>
             <a:r>
               <a:rPr lang="en-US"/>
-              <a:t>"employees":[</a:t>
-            </a:r>
-            <a:endParaRPr lang="en-US"/>
-          </a:p>
-          <a:p>
-            <a:pPr marL="0" indent="0">
-              <a:buNone/>
-            </a:pPr>
-            <a:r>
-              <a:rPr lang="en-US"/>
-              <a:t>  {"firstName":"John", "lastName":"Doe"},</a:t>
-            </a:r>
-            <a:endParaRPr lang="en-US"/>
-          </a:p>
-          <a:p>
-            <a:pPr marL="0" indent="0">
-              <a:buNone/>
-            </a:pPr>
-            <a:r>
-              <a:rPr lang="en-US"/>
-              <a:t>  {"firstName":"Anna", "lastName":"Smith"},</a:t>
-            </a:r>
-            <a:endParaRPr lang="en-US"/>
-          </a:p>
-          <a:p>
-            <a:pPr marL="0" indent="0">
-              <a:buNone/>
-            </a:pPr>
-            <a:r>
-              <a:rPr lang="en-US"/>
-              <a:t>  {"firstName":"Peter", "lastName":"Jones"}</a:t>
-            </a:r>
-            <a:endParaRPr lang="en-US"/>
-          </a:p>
-          <a:p>
-            <a:pPr marL="0" indent="0">
-              <a:buNone/>
-            </a:pPr>
-            <a:r>
-              <a:rPr lang="en-US"/>
-              <a:t>]</a:t>
+              <a:t>{"firstName":"John", "lastName":"Doe"}</a:t>
             </a:r>
             <a:endParaRPr lang="en-US"/>
           </a:p>
@@ -10105,7 +10054,7 @@
           <a:p>
             <a:r>
               <a:rPr lang="en-US"/>
-              <a:t>JSON Complete Example again </a:t>
+              <a:t>JSON Arrays</a:t>
             </a:r>
             <a:endParaRPr lang="en-US"/>
           </a:p>
@@ -10125,12 +10074,25 @@
         <p:txBody>
           <a:bodyPr/>
           <a:p>
+            <a:r>
+              <a:rPr lang="en-US"/>
+              <a:t>JSON arrays are written inside square brackets.</a:t>
+            </a:r>
+            <a:endParaRPr lang="en-US"/>
+          </a:p>
+          <a:p>
+            <a:endParaRPr lang="en-US"/>
+          </a:p>
+          <a:p>
+            <a:endParaRPr lang="en-US"/>
+          </a:p>
+          <a:p>
             <a:pPr marL="0" indent="0">
               <a:buNone/>
             </a:pPr>
             <a:r>
               <a:rPr lang="en-US"/>
-              <a:t>{</a:t>
+              <a:t>"employees":[</a:t>
             </a:r>
             <a:endParaRPr lang="en-US"/>
           </a:p>
@@ -10140,7 +10102,7 @@
             </a:pPr>
             <a:r>
               <a:rPr lang="en-US"/>
-              <a:t>"employees":[</a:t>
+              <a:t>  {"firstName":"John", "lastName":"Doe"},</a:t>
             </a:r>
             <a:endParaRPr lang="en-US"/>
           </a:p>
@@ -10150,7 +10112,7 @@
             </a:pPr>
             <a:r>
               <a:rPr lang="en-US"/>
-              <a:t>  {"firstName":"John", "lastName":"Doe"},</a:t>
+              <a:t>  {"firstName":"Anna", "lastName":"Smith"},</a:t>
             </a:r>
             <a:endParaRPr lang="en-US"/>
           </a:p>
@@ -10160,7 +10122,7 @@
             </a:pPr>
             <a:r>
               <a:rPr lang="en-US"/>
-              <a:t>  {"firstName":"Anna", "lastName":"Smith"},</a:t>
+              <a:t>  {"firstName":"Peter", "lastName":"Jones"}</a:t>
             </a:r>
             <a:endParaRPr lang="en-US"/>
           </a:p>
@@ -10170,27 +10132,7 @@
             </a:pPr>
             <a:r>
               <a:rPr lang="en-US"/>
-              <a:t>  {"firstName":"Peter", "lastName":"Jones"}</a:t>
-            </a:r>
-            <a:endParaRPr lang="en-US"/>
-          </a:p>
-          <a:p>
-            <a:pPr marL="0" indent="0">
-              <a:buNone/>
-            </a:pPr>
-            <a:r>
-              <a:rPr lang="en-US"/>
               <a:t>]</a:t>
-            </a:r>
-            <a:endParaRPr lang="en-US"/>
-          </a:p>
-          <a:p>
-            <a:pPr marL="0" indent="0">
-              <a:buNone/>
-            </a:pPr>
-            <a:r>
-              <a:rPr lang="en-US"/>
-              <a:t>}</a:t>
             </a:r>
             <a:endParaRPr lang="en-US"/>
           </a:p>
@@ -10332,36 +10274,27 @@
         <p:txBody>
           <a:bodyPr/>
           <a:p>
-            <a:pPr algn="ctr"/>
-            <a:r>
-              <a:rPr lang="en-US"/>
-              <a:t>JSON vs XML </a:t>
-            </a:r>
-            <a:endParaRPr lang="en-US"/>
-          </a:p>
-        </p:txBody>
-      </p:sp>
-      <p:sp>
-        <p:nvSpPr>
-          <p:cNvPr id="4" name="Content Placeholder 3"/>
-          <p:cNvSpPr>
-            <a:spLocks noGrp="1"/>
-          </p:cNvSpPr>
-          <p:nvPr>
-            <p:ph sz="half" idx="1"/>
-          </p:nvPr>
-        </p:nvSpPr>
-        <p:spPr>
-          <a:ln>
-            <a:solidFill>
-              <a:schemeClr val="tx1"/>
-            </a:solidFill>
-          </a:ln>
-        </p:spPr>
-        <p:txBody>
-          <a:bodyPr>
-            <a:normAutofit lnSpcReduction="10000"/>
-          </a:bodyPr>
+            <a:r>
+              <a:rPr lang="en-US"/>
+              <a:t>JSON Complete Example again </a:t>
+            </a:r>
+            <a:endParaRPr lang="en-US"/>
+          </a:p>
+        </p:txBody>
+      </p:sp>
+      <p:sp>
+        <p:nvSpPr>
+          <p:cNvPr id="3" name="Content Placeholder 2"/>
+          <p:cNvSpPr>
+            <a:spLocks noGrp="1"/>
+          </p:cNvSpPr>
+          <p:nvPr>
+            <p:ph idx="1"/>
+          </p:nvPr>
+        </p:nvSpPr>
+        <p:spPr/>
+        <p:txBody>
+          <a:bodyPr/>
           <a:p>
             <a:pPr marL="0" indent="0">
               <a:buNone/>
@@ -10429,159 +10362,6 @@
             <a:r>
               <a:rPr lang="en-US"/>
               <a:t>}</a:t>
-            </a:r>
-            <a:endParaRPr lang="en-US"/>
-          </a:p>
-        </p:txBody>
-      </p:sp>
-      <p:sp>
-        <p:nvSpPr>
-          <p:cNvPr id="5" name="Content Placeholder 4"/>
-          <p:cNvSpPr>
-            <a:spLocks noGrp="1"/>
-          </p:cNvSpPr>
-          <p:nvPr>
-            <p:ph sz="half" idx="2"/>
-          </p:nvPr>
-        </p:nvSpPr>
-        <p:spPr>
-          <a:ln>
-            <a:solidFill>
-              <a:schemeClr val="tx1"/>
-            </a:solidFill>
-          </a:ln>
-        </p:spPr>
-        <p:txBody>
-          <a:bodyPr>
-            <a:normAutofit fontScale="50000"/>
-          </a:bodyPr>
-          <a:p>
-            <a:pPr marL="0" indent="0">
-              <a:buNone/>
-            </a:pPr>
-            <a:r>
-              <a:rPr lang="en-US"/>
-              <a:t>&lt;?xml version="1.0" encoding="UTF-8" ?&gt;</a:t>
-            </a:r>
-            <a:endParaRPr lang="en-US"/>
-          </a:p>
-          <a:p>
-            <a:pPr marL="0" indent="0">
-              <a:buNone/>
-            </a:pPr>
-            <a:r>
-              <a:rPr lang="en-US"/>
-              <a:t>&lt;employees&gt;</a:t>
-            </a:r>
-            <a:endParaRPr lang="en-US"/>
-          </a:p>
-          <a:p>
-            <a:pPr marL="0" indent="0">
-              <a:buNone/>
-            </a:pPr>
-            <a:r>
-              <a:rPr lang="en-US"/>
-              <a:t>    &lt;firstName&gt;John&lt;/firstName&gt;</a:t>
-            </a:r>
-            <a:endParaRPr lang="en-US"/>
-          </a:p>
-          <a:p>
-            <a:pPr marL="0" indent="0">
-              <a:buNone/>
-            </a:pPr>
-            <a:r>
-              <a:rPr lang="en-US"/>
-              <a:t>    &lt;lastName&gt;Doe&lt;/lastName&gt;</a:t>
-            </a:r>
-            <a:endParaRPr lang="en-US"/>
-          </a:p>
-          <a:p>
-            <a:pPr marL="0" indent="0">
-              <a:buNone/>
-            </a:pPr>
-            <a:r>
-              <a:rPr lang="en-US"/>
-              <a:t>&lt;/employees&gt;</a:t>
-            </a:r>
-            <a:endParaRPr lang="en-US"/>
-          </a:p>
-          <a:p>
-            <a:pPr marL="0" indent="0">
-              <a:buNone/>
-            </a:pPr>
-            <a:r>
-              <a:rPr lang="en-US"/>
-              <a:t>&lt;employees&gt;</a:t>
-            </a:r>
-            <a:endParaRPr lang="en-US"/>
-          </a:p>
-          <a:p>
-            <a:pPr marL="0" indent="0">
-              <a:buNone/>
-            </a:pPr>
-            <a:r>
-              <a:rPr lang="en-US"/>
-              <a:t>    &lt;firstName&gt;Anna&lt;/firstName&gt;</a:t>
-            </a:r>
-            <a:endParaRPr lang="en-US"/>
-          </a:p>
-          <a:p>
-            <a:pPr marL="0" indent="0">
-              <a:buNone/>
-            </a:pPr>
-            <a:r>
-              <a:rPr lang="en-US"/>
-              <a:t>    &lt;lastName&gt;Smith&lt;/lastName&gt;</a:t>
-            </a:r>
-            <a:endParaRPr lang="en-US"/>
-          </a:p>
-          <a:p>
-            <a:pPr marL="0" indent="0">
-              <a:buNone/>
-            </a:pPr>
-            <a:r>
-              <a:rPr lang="en-US"/>
-              <a:t>&lt;/employees&gt;</a:t>
-            </a:r>
-            <a:endParaRPr lang="en-US"/>
-          </a:p>
-          <a:p>
-            <a:pPr marL="0" indent="0">
-              <a:buNone/>
-            </a:pPr>
-            <a:r>
-              <a:rPr lang="en-US"/>
-              <a:t>&lt;employees&gt;</a:t>
-            </a:r>
-            <a:endParaRPr lang="en-US"/>
-          </a:p>
-          <a:p>
-            <a:pPr marL="0" indent="0">
-              <a:buNone/>
-            </a:pPr>
-            <a:r>
-              <a:rPr lang="en-US"/>
-              <a:t>    &lt;firstName&gt;Peter&lt;/firstName&gt;</a:t>
-            </a:r>
-            <a:endParaRPr lang="en-US"/>
-          </a:p>
-          <a:p>
-            <a:pPr marL="0" indent="0">
-              <a:buNone/>
-            </a:pPr>
-            <a:r>
-              <a:rPr lang="en-US"/>
-              <a:t>    &lt;lastName&gt;Jones&lt;/lastName&gt;</a:t>
-            </a:r>
-            <a:endParaRPr lang="en-US"/>
-          </a:p>
-          <a:p>
-            <a:pPr marL="0" indent="0">
-              <a:buNone/>
-            </a:pPr>
-            <a:r>
-              <a:rPr lang="en-US"/>
-              <a:t>&lt;/employees&gt;</a:t>
             </a:r>
             <a:endParaRPr lang="en-US"/>
           </a:p>
@@ -10607,7 +10387,7 @@
       <p:grpSpPr/>
       <p:sp>
         <p:nvSpPr>
-          <p:cNvPr id="5" name="Title 4"/>
+          <p:cNvPr id="2" name="Title 1"/>
           <p:cNvSpPr>
             <a:spLocks noGrp="1"/>
           </p:cNvSpPr>
@@ -10619,56 +10399,257 @@
         <p:txBody>
           <a:bodyPr/>
           <a:p>
-            <a:r>
-              <a:rPr lang="en-US"/>
-              <a:t>MongoDB </a:t>
-            </a:r>
-            <a:endParaRPr lang="en-US"/>
-          </a:p>
-        </p:txBody>
-      </p:sp>
-      <p:sp>
-        <p:nvSpPr>
-          <p:cNvPr id="6" name="Content Placeholder 5"/>
-          <p:cNvSpPr>
-            <a:spLocks noGrp="1"/>
-          </p:cNvSpPr>
-          <p:nvPr>
-            <p:ph idx="1"/>
-          </p:nvPr>
-        </p:nvSpPr>
-        <p:spPr/>
-        <p:txBody>
-          <a:bodyPr/>
-          <a:p>
-            <a:r>
-              <a:rPr lang="en-US"/>
-              <a:t>MongoDB is a document database. It stores data in a type of JSON format called BSON.</a:t>
-            </a:r>
-            <a:endParaRPr lang="en-US"/>
-          </a:p>
-          <a:p>
-            <a:r>
-              <a:rPr lang="en-US"/>
-              <a:t>A record in MongoDB is a document, which is a data structure composed of key value pairs similar to the structure of JSON objects.</a:t>
-            </a:r>
-            <a:endParaRPr lang="en-US"/>
-          </a:p>
-          <a:p>
-            <a:r>
-              <a:rPr lang="en-US"/>
-              <a:t>Records in a MongoDB database are called documents, and the field values may include numbers, strings, booleans, arrays, or even nested documents.</a:t>
-            </a:r>
-            <a:endParaRPr lang="en-US"/>
-          </a:p>
-          <a:p>
-            <a:r>
-              <a:rPr lang="en-US"/>
-              <a:t>Can be installed locally or hosted in the cloud.</a:t>
-            </a:r>
-            <a:endParaRPr lang="en-US"/>
-          </a:p>
-          <a:p>
+            <a:pPr algn="ctr"/>
+            <a:r>
+              <a:rPr lang="en-US"/>
+              <a:t>JSON vs XML </a:t>
+            </a:r>
+            <a:endParaRPr lang="en-US"/>
+          </a:p>
+        </p:txBody>
+      </p:sp>
+      <p:sp>
+        <p:nvSpPr>
+          <p:cNvPr id="4" name="Content Placeholder 3"/>
+          <p:cNvSpPr>
+            <a:spLocks noGrp="1"/>
+          </p:cNvSpPr>
+          <p:nvPr>
+            <p:ph sz="half" idx="1"/>
+          </p:nvPr>
+        </p:nvSpPr>
+        <p:spPr>
+          <a:ln>
+            <a:solidFill>
+              <a:schemeClr val="tx1"/>
+            </a:solidFill>
+          </a:ln>
+        </p:spPr>
+        <p:txBody>
+          <a:bodyPr>
+            <a:normAutofit lnSpcReduction="10000"/>
+          </a:bodyPr>
+          <a:p>
+            <a:pPr marL="0" indent="0">
+              <a:buNone/>
+            </a:pPr>
+            <a:r>
+              <a:rPr lang="en-US"/>
+              <a:t>{</a:t>
+            </a:r>
+            <a:endParaRPr lang="en-US"/>
+          </a:p>
+          <a:p>
+            <a:pPr marL="0" indent="0">
+              <a:buNone/>
+            </a:pPr>
+            <a:r>
+              <a:rPr lang="en-US"/>
+              <a:t>"employees":[</a:t>
+            </a:r>
+            <a:endParaRPr lang="en-US"/>
+          </a:p>
+          <a:p>
+            <a:pPr marL="0" indent="0">
+              <a:buNone/>
+            </a:pPr>
+            <a:r>
+              <a:rPr lang="en-US"/>
+              <a:t>  {"firstName":"John", "lastName":"Doe"},</a:t>
+            </a:r>
+            <a:endParaRPr lang="en-US"/>
+          </a:p>
+          <a:p>
+            <a:pPr marL="0" indent="0">
+              <a:buNone/>
+            </a:pPr>
+            <a:r>
+              <a:rPr lang="en-US"/>
+              <a:t>  {"firstName":"Anna", "lastName":"Smith"},</a:t>
+            </a:r>
+            <a:endParaRPr lang="en-US"/>
+          </a:p>
+          <a:p>
+            <a:pPr marL="0" indent="0">
+              <a:buNone/>
+            </a:pPr>
+            <a:r>
+              <a:rPr lang="en-US"/>
+              <a:t>  {"firstName":"Peter", "lastName":"Jones"}</a:t>
+            </a:r>
+            <a:endParaRPr lang="en-US"/>
+          </a:p>
+          <a:p>
+            <a:pPr marL="0" indent="0">
+              <a:buNone/>
+            </a:pPr>
+            <a:r>
+              <a:rPr lang="en-US"/>
+              <a:t>]</a:t>
+            </a:r>
+            <a:endParaRPr lang="en-US"/>
+          </a:p>
+          <a:p>
+            <a:pPr marL="0" indent="0">
+              <a:buNone/>
+            </a:pPr>
+            <a:r>
+              <a:rPr lang="en-US"/>
+              <a:t>}</a:t>
+            </a:r>
+            <a:endParaRPr lang="en-US"/>
+          </a:p>
+        </p:txBody>
+      </p:sp>
+      <p:sp>
+        <p:nvSpPr>
+          <p:cNvPr id="5" name="Content Placeholder 4"/>
+          <p:cNvSpPr>
+            <a:spLocks noGrp="1"/>
+          </p:cNvSpPr>
+          <p:nvPr>
+            <p:ph sz="half" idx="2"/>
+          </p:nvPr>
+        </p:nvSpPr>
+        <p:spPr>
+          <a:ln>
+            <a:solidFill>
+              <a:schemeClr val="tx1"/>
+            </a:solidFill>
+          </a:ln>
+        </p:spPr>
+        <p:txBody>
+          <a:bodyPr>
+            <a:normAutofit fontScale="50000"/>
+          </a:bodyPr>
+          <a:p>
+            <a:pPr marL="0" indent="0">
+              <a:buNone/>
+            </a:pPr>
+            <a:r>
+              <a:rPr lang="en-US"/>
+              <a:t>&lt;?xml version="1.0" encoding="UTF-8" ?&gt;</a:t>
+            </a:r>
+            <a:endParaRPr lang="en-US"/>
+          </a:p>
+          <a:p>
+            <a:pPr marL="0" indent="0">
+              <a:buNone/>
+            </a:pPr>
+            <a:r>
+              <a:rPr lang="en-US"/>
+              <a:t>&lt;employees&gt;</a:t>
+            </a:r>
+            <a:endParaRPr lang="en-US"/>
+          </a:p>
+          <a:p>
+            <a:pPr marL="0" indent="0">
+              <a:buNone/>
+            </a:pPr>
+            <a:r>
+              <a:rPr lang="en-US"/>
+              <a:t>    &lt;firstName&gt;John&lt;/firstName&gt;</a:t>
+            </a:r>
+            <a:endParaRPr lang="en-US"/>
+          </a:p>
+          <a:p>
+            <a:pPr marL="0" indent="0">
+              <a:buNone/>
+            </a:pPr>
+            <a:r>
+              <a:rPr lang="en-US"/>
+              <a:t>    &lt;lastName&gt;Doe&lt;/lastName&gt;</a:t>
+            </a:r>
+            <a:endParaRPr lang="en-US"/>
+          </a:p>
+          <a:p>
+            <a:pPr marL="0" indent="0">
+              <a:buNone/>
+            </a:pPr>
+            <a:r>
+              <a:rPr lang="en-US"/>
+              <a:t>&lt;/employees&gt;</a:t>
+            </a:r>
+            <a:endParaRPr lang="en-US"/>
+          </a:p>
+          <a:p>
+            <a:pPr marL="0" indent="0">
+              <a:buNone/>
+            </a:pPr>
+            <a:r>
+              <a:rPr lang="en-US"/>
+              <a:t>&lt;employees&gt;</a:t>
+            </a:r>
+            <a:endParaRPr lang="en-US"/>
+          </a:p>
+          <a:p>
+            <a:pPr marL="0" indent="0">
+              <a:buNone/>
+            </a:pPr>
+            <a:r>
+              <a:rPr lang="en-US"/>
+              <a:t>    &lt;firstName&gt;Anna&lt;/firstName&gt;</a:t>
+            </a:r>
+            <a:endParaRPr lang="en-US"/>
+          </a:p>
+          <a:p>
+            <a:pPr marL="0" indent="0">
+              <a:buNone/>
+            </a:pPr>
+            <a:r>
+              <a:rPr lang="en-US"/>
+              <a:t>    &lt;lastName&gt;Smith&lt;/lastName&gt;</a:t>
+            </a:r>
+            <a:endParaRPr lang="en-US"/>
+          </a:p>
+          <a:p>
+            <a:pPr marL="0" indent="0">
+              <a:buNone/>
+            </a:pPr>
+            <a:r>
+              <a:rPr lang="en-US"/>
+              <a:t>&lt;/employees&gt;</a:t>
+            </a:r>
+            <a:endParaRPr lang="en-US"/>
+          </a:p>
+          <a:p>
+            <a:pPr marL="0" indent="0">
+              <a:buNone/>
+            </a:pPr>
+            <a:r>
+              <a:rPr lang="en-US"/>
+              <a:t>&lt;employees&gt;</a:t>
+            </a:r>
+            <a:endParaRPr lang="en-US"/>
+          </a:p>
+          <a:p>
+            <a:pPr marL="0" indent="0">
+              <a:buNone/>
+            </a:pPr>
+            <a:r>
+              <a:rPr lang="en-US"/>
+              <a:t>    &lt;firstName&gt;Peter&lt;/firstName&gt;</a:t>
+            </a:r>
+            <a:endParaRPr lang="en-US"/>
+          </a:p>
+          <a:p>
+            <a:pPr marL="0" indent="0">
+              <a:buNone/>
+            </a:pPr>
+            <a:r>
+              <a:rPr lang="en-US"/>
+              <a:t>    &lt;lastName&gt;Jones&lt;/lastName&gt;</a:t>
+            </a:r>
+            <a:endParaRPr lang="en-US"/>
+          </a:p>
+          <a:p>
+            <a:pPr marL="0" indent="0">
+              <a:buNone/>
+            </a:pPr>
+            <a:r>
+              <a:rPr lang="en-US"/>
+              <a:t>&lt;/employees&gt;</a:t>
+            </a:r>
             <a:endParaRPr lang="en-US"/>
           </a:p>
         </p:txBody>
@@ -10693,7 +10674,7 @@
       <p:grpSpPr/>
       <p:sp>
         <p:nvSpPr>
-          <p:cNvPr id="2" name="Title 1"/>
+          <p:cNvPr id="5" name="Title 4"/>
           <p:cNvSpPr>
             <a:spLocks noGrp="1"/>
           </p:cNvSpPr>
@@ -10707,15 +10688,15 @@
           <a:p>
             <a:r>
               <a:rPr lang="en-US"/>
-              <a:t>Example Document</a:t>
-            </a:r>
-            <a:endParaRPr lang="en-US"/>
-          </a:p>
-        </p:txBody>
-      </p:sp>
-      <p:sp>
-        <p:nvSpPr>
-          <p:cNvPr id="3" name="Content Placeholder 2"/>
+              <a:t>MongoDB </a:t>
+            </a:r>
+            <a:endParaRPr lang="en-US"/>
+          </a:p>
+        </p:txBody>
+      </p:sp>
+      <p:sp>
+        <p:nvSpPr>
+          <p:cNvPr id="6" name="Content Placeholder 5"/>
           <p:cNvSpPr>
             <a:spLocks noGrp="1"/>
           </p:cNvSpPr>
@@ -10727,83 +10708,34 @@
         <p:txBody>
           <a:bodyPr/>
           <a:p>
-            <a:pPr marL="0" indent="0">
-              <a:buNone/>
-            </a:pPr>
-            <a:r>
-              <a:rPr lang="en-US"/>
-              <a:t>{</a:t>
-            </a:r>
-            <a:endParaRPr lang="en-US"/>
-          </a:p>
-          <a:p>
-            <a:pPr marL="0" indent="0">
-              <a:buNone/>
-            </a:pPr>
-            <a:r>
-              <a:rPr lang="en-US"/>
-              <a:t>	title: "Post Title 1",</a:t>
-            </a:r>
-            <a:endParaRPr lang="en-US"/>
-          </a:p>
-          <a:p>
-            <a:pPr marL="0" indent="0">
-              <a:buNone/>
-            </a:pPr>
-            <a:r>
-              <a:rPr lang="en-US"/>
-              <a:t>	body: "Body of post.",</a:t>
-            </a:r>
-            <a:endParaRPr lang="en-US"/>
-          </a:p>
-          <a:p>
-            <a:pPr marL="0" indent="0">
-              <a:buNone/>
-            </a:pPr>
-            <a:r>
-              <a:rPr lang="en-US"/>
-              <a:t>	category: "News",</a:t>
-            </a:r>
-            <a:endParaRPr lang="en-US"/>
-          </a:p>
-          <a:p>
-            <a:pPr marL="0" indent="0">
-              <a:buNone/>
-            </a:pPr>
-            <a:r>
-              <a:rPr lang="en-US"/>
-              <a:t>	likes: 1,</a:t>
-            </a:r>
-            <a:endParaRPr lang="en-US"/>
-          </a:p>
-          <a:p>
-            <a:pPr marL="0" indent="0">
-              <a:buNone/>
-            </a:pPr>
-            <a:r>
-              <a:rPr lang="en-US"/>
-              <a:t>	tags: ["news", "events"],</a:t>
-            </a:r>
-            <a:endParaRPr lang="en-US"/>
-          </a:p>
-          <a:p>
-            <a:pPr marL="0" indent="0">
-              <a:buNone/>
-            </a:pPr>
-            <a:r>
-              <a:rPr lang="en-US"/>
-              <a:t>	date: Date()</a:t>
-            </a:r>
-            <a:endParaRPr lang="en-US"/>
-          </a:p>
-          <a:p>
-            <a:pPr marL="0" indent="0">
-              <a:buNone/>
-            </a:pPr>
-            <a:r>
-              <a:rPr lang="en-US"/>
-              <a:t>}</a:t>
-            </a:r>
+            <a:r>
+              <a:rPr lang="en-US"/>
+              <a:t>MongoDB is a document database. It stores data in a type of JSON format called BSON.</a:t>
+            </a:r>
+            <a:endParaRPr lang="en-US"/>
+          </a:p>
+          <a:p>
+            <a:r>
+              <a:rPr lang="en-US"/>
+              <a:t>A record in MongoDB is a document, which is a data structure composed of key value pairs similar to the structure of JSON objects.</a:t>
+            </a:r>
+            <a:endParaRPr lang="en-US"/>
+          </a:p>
+          <a:p>
+            <a:r>
+              <a:rPr lang="en-US"/>
+              <a:t>Records in a MongoDB database are called documents, and the field values may include numbers, strings, booleans, arrays, or even nested documents.</a:t>
+            </a:r>
+            <a:endParaRPr lang="en-US"/>
+          </a:p>
+          <a:p>
+            <a:r>
+              <a:rPr lang="en-US"/>
+              <a:t>Can be installed locally or hosted in the cloud.</a:t>
+            </a:r>
+            <a:endParaRPr lang="en-US"/>
+          </a:p>
+          <a:p>
             <a:endParaRPr lang="en-US"/>
           </a:p>
         </p:txBody>
@@ -10817,6 +10749,141 @@
 </file>
 
 <file path=ppt/slides/slide53.xml><?xml version="1.0" encoding="utf-8"?>
+<p:sld xmlns:a="http://schemas.openxmlformats.org/drawingml/2006/main" xmlns:r="http://schemas.openxmlformats.org/officeDocument/2006/relationships" xmlns:p="http://schemas.openxmlformats.org/presentationml/2006/main">
+  <p:cSld>
+    <p:spTree>
+      <p:nvGrpSpPr>
+        <p:cNvPr id="1" name=""/>
+        <p:cNvGrpSpPr/>
+        <p:nvPr/>
+      </p:nvGrpSpPr>
+      <p:grpSpPr/>
+      <p:sp>
+        <p:nvSpPr>
+          <p:cNvPr id="2" name="Title 1"/>
+          <p:cNvSpPr>
+            <a:spLocks noGrp="1"/>
+          </p:cNvSpPr>
+          <p:nvPr>
+            <p:ph type="title"/>
+          </p:nvPr>
+        </p:nvSpPr>
+        <p:spPr/>
+        <p:txBody>
+          <a:bodyPr/>
+          <a:p>
+            <a:r>
+              <a:rPr lang="en-US"/>
+              <a:t>Example Document</a:t>
+            </a:r>
+            <a:endParaRPr lang="en-US"/>
+          </a:p>
+        </p:txBody>
+      </p:sp>
+      <p:sp>
+        <p:nvSpPr>
+          <p:cNvPr id="3" name="Content Placeholder 2"/>
+          <p:cNvSpPr>
+            <a:spLocks noGrp="1"/>
+          </p:cNvSpPr>
+          <p:nvPr>
+            <p:ph idx="1"/>
+          </p:nvPr>
+        </p:nvSpPr>
+        <p:spPr/>
+        <p:txBody>
+          <a:bodyPr/>
+          <a:p>
+            <a:pPr marL="0" indent="0">
+              <a:buNone/>
+            </a:pPr>
+            <a:r>
+              <a:rPr lang="en-US"/>
+              <a:t>{</a:t>
+            </a:r>
+            <a:endParaRPr lang="en-US"/>
+          </a:p>
+          <a:p>
+            <a:pPr marL="0" indent="0">
+              <a:buNone/>
+            </a:pPr>
+            <a:r>
+              <a:rPr lang="en-US"/>
+              <a:t>	title: "Post Title 1",</a:t>
+            </a:r>
+            <a:endParaRPr lang="en-US"/>
+          </a:p>
+          <a:p>
+            <a:pPr marL="0" indent="0">
+              <a:buNone/>
+            </a:pPr>
+            <a:r>
+              <a:rPr lang="en-US"/>
+              <a:t>	body: "Body of post.",</a:t>
+            </a:r>
+            <a:endParaRPr lang="en-US"/>
+          </a:p>
+          <a:p>
+            <a:pPr marL="0" indent="0">
+              <a:buNone/>
+            </a:pPr>
+            <a:r>
+              <a:rPr lang="en-US"/>
+              <a:t>	category: "News",</a:t>
+            </a:r>
+            <a:endParaRPr lang="en-US"/>
+          </a:p>
+          <a:p>
+            <a:pPr marL="0" indent="0">
+              <a:buNone/>
+            </a:pPr>
+            <a:r>
+              <a:rPr lang="en-US"/>
+              <a:t>	likes: 1,</a:t>
+            </a:r>
+            <a:endParaRPr lang="en-US"/>
+          </a:p>
+          <a:p>
+            <a:pPr marL="0" indent="0">
+              <a:buNone/>
+            </a:pPr>
+            <a:r>
+              <a:rPr lang="en-US"/>
+              <a:t>	tags: ["news", "events"],</a:t>
+            </a:r>
+            <a:endParaRPr lang="en-US"/>
+          </a:p>
+          <a:p>
+            <a:pPr marL="0" indent="0">
+              <a:buNone/>
+            </a:pPr>
+            <a:r>
+              <a:rPr lang="en-US"/>
+              <a:t>	date: Date()</a:t>
+            </a:r>
+            <a:endParaRPr lang="en-US"/>
+          </a:p>
+          <a:p>
+            <a:pPr marL="0" indent="0">
+              <a:buNone/>
+            </a:pPr>
+            <a:r>
+              <a:rPr lang="en-US"/>
+              <a:t>}</a:t>
+            </a:r>
+            <a:endParaRPr lang="en-US"/>
+          </a:p>
+        </p:txBody>
+      </p:sp>
+    </p:spTree>
+  </p:cSld>
+  <p:clrMapOvr>
+    <a:masterClrMapping/>
+  </p:clrMapOvr>
+</p:sld>
+</file>
+
+<file path=ppt/slides/slide54.xml><?xml version="1.0" encoding="utf-8"?>
 <p:sld xmlns:a="http://schemas.openxmlformats.org/drawingml/2006/main" xmlns:r="http://schemas.openxmlformats.org/officeDocument/2006/relationships" xmlns:p="http://schemas.openxmlformats.org/presentationml/2006/main">
   <p:cSld>
     <p:spTree>
@@ -12502,7 +12569,7 @@
 </p:sld>
 </file>
 
-<file path=ppt/slides/slide54.xml><?xml version="1.0" encoding="utf-8"?>
+<file path=ppt/slides/slide55.xml><?xml version="1.0" encoding="utf-8"?>
 <p:sld xmlns:a="http://schemas.openxmlformats.org/drawingml/2006/main" xmlns:r="http://schemas.openxmlformats.org/officeDocument/2006/relationships" xmlns:p="http://schemas.openxmlformats.org/presentationml/2006/main">
   <p:cSld>
     <p:spTree>
@@ -12590,7 +12657,7 @@
 </p:sld>
 </file>
 
-<file path=ppt/slides/slide55.xml><?xml version="1.0" encoding="utf-8"?>
+<file path=ppt/slides/slide56.xml><?xml version="1.0" encoding="utf-8"?>
 <p:sld xmlns:a="http://schemas.openxmlformats.org/drawingml/2006/main" xmlns:r="http://schemas.openxmlformats.org/officeDocument/2006/relationships" xmlns:p="http://schemas.openxmlformats.org/presentationml/2006/main">
   <p:cSld>
     <p:spTree>
@@ -12656,7 +12723,7 @@
 </p:sld>
 </file>
 
-<file path=ppt/slides/slide56.xml><?xml version="1.0" encoding="utf-8"?>
+<file path=ppt/slides/slide57.xml><?xml version="1.0" encoding="utf-8"?>
 <p:sld xmlns:a="http://schemas.openxmlformats.org/drawingml/2006/main" xmlns:r="http://schemas.openxmlformats.org/officeDocument/2006/relationships" xmlns:p="http://schemas.openxmlformats.org/presentationml/2006/main">
   <p:cSld>
     <p:spTree>
@@ -12720,68 +12787,6 @@
 </p:sld>
 </file>
 
-<file path=ppt/slides/slide57.xml><?xml version="1.0" encoding="utf-8"?>
-<p:sld xmlns:a="http://schemas.openxmlformats.org/drawingml/2006/main" xmlns:r="http://schemas.openxmlformats.org/officeDocument/2006/relationships" xmlns:p="http://schemas.openxmlformats.org/presentationml/2006/main">
-  <p:cSld>
-    <p:spTree>
-      <p:nvGrpSpPr>
-        <p:cNvPr id="1" name=""/>
-        <p:cNvGrpSpPr/>
-        <p:nvPr/>
-      </p:nvGrpSpPr>
-      <p:grpSpPr/>
-      <p:sp>
-        <p:nvSpPr>
-          <p:cNvPr id="2" name="Title 1"/>
-          <p:cNvSpPr>
-            <a:spLocks noGrp="1"/>
-          </p:cNvSpPr>
-          <p:nvPr>
-            <p:ph type="title"/>
-          </p:nvPr>
-        </p:nvSpPr>
-        <p:spPr/>
-        <p:txBody>
-          <a:bodyPr/>
-          <a:p>
-            <a:r>
-              <a:rPr lang="en-US"/>
-              <a:t>Mongodb Compass docs </a:t>
-            </a:r>
-            <a:endParaRPr lang="en-US"/>
-          </a:p>
-        </p:txBody>
-      </p:sp>
-      <p:sp>
-        <p:nvSpPr>
-          <p:cNvPr id="3" name="Content Placeholder 2"/>
-          <p:cNvSpPr>
-            <a:spLocks noGrp="1"/>
-          </p:cNvSpPr>
-          <p:nvPr>
-            <p:ph idx="1"/>
-          </p:nvPr>
-        </p:nvSpPr>
-        <p:spPr/>
-        <p:txBody>
-          <a:bodyPr/>
-          <a:p>
-            <a:r>
-              <a:rPr lang="en-US"/>
-              <a:t>https://www.mongodb.com/docs/compass/current/ </a:t>
-            </a:r>
-            <a:endParaRPr lang="en-US"/>
-          </a:p>
-        </p:txBody>
-      </p:sp>
-    </p:spTree>
-  </p:cSld>
-  <p:clrMapOvr>
-    <a:masterClrMapping/>
-  </p:clrMapOvr>
-</p:sld>
-</file>
-
 <file path=ppt/slides/slide58.xml><?xml version="1.0" encoding="utf-8"?>
 <p:sld xmlns:a="http://schemas.openxmlformats.org/drawingml/2006/main" xmlns:r="http://schemas.openxmlformats.org/officeDocument/2006/relationships" xmlns:p="http://schemas.openxmlformats.org/presentationml/2006/main">
   <p:cSld>
@@ -12808,7 +12813,7 @@
           <a:p>
             <a:r>
               <a:rPr lang="en-US"/>
-              <a:t>Creating Indexes </a:t>
+              <a:t>Mongodb Compass docs </a:t>
             </a:r>
             <a:endParaRPr lang="en-US"/>
           </a:p>
@@ -12830,7 +12835,7 @@
           <a:p>
             <a:r>
               <a:rPr lang="en-US"/>
-              <a:t>to improve the performance of query time </a:t>
+              <a:t>https://www.mongodb.com/docs/compass/current/ </a:t>
             </a:r>
             <a:endParaRPr lang="en-US"/>
           </a:p>
@@ -12870,7 +12875,7 @@
           <a:p>
             <a:r>
               <a:rPr lang="en-US"/>
-              <a:t>Blogs doc sample </a:t>
+              <a:t>Creating Indexes </a:t>
             </a:r>
             <a:endParaRPr lang="en-US"/>
           </a:p>
@@ -12886,135 +12891,15 @@
             <p:ph idx="1"/>
           </p:nvPr>
         </p:nvSpPr>
-        <p:spPr>
-          <a:xfrm>
-            <a:off x="838200" y="1338580"/>
-            <a:ext cx="10515600" cy="4838700"/>
-          </a:xfrm>
-        </p:spPr>
-        <p:txBody>
-          <a:bodyPr>
-            <a:noAutofit/>
-          </a:bodyPr>
-          <a:p>
-            <a:pPr marL="0" indent="0">
-              <a:buNone/>
-            </a:pPr>
-            <a:r>
-              <a:rPr lang="en-US" sz="2000"/>
-              <a:t>[</a:t>
-            </a:r>
-            <a:endParaRPr lang="en-US" sz="2000"/>
-          </a:p>
-          <a:p>
-            <a:pPr marL="0" indent="0">
-              <a:buNone/>
-            </a:pPr>
-            <a:r>
-              <a:rPr lang="en-US" sz="2000"/>
-              <a:t>    {</a:t>
-            </a:r>
-            <a:endParaRPr lang="en-US" sz="2000"/>
-          </a:p>
-          <a:p>
-            <a:pPr marL="0" indent="0">
-              <a:buNone/>
-            </a:pPr>
-            <a:r>
-              <a:rPr lang="en-US" sz="2000"/>
-              <a:t>        "title": "Exploring the Future of AI Technology",</a:t>
-            </a:r>
-            <a:endParaRPr lang="en-US" sz="2000"/>
-          </a:p>
-          <a:p>
-            <a:pPr marL="0" indent="0">
-              <a:buNone/>
-            </a:pPr>
-            <a:r>
-              <a:rPr lang="en-US" sz="2000"/>
-              <a:t>        "date": "2024-06-01",</a:t>
-            </a:r>
-            <a:endParaRPr lang="en-US" sz="2000"/>
-          </a:p>
-          <a:p>
-            <a:pPr marL="0" indent="0">
-              <a:buNone/>
-            </a:pPr>
-            <a:r>
-              <a:rPr lang="en-US" sz="2000"/>
-              <a:t>        "body": "Artificial Intelligence (AI) is rapidly evolving and transforming various industries...",</a:t>
-            </a:r>
-            <a:endParaRPr lang="en-US" sz="2000"/>
-          </a:p>
-          <a:p>
-            <a:pPr marL="0" indent="0">
-              <a:buNone/>
-            </a:pPr>
-            <a:r>
-              <a:rPr lang="en-US" sz="2000"/>
-              <a:t>        "category": "news",</a:t>
-            </a:r>
-            <a:endParaRPr lang="en-US" sz="2000"/>
-          </a:p>
-          <a:p>
-            <a:pPr marL="0" indent="0">
-              <a:buNone/>
-            </a:pPr>
-            <a:r>
-              <a:rPr lang="en-US" sz="2000"/>
-              <a:t>        "tags": ["AI", "technology", "innovation"],</a:t>
-            </a:r>
-            <a:endParaRPr lang="en-US" sz="2000"/>
-          </a:p>
-          <a:p>
-            <a:pPr marL="0" indent="0">
-              <a:buNone/>
-            </a:pPr>
-            <a:r>
-              <a:rPr lang="en-US" sz="2000"/>
-              <a:t>        "like_count": 120,</a:t>
-            </a:r>
-            <a:endParaRPr lang="en-US" sz="2000"/>
-          </a:p>
-          <a:p>
-            <a:pPr marL="0" indent="0">
-              <a:buNone/>
-            </a:pPr>
-            <a:r>
-              <a:rPr lang="en-US" sz="2000"/>
-              <a:t>        "share_count": 45</a:t>
-            </a:r>
-            <a:endParaRPr lang="en-US" sz="2000"/>
-          </a:p>
-          <a:p>
-            <a:pPr marL="0" indent="0">
-              <a:buNone/>
-            </a:pPr>
-            <a:r>
-              <a:rPr lang="en-US" sz="2000"/>
-              <a:t>    },</a:t>
-            </a:r>
-            <a:endParaRPr lang="en-US" sz="2000"/>
-          </a:p>
-          <a:p>
-            <a:pPr marL="0" indent="0">
-              <a:buNone/>
-            </a:pPr>
-            <a:r>
-              <a:rPr lang="en-US" sz="2000"/>
-              <a:t>.....</a:t>
-            </a:r>
-            <a:endParaRPr lang="en-US" sz="2000"/>
-          </a:p>
-          <a:p>
-            <a:pPr marL="0" indent="0">
-              <a:buNone/>
-            </a:pPr>
-            <a:r>
-              <a:rPr lang="en-US" sz="2000"/>
-              <a:t>]</a:t>
-            </a:r>
-            <a:endParaRPr lang="en-US" sz="2000"/>
+        <p:spPr/>
+        <p:txBody>
+          <a:bodyPr/>
+          <a:p>
+            <a:r>
+              <a:rPr lang="en-US"/>
+              <a:t>to improve the performance of query time </a:t>
+            </a:r>
+            <a:endParaRPr lang="en-US"/>
           </a:p>
         </p:txBody>
       </p:sp>
@@ -13651,6 +13536,188 @@
           <a:p>
             <a:r>
               <a:rPr lang="en-US"/>
+              <a:t>Blogs doc sample </a:t>
+            </a:r>
+            <a:endParaRPr lang="en-US"/>
+          </a:p>
+        </p:txBody>
+      </p:sp>
+      <p:sp>
+        <p:nvSpPr>
+          <p:cNvPr id="3" name="Content Placeholder 2"/>
+          <p:cNvSpPr>
+            <a:spLocks noGrp="1"/>
+          </p:cNvSpPr>
+          <p:nvPr>
+            <p:ph idx="1"/>
+          </p:nvPr>
+        </p:nvSpPr>
+        <p:spPr>
+          <a:xfrm>
+            <a:off x="838200" y="1338580"/>
+            <a:ext cx="10515600" cy="4838700"/>
+          </a:xfrm>
+        </p:spPr>
+        <p:txBody>
+          <a:bodyPr>
+            <a:noAutofit/>
+          </a:bodyPr>
+          <a:p>
+            <a:pPr marL="0" indent="0">
+              <a:buNone/>
+            </a:pPr>
+            <a:r>
+              <a:rPr lang="en-US" sz="2000"/>
+              <a:t>[</a:t>
+            </a:r>
+            <a:endParaRPr lang="en-US" sz="2000"/>
+          </a:p>
+          <a:p>
+            <a:pPr marL="0" indent="0">
+              <a:buNone/>
+            </a:pPr>
+            <a:r>
+              <a:rPr lang="en-US" sz="2000"/>
+              <a:t>    {</a:t>
+            </a:r>
+            <a:endParaRPr lang="en-US" sz="2000"/>
+          </a:p>
+          <a:p>
+            <a:pPr marL="0" indent="0">
+              <a:buNone/>
+            </a:pPr>
+            <a:r>
+              <a:rPr lang="en-US" sz="2000"/>
+              <a:t>        "title": "Exploring the Future of AI Technology",</a:t>
+            </a:r>
+            <a:endParaRPr lang="en-US" sz="2000"/>
+          </a:p>
+          <a:p>
+            <a:pPr marL="0" indent="0">
+              <a:buNone/>
+            </a:pPr>
+            <a:r>
+              <a:rPr lang="en-US" sz="2000"/>
+              <a:t>        "date": "2024-06-01",</a:t>
+            </a:r>
+            <a:endParaRPr lang="en-US" sz="2000"/>
+          </a:p>
+          <a:p>
+            <a:pPr marL="0" indent="0">
+              <a:buNone/>
+            </a:pPr>
+            <a:r>
+              <a:rPr lang="en-US" sz="2000"/>
+              <a:t>        "body": "Artificial Intelligence (AI) is rapidly evolving and transforming various industries...",</a:t>
+            </a:r>
+            <a:endParaRPr lang="en-US" sz="2000"/>
+          </a:p>
+          <a:p>
+            <a:pPr marL="0" indent="0">
+              <a:buNone/>
+            </a:pPr>
+            <a:r>
+              <a:rPr lang="en-US" sz="2000"/>
+              <a:t>        "category": "news",</a:t>
+            </a:r>
+            <a:endParaRPr lang="en-US" sz="2000"/>
+          </a:p>
+          <a:p>
+            <a:pPr marL="0" indent="0">
+              <a:buNone/>
+            </a:pPr>
+            <a:r>
+              <a:rPr lang="en-US" sz="2000"/>
+              <a:t>        "tags": ["AI", "technology", "innovation"],</a:t>
+            </a:r>
+            <a:endParaRPr lang="en-US" sz="2000"/>
+          </a:p>
+          <a:p>
+            <a:pPr marL="0" indent="0">
+              <a:buNone/>
+            </a:pPr>
+            <a:r>
+              <a:rPr lang="en-US" sz="2000"/>
+              <a:t>        "like_count": 120,</a:t>
+            </a:r>
+            <a:endParaRPr lang="en-US" sz="2000"/>
+          </a:p>
+          <a:p>
+            <a:pPr marL="0" indent="0">
+              <a:buNone/>
+            </a:pPr>
+            <a:r>
+              <a:rPr lang="en-US" sz="2000"/>
+              <a:t>        "share_count": 45</a:t>
+            </a:r>
+            <a:endParaRPr lang="en-US" sz="2000"/>
+          </a:p>
+          <a:p>
+            <a:pPr marL="0" indent="0">
+              <a:buNone/>
+            </a:pPr>
+            <a:r>
+              <a:rPr lang="en-US" sz="2000"/>
+              <a:t>    },</a:t>
+            </a:r>
+            <a:endParaRPr lang="en-US" sz="2000"/>
+          </a:p>
+          <a:p>
+            <a:pPr marL="0" indent="0">
+              <a:buNone/>
+            </a:pPr>
+            <a:r>
+              <a:rPr lang="en-US" sz="2000"/>
+              <a:t>.....</a:t>
+            </a:r>
+            <a:endParaRPr lang="en-US" sz="2000"/>
+          </a:p>
+          <a:p>
+            <a:pPr marL="0" indent="0">
+              <a:buNone/>
+            </a:pPr>
+            <a:r>
+              <a:rPr lang="en-US" sz="2000"/>
+              <a:t>]</a:t>
+            </a:r>
+            <a:endParaRPr lang="en-US" sz="2000"/>
+          </a:p>
+        </p:txBody>
+      </p:sp>
+    </p:spTree>
+  </p:cSld>
+  <p:clrMapOvr>
+    <a:masterClrMapping/>
+  </p:clrMapOvr>
+</p:sld>
+</file>
+
+<file path=ppt/slides/slide61.xml><?xml version="1.0" encoding="utf-8"?>
+<p:sld xmlns:a="http://schemas.openxmlformats.org/drawingml/2006/main" xmlns:r="http://schemas.openxmlformats.org/officeDocument/2006/relationships" xmlns:p="http://schemas.openxmlformats.org/presentationml/2006/main">
+  <p:cSld>
+    <p:spTree>
+      <p:nvGrpSpPr>
+        <p:cNvPr id="1" name=""/>
+        <p:cNvGrpSpPr/>
+        <p:nvPr/>
+      </p:nvGrpSpPr>
+      <p:grpSpPr/>
+      <p:sp>
+        <p:nvSpPr>
+          <p:cNvPr id="2" name="Title 1"/>
+          <p:cNvSpPr>
+            <a:spLocks noGrp="1"/>
+          </p:cNvSpPr>
+          <p:nvPr>
+            <p:ph type="title"/>
+          </p:nvPr>
+        </p:nvSpPr>
+        <p:spPr/>
+        <p:txBody>
+          <a:bodyPr/>
+          <a:p>
+            <a:r>
+              <a:rPr lang="en-US"/>
               <a:t>Questions </a:t>
             </a:r>
             <a:endParaRPr lang="en-US"/>

</xml_diff>